<commit_message>
Avance en el generador de ppt
</commit_message>
<xml_diff>
--- a/inst/plantillas/plantilla_16_9.pptx
+++ b/inst/plantillas/plantilla_16_9.pptx
@@ -2653,8 +2653,8 @@
         </p:nvSpPr>
         <p:spPr>
           <a:xfrm>
-            <a:off x="175957" y="0"/>
-            <a:ext cx="11840086" cy="6858000"/>
+            <a:off x="175957" y="1152939"/>
+            <a:ext cx="11840086" cy="5068958"/>
           </a:xfrm>
         </p:spPr>
         <p:txBody>
@@ -2698,6 +2698,124 @@
           </a:ln>
         </p:spPr>
       </p:pic>
+      <p:sp>
+        <p:nvSpPr>
+          <p:cNvPr id="2" name="Title 1">
+            <a:extLst>
+              <a:ext uri="{FF2B5EF4-FFF2-40B4-BE49-F238E27FC236}">
+                <a16:creationId xmlns:a16="http://schemas.microsoft.com/office/drawing/2014/main" id="{4171F0F9-C2A2-7009-053C-1D072BFEE8B5}"/>
+              </a:ext>
+            </a:extLst>
+          </p:cNvPr>
+          <p:cNvSpPr>
+            <a:spLocks noGrp="1"/>
+          </p:cNvSpPr>
+          <p:nvPr>
+            <p:ph type="title"/>
+          </p:nvPr>
+        </p:nvSpPr>
+        <p:spPr>
+          <a:xfrm>
+            <a:off x="175957" y="195961"/>
+            <a:ext cx="9912259" cy="818842"/>
+          </a:xfrm>
+        </p:spPr>
+        <p:txBody>
+          <a:bodyPr/>
+          <a:lstStyle/>
+          <a:p>
+            <a:r>
+              <a:rPr lang="en-US"/>
+              <a:t>Click to edit Master title style</a:t>
+            </a:r>
+            <a:endParaRPr lang="en-PE"/>
+          </a:p>
+        </p:txBody>
+      </p:sp>
+      <p:sp>
+        <p:nvSpPr>
+          <p:cNvPr id="9" name="Text Placeholder 8">
+            <a:extLst>
+              <a:ext uri="{FF2B5EF4-FFF2-40B4-BE49-F238E27FC236}">
+                <a16:creationId xmlns:a16="http://schemas.microsoft.com/office/drawing/2014/main" id="{77019717-3B0F-2B2C-CFD0-682D85776B1C}"/>
+              </a:ext>
+            </a:extLst>
+          </p:cNvPr>
+          <p:cNvSpPr>
+            <a:spLocks noGrp="1"/>
+          </p:cNvSpPr>
+          <p:nvPr>
+            <p:ph type="body" sz="quarter" idx="12" hasCustomPrompt="1"/>
+          </p:nvPr>
+        </p:nvSpPr>
+        <p:spPr>
+          <a:xfrm>
+            <a:off x="7663118" y="6360033"/>
+            <a:ext cx="4352925" cy="371431"/>
+          </a:xfrm>
+        </p:spPr>
+        <p:txBody>
+          <a:bodyPr/>
+          <a:lstStyle>
+            <a:lvl2pPr algn="r">
+              <a:defRPr b="1">
+                <a:solidFill>
+                  <a:srgbClr val="002060"/>
+                </a:solidFill>
+              </a:defRPr>
+            </a:lvl2pPr>
+          </a:lstStyle>
+          <a:p>
+            <a:pPr lvl="1"/>
+            <a:r>
+              <a:rPr lang="en-US" dirty="0"/>
+              <a:t>Second level</a:t>
+            </a:r>
+          </a:p>
+        </p:txBody>
+      </p:sp>
+      <p:sp>
+        <p:nvSpPr>
+          <p:cNvPr id="10" name="Text Placeholder 8">
+            <a:extLst>
+              <a:ext uri="{FF2B5EF4-FFF2-40B4-BE49-F238E27FC236}">
+                <a16:creationId xmlns:a16="http://schemas.microsoft.com/office/drawing/2014/main" id="{70766E7F-B4DE-2943-B31B-5B28DBEB14BC}"/>
+              </a:ext>
+            </a:extLst>
+          </p:cNvPr>
+          <p:cNvSpPr>
+            <a:spLocks noGrp="1"/>
+          </p:cNvSpPr>
+          <p:nvPr>
+            <p:ph type="body" sz="quarter" idx="13" hasCustomPrompt="1"/>
+          </p:nvPr>
+        </p:nvSpPr>
+        <p:spPr>
+          <a:xfrm>
+            <a:off x="175957" y="6360032"/>
+            <a:ext cx="4352925" cy="371431"/>
+          </a:xfrm>
+        </p:spPr>
+        <p:txBody>
+          <a:bodyPr/>
+          <a:lstStyle>
+            <a:lvl2pPr>
+              <a:defRPr b="1">
+                <a:solidFill>
+                  <a:srgbClr val="002060"/>
+                </a:solidFill>
+              </a:defRPr>
+            </a:lvl2pPr>
+          </a:lstStyle>
+          <a:p>
+            <a:pPr lvl="1"/>
+            <a:r>
+              <a:rPr lang="en-US" dirty="0"/>
+              <a:t>Second level</a:t>
+            </a:r>
+          </a:p>
+        </p:txBody>
+      </p:sp>
     </p:spTree>
     <p:extLst>
       <p:ext uri="{BB962C8B-B14F-4D97-AF65-F5344CB8AC3E}">
@@ -5264,7 +5382,7 @@
             </a:lvl9pPr>
           </a:lstStyle>
           <a:p>
-            <a:endParaRPr/>
+            <a:endParaRPr dirty="0"/>
           </a:p>
         </p:txBody>
       </p:sp>
@@ -13977,7 +14095,7 @@
             </a:lvl9pPr>
           </a:lstStyle>
           <a:p>
-            <a:endParaRPr lang="es-PE"/>
+            <a:endParaRPr lang="es-PE" dirty="0"/>
           </a:p>
         </p:txBody>
       </p:sp>

</xml_diff>

<commit_message>
Generador de PPT estable
</commit_message>
<xml_diff>
--- a/inst/plantillas/plantilla_16_9.pptx
+++ b/inst/plantillas/plantilla_16_9.pptx
@@ -7,6 +7,9 @@
   <p:notesMasterIdLst>
     <p:notesMasterId r:id="rId2"/>
   </p:notesMasterIdLst>
+  <p:handoutMasterIdLst>
+    <p:handoutMasterId r:id="rId3"/>
+  </p:handoutMasterIdLst>
   <p:sldSz cx="12192000" cy="6858000"/>
   <p:notesSz cx="6858000" cy="9144000"/>
   <p:defaultTextStyle>
@@ -242,8 +245,200 @@
     <p:ext uri="{EFAFB233-063F-42B5-8137-9DF3F51BA10A}">
       <p15:sldGuideLst xmlns:p15="http://schemas.microsoft.com/office/powerpoint/2012/main"/>
     </p:ext>
+    <p:ext uri="{2D200454-40CA-4A62-9FC3-DE9A4176ACB9}">
+      <p15:notesGuideLst xmlns:p15="http://schemas.microsoft.com/office/powerpoint/2012/main"/>
+    </p:ext>
   </p:extLst>
 </p:presentation>
+</file>
+
+<file path=ppt/handoutMasters/handoutMaster1.xml><?xml version="1.0" encoding="utf-8"?>
+<p:handoutMaster xmlns:a="http://schemas.openxmlformats.org/drawingml/2006/main" xmlns:r="http://schemas.openxmlformats.org/officeDocument/2006/relationships" xmlns:p="http://schemas.openxmlformats.org/presentationml/2006/main">
+  <p:cSld>
+    <p:bg>
+      <p:bgRef idx="1001">
+        <a:schemeClr val="bg1"/>
+      </p:bgRef>
+    </p:bg>
+    <p:spTree>
+      <p:nvGrpSpPr>
+        <p:cNvPr id="1" name=""/>
+        <p:cNvGrpSpPr/>
+        <p:nvPr/>
+      </p:nvGrpSpPr>
+      <p:grpSpPr>
+        <a:xfrm>
+          <a:off x="0" y="0"/>
+          <a:ext cx="0" cy="0"/>
+          <a:chOff x="0" y="0"/>
+          <a:chExt cx="0" cy="0"/>
+        </a:xfrm>
+      </p:grpSpPr>
+      <p:sp>
+        <p:nvSpPr>
+          <p:cNvPr id="2" name="Header Placeholder 1">
+            <a:extLst>
+              <a:ext uri="{FF2B5EF4-FFF2-40B4-BE49-F238E27FC236}">
+                <a16:creationId xmlns:a16="http://schemas.microsoft.com/office/drawing/2014/main" id="{638294C7-ABDE-48DB-8562-356CD46C9909}"/>
+              </a:ext>
+            </a:extLst>
+          </p:cNvPr>
+          <p:cNvSpPr>
+            <a:spLocks noGrp="1"/>
+          </p:cNvSpPr>
+          <p:nvPr>
+            <p:ph type="hdr" sz="quarter"/>
+          </p:nvPr>
+        </p:nvSpPr>
+        <p:spPr>
+          <a:xfrm>
+            <a:off x="0" y="0"/>
+            <a:ext cx="2971800" cy="458788"/>
+          </a:xfrm>
+          <a:prstGeom prst="rect">
+            <a:avLst/>
+          </a:prstGeom>
+        </p:spPr>
+        <p:txBody>
+          <a:bodyPr vert="horz" lIns="91440" tIns="45720" rIns="91440" bIns="45720" rtlCol="0"/>
+          <a:lstStyle>
+            <a:lvl1pPr algn="l">
+              <a:defRPr sz="1200"/>
+            </a:lvl1pPr>
+          </a:lstStyle>
+          <a:p>
+            <a:endParaRPr lang="en-PE"/>
+          </a:p>
+        </p:txBody>
+      </p:sp>
+      <p:sp>
+        <p:nvSpPr>
+          <p:cNvPr id="3" name="Date Placeholder 2">
+            <a:extLst>
+              <a:ext uri="{FF2B5EF4-FFF2-40B4-BE49-F238E27FC236}">
+                <a16:creationId xmlns:a16="http://schemas.microsoft.com/office/drawing/2014/main" id="{3417344B-5E31-B92D-CEF0-C9E62F7D3A95}"/>
+              </a:ext>
+            </a:extLst>
+          </p:cNvPr>
+          <p:cNvSpPr>
+            <a:spLocks noGrp="1"/>
+          </p:cNvSpPr>
+          <p:nvPr>
+            <p:ph type="dt" sz="quarter" idx="1"/>
+          </p:nvPr>
+        </p:nvSpPr>
+        <p:spPr>
+          <a:xfrm>
+            <a:off x="3884613" y="0"/>
+            <a:ext cx="2971800" cy="458788"/>
+          </a:xfrm>
+          <a:prstGeom prst="rect">
+            <a:avLst/>
+          </a:prstGeom>
+        </p:spPr>
+        <p:txBody>
+          <a:bodyPr vert="horz" lIns="91440" tIns="45720" rIns="91440" bIns="45720" rtlCol="0"/>
+          <a:lstStyle>
+            <a:lvl1pPr algn="r">
+              <a:defRPr sz="1200"/>
+            </a:lvl1pPr>
+          </a:lstStyle>
+          <a:p>
+            <a:fld id="{A9DF37BE-63F7-D04E-AEC4-DC43A32AA23E}" type="datetimeFigureOut">
+              <a:rPr lang="en-PE" smtClean="0"/>
+              <a:t>29/11/25</a:t>
+            </a:fld>
+            <a:endParaRPr lang="en-PE"/>
+          </a:p>
+        </p:txBody>
+      </p:sp>
+      <p:sp>
+        <p:nvSpPr>
+          <p:cNvPr id="4" name="Footer Placeholder 3">
+            <a:extLst>
+              <a:ext uri="{FF2B5EF4-FFF2-40B4-BE49-F238E27FC236}">
+                <a16:creationId xmlns:a16="http://schemas.microsoft.com/office/drawing/2014/main" id="{97BA49C1-6759-4BD3-8AF1-54DC5B70E349}"/>
+              </a:ext>
+            </a:extLst>
+          </p:cNvPr>
+          <p:cNvSpPr>
+            <a:spLocks noGrp="1"/>
+          </p:cNvSpPr>
+          <p:nvPr>
+            <p:ph type="ftr" sz="quarter" idx="2"/>
+          </p:nvPr>
+        </p:nvSpPr>
+        <p:spPr>
+          <a:xfrm>
+            <a:off x="0" y="8685213"/>
+            <a:ext cx="2971800" cy="458787"/>
+          </a:xfrm>
+          <a:prstGeom prst="rect">
+            <a:avLst/>
+          </a:prstGeom>
+        </p:spPr>
+        <p:txBody>
+          <a:bodyPr vert="horz" lIns="91440" tIns="45720" rIns="91440" bIns="45720" rtlCol="0" anchor="b"/>
+          <a:lstStyle>
+            <a:lvl1pPr algn="l">
+              <a:defRPr sz="1200"/>
+            </a:lvl1pPr>
+          </a:lstStyle>
+          <a:p>
+            <a:endParaRPr lang="en-PE"/>
+          </a:p>
+        </p:txBody>
+      </p:sp>
+      <p:sp>
+        <p:nvSpPr>
+          <p:cNvPr id="5" name="Slide Number Placeholder 4">
+            <a:extLst>
+              <a:ext uri="{FF2B5EF4-FFF2-40B4-BE49-F238E27FC236}">
+                <a16:creationId xmlns:a16="http://schemas.microsoft.com/office/drawing/2014/main" id="{35854526-EBE0-BF7C-3A50-49D545061044}"/>
+              </a:ext>
+            </a:extLst>
+          </p:cNvPr>
+          <p:cNvSpPr>
+            <a:spLocks noGrp="1"/>
+          </p:cNvSpPr>
+          <p:nvPr>
+            <p:ph type="sldNum" sz="quarter" idx="3"/>
+          </p:nvPr>
+        </p:nvSpPr>
+        <p:spPr>
+          <a:xfrm>
+            <a:off x="3884613" y="8685213"/>
+            <a:ext cx="2971800" cy="458787"/>
+          </a:xfrm>
+          <a:prstGeom prst="rect">
+            <a:avLst/>
+          </a:prstGeom>
+        </p:spPr>
+        <p:txBody>
+          <a:bodyPr vert="horz" lIns="91440" tIns="45720" rIns="91440" bIns="45720" rtlCol="0" anchor="b"/>
+          <a:lstStyle>
+            <a:lvl1pPr algn="r">
+              <a:defRPr sz="1200"/>
+            </a:lvl1pPr>
+          </a:lstStyle>
+          <a:p>
+            <a:fld id="{3222A19B-43E0-1847-B01C-CD0E42EA1A1B}" type="slidenum">
+              <a:rPr lang="en-PE" smtClean="0"/>
+              <a:t>‹#›</a:t>
+            </a:fld>
+            <a:endParaRPr lang="en-PE"/>
+          </a:p>
+        </p:txBody>
+      </p:sp>
+    </p:spTree>
+    <p:extLst>
+      <p:ext uri="{BB962C8B-B14F-4D97-AF65-F5344CB8AC3E}">
+        <p14:creationId xmlns:p14="http://schemas.microsoft.com/office/powerpoint/2010/main" val="1170983871"/>
+      </p:ext>
+    </p:extLst>
+  </p:cSld>
+  <p:clrMap bg1="lt1" tx1="dk1" bg2="lt2" tx2="dk2" accent1="accent1" accent2="accent2" accent3="accent3" accent4="accent4" accent5="accent5" accent6="accent6" hlink="hlink" folHlink="folHlink"/>
+</p:handoutMaster>
 </file>
 
 <file path=ppt/notesMasters/notesMaster1.xml><?xml version="1.0" encoding="utf-8"?>
@@ -1164,6 +1359,483 @@
 </file>
 
 <file path=ppt/slideLayouts/slideLayout10.xml><?xml version="1.0" encoding="utf-8"?>
+<p:sldLayout xmlns:a="http://schemas.openxmlformats.org/drawingml/2006/main" xmlns:r="http://schemas.openxmlformats.org/officeDocument/2006/relationships" xmlns:p="http://schemas.openxmlformats.org/presentationml/2006/main" matchingName="Dos objetos" userDrawn="1">
+  <p:cSld name="Two Content">
+    <p:spTree>
+      <p:nvGrpSpPr>
+        <p:cNvPr id="1" name="Shape 84"/>
+        <p:cNvGrpSpPr/>
+        <p:nvPr/>
+      </p:nvGrpSpPr>
+      <p:grpSpPr>
+        <a:xfrm>
+          <a:off x="0" y="0"/>
+          <a:ext cx="0" cy="0"/>
+          <a:chOff x="0" y="0"/>
+          <a:chExt cx="0" cy="0"/>
+        </a:xfrm>
+      </p:grpSpPr>
+      <p:pic>
+        <p:nvPicPr>
+          <p:cNvPr id="87" name="Google Shape;87;p51"/>
+          <p:cNvPicPr preferRelativeResize="0"/>
+          <p:nvPr/>
+        </p:nvPicPr>
+        <p:blipFill rotWithShape="1">
+          <a:blip r:embed="rId2">
+            <a:alphaModFix/>
+          </a:blip>
+          <a:srcRect t="29471" b="26643"/>
+          <a:stretch/>
+        </p:blipFill>
+        <p:spPr>
+          <a:xfrm>
+            <a:off x="10088216" y="158826"/>
+            <a:ext cx="1927827" cy="846037"/>
+          </a:xfrm>
+          <a:prstGeom prst="rect">
+            <a:avLst/>
+          </a:prstGeom>
+          <a:noFill/>
+          <a:ln>
+            <a:noFill/>
+          </a:ln>
+        </p:spPr>
+      </p:pic>
+      <p:sp>
+        <p:nvSpPr>
+          <p:cNvPr id="88" name="Google Shape;88;p51"/>
+          <p:cNvSpPr txBox="1">
+            <a:spLocks noGrp="1"/>
+          </p:cNvSpPr>
+          <p:nvPr>
+            <p:ph type="title"/>
+          </p:nvPr>
+        </p:nvSpPr>
+        <p:spPr>
+          <a:xfrm>
+            <a:off x="461464" y="338268"/>
+            <a:ext cx="9626752" cy="666595"/>
+          </a:xfrm>
+          <a:prstGeom prst="rect">
+            <a:avLst/>
+          </a:prstGeom>
+          <a:noFill/>
+          <a:ln>
+            <a:noFill/>
+          </a:ln>
+        </p:spPr>
+        <p:txBody>
+          <a:bodyPr spcFirstLastPara="1" wrap="square" lIns="91425" tIns="45700" rIns="91425" bIns="45700" anchor="ctr" anchorCtr="0">
+            <a:normAutofit/>
+          </a:bodyPr>
+          <a:lstStyle>
+            <a:lvl1pPr lvl="0" algn="l">
+              <a:lnSpc>
+                <a:spcPct val="90000"/>
+              </a:lnSpc>
+              <a:spcBef>
+                <a:spcPts val="0"/>
+              </a:spcBef>
+              <a:spcAft>
+                <a:spcPts val="0"/>
+              </a:spcAft>
+              <a:buClr>
+                <a:srgbClr val="DA4C4C"/>
+              </a:buClr>
+              <a:buSzPts val="2400"/>
+              <a:buFont typeface="Arial"/>
+              <a:buNone/>
+              <a:defRPr sz="2400" b="1" cap="none">
+                <a:solidFill>
+                  <a:srgbClr val="DA4C4C"/>
+                </a:solidFill>
+                <a:latin typeface="Arial"/>
+                <a:ea typeface="Arial"/>
+                <a:cs typeface="Arial"/>
+                <a:sym typeface="Arial"/>
+              </a:defRPr>
+            </a:lvl1pPr>
+            <a:lvl2pPr lvl="1" algn="l">
+              <a:lnSpc>
+                <a:spcPct val="100000"/>
+              </a:lnSpc>
+              <a:spcBef>
+                <a:spcPts val="0"/>
+              </a:spcBef>
+              <a:spcAft>
+                <a:spcPts val="0"/>
+              </a:spcAft>
+              <a:buSzPts val="1400"/>
+              <a:buNone/>
+              <a:defRPr/>
+            </a:lvl2pPr>
+            <a:lvl3pPr lvl="2" algn="l">
+              <a:lnSpc>
+                <a:spcPct val="100000"/>
+              </a:lnSpc>
+              <a:spcBef>
+                <a:spcPts val="0"/>
+              </a:spcBef>
+              <a:spcAft>
+                <a:spcPts val="0"/>
+              </a:spcAft>
+              <a:buSzPts val="1400"/>
+              <a:buNone/>
+              <a:defRPr/>
+            </a:lvl3pPr>
+            <a:lvl4pPr lvl="3" algn="l">
+              <a:lnSpc>
+                <a:spcPct val="100000"/>
+              </a:lnSpc>
+              <a:spcBef>
+                <a:spcPts val="0"/>
+              </a:spcBef>
+              <a:spcAft>
+                <a:spcPts val="0"/>
+              </a:spcAft>
+              <a:buSzPts val="1400"/>
+              <a:buNone/>
+              <a:defRPr/>
+            </a:lvl4pPr>
+            <a:lvl5pPr lvl="4" algn="l">
+              <a:lnSpc>
+                <a:spcPct val="100000"/>
+              </a:lnSpc>
+              <a:spcBef>
+                <a:spcPts val="0"/>
+              </a:spcBef>
+              <a:spcAft>
+                <a:spcPts val="0"/>
+              </a:spcAft>
+              <a:buSzPts val="1400"/>
+              <a:buNone/>
+              <a:defRPr/>
+            </a:lvl5pPr>
+            <a:lvl6pPr lvl="5" algn="l">
+              <a:lnSpc>
+                <a:spcPct val="100000"/>
+              </a:lnSpc>
+              <a:spcBef>
+                <a:spcPts val="0"/>
+              </a:spcBef>
+              <a:spcAft>
+                <a:spcPts val="0"/>
+              </a:spcAft>
+              <a:buSzPts val="1400"/>
+              <a:buNone/>
+              <a:defRPr/>
+            </a:lvl6pPr>
+            <a:lvl7pPr lvl="6" algn="l">
+              <a:lnSpc>
+                <a:spcPct val="100000"/>
+              </a:lnSpc>
+              <a:spcBef>
+                <a:spcPts val="0"/>
+              </a:spcBef>
+              <a:spcAft>
+                <a:spcPts val="0"/>
+              </a:spcAft>
+              <a:buSzPts val="1400"/>
+              <a:buNone/>
+              <a:defRPr/>
+            </a:lvl7pPr>
+            <a:lvl8pPr lvl="7" algn="l">
+              <a:lnSpc>
+                <a:spcPct val="100000"/>
+              </a:lnSpc>
+              <a:spcBef>
+                <a:spcPts val="0"/>
+              </a:spcBef>
+              <a:spcAft>
+                <a:spcPts val="0"/>
+              </a:spcAft>
+              <a:buSzPts val="1400"/>
+              <a:buNone/>
+              <a:defRPr/>
+            </a:lvl8pPr>
+            <a:lvl9pPr lvl="8" algn="l">
+              <a:lnSpc>
+                <a:spcPct val="100000"/>
+              </a:lnSpc>
+              <a:spcBef>
+                <a:spcPts val="0"/>
+              </a:spcBef>
+              <a:spcAft>
+                <a:spcPts val="0"/>
+              </a:spcAft>
+              <a:buSzPts val="1400"/>
+              <a:buNone/>
+              <a:defRPr/>
+            </a:lvl9pPr>
+          </a:lstStyle>
+          <a:p>
+            <a:r>
+              <a:rPr lang="es-MX"/>
+              <a:t>Haz clic para modificar el estilo de título del patrón</a:t>
+            </a:r>
+            <a:endParaRPr dirty="0"/>
+          </a:p>
+        </p:txBody>
+      </p:sp>
+      <p:sp>
+        <p:nvSpPr>
+          <p:cNvPr id="2" name="Place holder 1">
+            <a:extLst>
+              <a:ext uri="{FF2B5EF4-FFF2-40B4-BE49-F238E27FC236}">
+                <a16:creationId xmlns:a16="http://schemas.microsoft.com/office/drawing/2014/main" id="{2D673E48-04D3-F5BF-45EB-9E91DBD21B82}"/>
+              </a:ext>
+            </a:extLst>
+          </p:cNvPr>
+          <p:cNvSpPr>
+            <a:spLocks noGrp="1"/>
+          </p:cNvSpPr>
+          <p:nvPr>
+            <p:ph sz="half" idx="10"/>
+          </p:nvPr>
+        </p:nvSpPr>
+        <p:spPr>
+          <a:xfrm>
+            <a:off x="355600" y="1300480"/>
+            <a:ext cx="4297680" cy="4876483"/>
+          </a:xfrm>
+        </p:spPr>
+        <p:txBody>
+          <a:bodyPr/>
+          <a:lstStyle>
+            <a:lvl1pPr>
+              <a:defRPr>
+                <a:solidFill>
+                  <a:srgbClr val="F2F2F2"/>
+                </a:solidFill>
+              </a:defRPr>
+            </a:lvl1pPr>
+            <a:lvl2pPr>
+              <a:defRPr>
+                <a:solidFill>
+                  <a:srgbClr val="F2F2F2"/>
+                </a:solidFill>
+              </a:defRPr>
+            </a:lvl2pPr>
+            <a:lvl3pPr>
+              <a:defRPr>
+                <a:solidFill>
+                  <a:srgbClr val="F2F2F2"/>
+                </a:solidFill>
+              </a:defRPr>
+            </a:lvl3pPr>
+            <a:lvl4pPr>
+              <a:defRPr>
+                <a:solidFill>
+                  <a:srgbClr val="F2F2F2"/>
+                </a:solidFill>
+              </a:defRPr>
+            </a:lvl4pPr>
+            <a:lvl5pPr>
+              <a:defRPr>
+                <a:solidFill>
+                  <a:srgbClr val="F2F2F2"/>
+                </a:solidFill>
+              </a:defRPr>
+            </a:lvl5pPr>
+          </a:lstStyle>
+          <a:p>
+            <a:pPr lvl="0"/>
+            <a:r>
+              <a:rPr lang="es-MX"/>
+              <a:t>Haga clic para modificar los estilos de texto del patrón</a:t>
+            </a:r>
+          </a:p>
+          <a:p>
+            <a:pPr lvl="1"/>
+            <a:r>
+              <a:rPr lang="es-MX"/>
+              <a:t>Segundo nivel</a:t>
+            </a:r>
+          </a:p>
+          <a:p>
+            <a:pPr lvl="2"/>
+            <a:r>
+              <a:rPr lang="es-MX"/>
+              <a:t>Tercer nivel</a:t>
+            </a:r>
+          </a:p>
+          <a:p>
+            <a:pPr lvl="3"/>
+            <a:r>
+              <a:rPr lang="es-MX"/>
+              <a:t>Cuarto nivel</a:t>
+            </a:r>
+          </a:p>
+          <a:p>
+            <a:pPr lvl="4"/>
+            <a:r>
+              <a:rPr lang="es-MX"/>
+              <a:t>Quinto nivel</a:t>
+            </a:r>
+            <a:endParaRPr lang="es-PE"/>
+          </a:p>
+        </p:txBody>
+      </p:sp>
+      <p:pic>
+        <p:nvPicPr>
+          <p:cNvPr id="4" name="Imagen 14">
+            <a:extLst>
+              <a:ext uri="{FF2B5EF4-FFF2-40B4-BE49-F238E27FC236}">
+                <a16:creationId xmlns:a16="http://schemas.microsoft.com/office/drawing/2014/main" id="{F5C15CB2-116C-62AB-DF69-FA295C9B465B}"/>
+              </a:ext>
+            </a:extLst>
+          </p:cNvPr>
+          <p:cNvPicPr>
+            <a:picLocks noChangeAspect="1"/>
+          </p:cNvPicPr>
+          <p:nvPr userDrawn="1"/>
+        </p:nvPicPr>
+        <p:blipFill>
+          <a:blip r:embed="rId3"/>
+          <a:stretch>
+            <a:fillRect/>
+          </a:stretch>
+        </p:blipFill>
+        <p:spPr>
+          <a:xfrm>
+            <a:off x="4842669" y="2193692"/>
+            <a:ext cx="2506662" cy="2506662"/>
+          </a:xfrm>
+          <a:prstGeom prst="rect">
+            <a:avLst/>
+          </a:prstGeom>
+        </p:spPr>
+      </p:pic>
+      <p:sp>
+        <p:nvSpPr>
+          <p:cNvPr id="5" name="Place holder 2">
+            <a:extLst>
+              <a:ext uri="{FF2B5EF4-FFF2-40B4-BE49-F238E27FC236}">
+                <a16:creationId xmlns:a16="http://schemas.microsoft.com/office/drawing/2014/main" id="{79837775-7BC6-2849-10D0-C24A5339D1C6}"/>
+              </a:ext>
+            </a:extLst>
+          </p:cNvPr>
+          <p:cNvSpPr>
+            <a:spLocks noGrp="1"/>
+          </p:cNvSpPr>
+          <p:nvPr>
+            <p:ph sz="half" idx="11"/>
+          </p:nvPr>
+        </p:nvSpPr>
+        <p:spPr>
+          <a:xfrm>
+            <a:off x="7538720" y="1300480"/>
+            <a:ext cx="4297680" cy="4876483"/>
+          </a:xfrm>
+        </p:spPr>
+        <p:txBody>
+          <a:bodyPr/>
+          <a:lstStyle>
+            <a:lvl1pPr>
+              <a:defRPr>
+                <a:solidFill>
+                  <a:srgbClr val="F2F2F2"/>
+                </a:solidFill>
+              </a:defRPr>
+            </a:lvl1pPr>
+            <a:lvl2pPr>
+              <a:defRPr>
+                <a:solidFill>
+                  <a:srgbClr val="F2F2F2"/>
+                </a:solidFill>
+              </a:defRPr>
+            </a:lvl2pPr>
+            <a:lvl3pPr>
+              <a:defRPr>
+                <a:solidFill>
+                  <a:srgbClr val="F2F2F2"/>
+                </a:solidFill>
+              </a:defRPr>
+            </a:lvl3pPr>
+            <a:lvl4pPr>
+              <a:defRPr>
+                <a:solidFill>
+                  <a:srgbClr val="F2F2F2"/>
+                </a:solidFill>
+              </a:defRPr>
+            </a:lvl4pPr>
+            <a:lvl5pPr>
+              <a:defRPr>
+                <a:solidFill>
+                  <a:srgbClr val="F2F2F2"/>
+                </a:solidFill>
+              </a:defRPr>
+            </a:lvl5pPr>
+          </a:lstStyle>
+          <a:p>
+            <a:pPr lvl="0"/>
+            <a:r>
+              <a:rPr lang="es-MX"/>
+              <a:t>Haga clic para modificar los estilos de texto del patrón</a:t>
+            </a:r>
+          </a:p>
+          <a:p>
+            <a:pPr lvl="1"/>
+            <a:r>
+              <a:rPr lang="es-MX"/>
+              <a:t>Segundo nivel</a:t>
+            </a:r>
+          </a:p>
+          <a:p>
+            <a:pPr lvl="2"/>
+            <a:r>
+              <a:rPr lang="es-MX"/>
+              <a:t>Tercer nivel</a:t>
+            </a:r>
+          </a:p>
+          <a:p>
+            <a:pPr lvl="3"/>
+            <a:r>
+              <a:rPr lang="es-MX"/>
+              <a:t>Cuarto nivel</a:t>
+            </a:r>
+          </a:p>
+          <a:p>
+            <a:pPr lvl="4"/>
+            <a:r>
+              <a:rPr lang="es-MX"/>
+              <a:t>Quinto nivel</a:t>
+            </a:r>
+            <a:endParaRPr lang="es-PE"/>
+          </a:p>
+        </p:txBody>
+      </p:sp>
+    </p:spTree>
+    <p:extLst>
+      <p:ext uri="{BB962C8B-B14F-4D97-AF65-F5344CB8AC3E}">
+        <p14:creationId xmlns:p14="http://schemas.microsoft.com/office/powerpoint/2010/main" val="1059164739"/>
+      </p:ext>
+    </p:extLst>
+  </p:cSld>
+  <p:clrMapOvr>
+    <a:masterClrMapping/>
+  </p:clrMapOvr>
+  <p:extLst>
+    <p:ext uri="{DCECCB84-F9BA-43D5-87BE-67443E8EF086}">
+      <p15:sldGuideLst xmlns:p15="http://schemas.microsoft.com/office/powerpoint/2012/main">
+        <p15:guide id="1" orient="horz" pos="4088">
+          <p15:clr>
+            <a:srgbClr val="FBAE40"/>
+          </p15:clr>
+        </p15:guide>
+        <p15:guide id="2" pos="7446">
+          <p15:clr>
+            <a:srgbClr val="FBAE40"/>
+          </p15:clr>
+        </p15:guide>
+      </p15:sldGuideLst>
+    </p:ext>
+  </p:extLst>
+</p:sldLayout>
+</file>
+
+<file path=ppt/slideLayouts/slideLayout11.xml><?xml version="1.0" encoding="utf-8"?>
 <p:sldLayout xmlns:a="http://schemas.openxmlformats.org/drawingml/2006/main" xmlns:r="http://schemas.openxmlformats.org/officeDocument/2006/relationships" xmlns:p="http://schemas.openxmlformats.org/presentationml/2006/main" matchingName="Título y objetos" preserve="1" userDrawn="1">
   <p:cSld name="Title and Content">
     <p:bg>
@@ -1619,7 +2291,7 @@
 </p:sldLayout>
 </file>
 
-<file path=ppt/slideLayouts/slideLayout11.xml><?xml version="1.0" encoding="utf-8"?>
+<file path=ppt/slideLayouts/slideLayout12.xml><?xml version="1.0" encoding="utf-8"?>
 <p:sldLayout xmlns:a="http://schemas.openxmlformats.org/drawingml/2006/main" xmlns:r="http://schemas.openxmlformats.org/officeDocument/2006/relationships" xmlns:p="http://schemas.openxmlformats.org/presentationml/2006/main" matchingName="ubicacion1" preserve="1" userDrawn="1">
   <p:cSld name="1_ubicacion1">
     <p:spTree>
@@ -2686,7 +3358,7 @@
         </p:blipFill>
         <p:spPr>
           <a:xfrm>
-            <a:off x="10088216" y="168765"/>
+            <a:off x="10088216" y="168766"/>
             <a:ext cx="1927827" cy="846037"/>
           </a:xfrm>
           <a:prstGeom prst="rect">
@@ -2734,10 +3406,10 @@
       </p:sp>
       <p:sp>
         <p:nvSpPr>
-          <p:cNvPr id="9" name="Text Placeholder 8">
+          <p:cNvPr id="4" name="Text Placeholder 3">
             <a:extLst>
               <a:ext uri="{FF2B5EF4-FFF2-40B4-BE49-F238E27FC236}">
-                <a16:creationId xmlns:a16="http://schemas.microsoft.com/office/drawing/2014/main" id="{77019717-3B0F-2B2C-CFD0-682D85776B1C}"/>
+                <a16:creationId xmlns:a16="http://schemas.microsoft.com/office/drawing/2014/main" id="{7F88E7A4-05C3-50CF-1083-330AAF17F153}"/>
               </a:ext>
             </a:extLst>
           </p:cNvPr>
@@ -2745,43 +3417,39 @@
             <a:spLocks noGrp="1"/>
           </p:cNvSpPr>
           <p:nvPr>
-            <p:ph type="body" sz="quarter" idx="12" hasCustomPrompt="1"/>
+            <p:ph type="body" sz="quarter" idx="14"/>
           </p:nvPr>
         </p:nvSpPr>
         <p:spPr>
           <a:xfrm>
-            <a:off x="175957" y="6342354"/>
-            <a:ext cx="4515787" cy="371431"/>
+            <a:off x="175957" y="6327467"/>
+            <a:ext cx="2934991" cy="334572"/>
           </a:xfrm>
         </p:spPr>
         <p:txBody>
-          <a:bodyPr anchor="ctr" anchorCtr="0">
-            <a:normAutofit/>
+          <a:bodyPr lIns="90000" anchor="ctr" anchorCtr="0">
+            <a:noAutofit/>
           </a:bodyPr>
           <a:lstStyle>
-            <a:lvl2pPr algn="l">
-              <a:defRPr sz="1100" b="1">
-                <a:solidFill>
-                  <a:srgbClr val="002060"/>
-                </a:solidFill>
-              </a:defRPr>
-            </a:lvl2pPr>
+            <a:lvl1pPr algn="l">
+              <a:defRPr sz="1400"/>
+            </a:lvl1pPr>
           </a:lstStyle>
           <a:p>
-            <a:pPr lvl="1"/>
+            <a:pPr lvl="0"/>
             <a:r>
               <a:rPr lang="en-US" dirty="0"/>
-              <a:t>Second level</a:t>
+              <a:t>Click to edit Master text styles</a:t>
             </a:r>
           </a:p>
         </p:txBody>
       </p:sp>
       <p:sp>
         <p:nvSpPr>
-          <p:cNvPr id="10" name="Text Placeholder 8">
+          <p:cNvPr id="5" name="Text Placeholder 3">
             <a:extLst>
               <a:ext uri="{FF2B5EF4-FFF2-40B4-BE49-F238E27FC236}">
-                <a16:creationId xmlns:a16="http://schemas.microsoft.com/office/drawing/2014/main" id="{70766E7F-B4DE-2943-B31B-5B28DBEB14BC}"/>
+                <a16:creationId xmlns:a16="http://schemas.microsoft.com/office/drawing/2014/main" id="{3D5B4322-3F63-D11D-E929-B96FF27027F4}"/>
               </a:ext>
             </a:extLst>
           </p:cNvPr>
@@ -2789,33 +3457,29 @@
             <a:spLocks noGrp="1"/>
           </p:cNvSpPr>
           <p:nvPr>
-            <p:ph type="body" sz="quarter" idx="13" hasCustomPrompt="1"/>
+            <p:ph type="body" sz="quarter" idx="15"/>
           </p:nvPr>
         </p:nvSpPr>
         <p:spPr>
           <a:xfrm>
-            <a:off x="7663118" y="6360033"/>
-            <a:ext cx="4352925" cy="371431"/>
+            <a:off x="8656983" y="6327467"/>
+            <a:ext cx="3359062" cy="334572"/>
           </a:xfrm>
         </p:spPr>
         <p:txBody>
-          <a:bodyPr anchor="ctr" anchorCtr="0">
-            <a:normAutofit/>
+          <a:bodyPr lIns="90000" anchor="ctr" anchorCtr="0">
+            <a:noAutofit/>
           </a:bodyPr>
           <a:lstStyle>
-            <a:lvl2pPr algn="r">
-              <a:defRPr sz="1100" b="1">
-                <a:solidFill>
-                  <a:srgbClr val="002060"/>
-                </a:solidFill>
-              </a:defRPr>
-            </a:lvl2pPr>
+            <a:lvl1pPr algn="r">
+              <a:defRPr sz="1400"/>
+            </a:lvl1pPr>
           </a:lstStyle>
           <a:p>
-            <a:pPr lvl="1"/>
+            <a:pPr lvl="0"/>
             <a:r>
               <a:rPr lang="en-US" dirty="0"/>
-              <a:t>Second level</a:t>
+              <a:t>Click to edit Master text styles</a:t>
             </a:r>
           </a:p>
         </p:txBody>
@@ -2834,6 +3498,295 @@
 </file>
 
 <file path=ppt/slideLayouts/slideLayout4.xml><?xml version="1.0" encoding="utf-8"?>
+<p:sldLayout xmlns:a="http://schemas.openxmlformats.org/drawingml/2006/main" xmlns:r="http://schemas.openxmlformats.org/officeDocument/2006/relationships" xmlns:p="http://schemas.openxmlformats.org/presentationml/2006/main" preserve="1" userDrawn="1">
+  <p:cSld name="Graficos2">
+    <p:spTree>
+      <p:nvGrpSpPr>
+        <p:cNvPr id="1" name=""/>
+        <p:cNvGrpSpPr/>
+        <p:nvPr/>
+      </p:nvGrpSpPr>
+      <p:grpSpPr>
+        <a:xfrm>
+          <a:off x="0" y="0"/>
+          <a:ext cx="0" cy="0"/>
+          <a:chOff x="0" y="0"/>
+          <a:chExt cx="0" cy="0"/>
+        </a:xfrm>
+      </p:grpSpPr>
+      <p:sp>
+        <p:nvSpPr>
+          <p:cNvPr id="2" name="Title 1">
+            <a:extLst>
+              <a:ext uri="{FF2B5EF4-FFF2-40B4-BE49-F238E27FC236}">
+                <a16:creationId xmlns:a16="http://schemas.microsoft.com/office/drawing/2014/main" id="{E161B1F1-83C7-C3F7-BF29-A7102FCCB32B}"/>
+              </a:ext>
+            </a:extLst>
+          </p:cNvPr>
+          <p:cNvSpPr>
+            <a:spLocks noGrp="1"/>
+          </p:cNvSpPr>
+          <p:nvPr>
+            <p:ph type="title"/>
+          </p:nvPr>
+        </p:nvSpPr>
+        <p:spPr>
+          <a:xfrm>
+            <a:off x="318051" y="228601"/>
+            <a:ext cx="9730221" cy="994517"/>
+          </a:xfrm>
+        </p:spPr>
+        <p:txBody>
+          <a:bodyPr/>
+          <a:lstStyle/>
+          <a:p>
+            <a:r>
+              <a:rPr lang="en-US" dirty="0"/>
+              <a:t>Click to edit Master title style</a:t>
+            </a:r>
+            <a:endParaRPr lang="en-PE" dirty="0"/>
+          </a:p>
+        </p:txBody>
+      </p:sp>
+      <p:pic>
+        <p:nvPicPr>
+          <p:cNvPr id="6" name="Google Shape;66;p47">
+            <a:extLst>
+              <a:ext uri="{FF2B5EF4-FFF2-40B4-BE49-F238E27FC236}">
+                <a16:creationId xmlns:a16="http://schemas.microsoft.com/office/drawing/2014/main" id="{323E205B-F311-E78C-D6A8-0122851FE66D}"/>
+              </a:ext>
+            </a:extLst>
+          </p:cNvPr>
+          <p:cNvPicPr preferRelativeResize="0"/>
+          <p:nvPr userDrawn="1"/>
+        </p:nvPicPr>
+        <p:blipFill rotWithShape="1">
+          <a:blip r:embed="rId2">
+            <a:alphaModFix/>
+          </a:blip>
+          <a:srcRect t="29471" b="26643"/>
+          <a:stretch/>
+        </p:blipFill>
+        <p:spPr>
+          <a:xfrm>
+            <a:off x="10048273" y="377081"/>
+            <a:ext cx="1927827" cy="846037"/>
+          </a:xfrm>
+          <a:prstGeom prst="rect">
+            <a:avLst/>
+          </a:prstGeom>
+          <a:noFill/>
+          <a:ln>
+            <a:noFill/>
+          </a:ln>
+        </p:spPr>
+      </p:pic>
+      <p:sp>
+        <p:nvSpPr>
+          <p:cNvPr id="8" name="Picture Placeholder 7">
+            <a:extLst>
+              <a:ext uri="{FF2B5EF4-FFF2-40B4-BE49-F238E27FC236}">
+                <a16:creationId xmlns:a16="http://schemas.microsoft.com/office/drawing/2014/main" id="{0FB415E7-8491-13B2-0A7D-52BF25F1EA60}"/>
+              </a:ext>
+            </a:extLst>
+          </p:cNvPr>
+          <p:cNvSpPr>
+            <a:spLocks noGrp="1"/>
+          </p:cNvSpPr>
+          <p:nvPr>
+            <p:ph type="pic" sz="quarter" idx="10"/>
+          </p:nvPr>
+        </p:nvSpPr>
+        <p:spPr>
+          <a:xfrm>
+            <a:off x="317500" y="1371598"/>
+            <a:ext cx="11658600" cy="4860238"/>
+          </a:xfrm>
+        </p:spPr>
+        <p:txBody>
+          <a:bodyPr/>
+          <a:lstStyle/>
+          <a:p>
+            <a:endParaRPr lang="en-PE"/>
+          </a:p>
+        </p:txBody>
+      </p:sp>
+      <p:sp>
+        <p:nvSpPr>
+          <p:cNvPr id="10" name="Text Placeholder 9">
+            <a:extLst>
+              <a:ext uri="{FF2B5EF4-FFF2-40B4-BE49-F238E27FC236}">
+                <a16:creationId xmlns:a16="http://schemas.microsoft.com/office/drawing/2014/main" id="{F97A4842-2728-8D6A-D2DE-B6E2062C5B64}"/>
+              </a:ext>
+            </a:extLst>
+          </p:cNvPr>
+          <p:cNvSpPr>
+            <a:spLocks noGrp="1"/>
+          </p:cNvSpPr>
+          <p:nvPr>
+            <p:ph type="body" sz="quarter" idx="11"/>
+          </p:nvPr>
+        </p:nvSpPr>
+        <p:spPr>
+          <a:xfrm>
+            <a:off x="317500" y="6340475"/>
+            <a:ext cx="4503738" cy="398463"/>
+          </a:xfrm>
+        </p:spPr>
+        <p:txBody>
+          <a:bodyPr>
+            <a:noAutofit/>
+          </a:bodyPr>
+          <a:lstStyle>
+            <a:lvl1pPr>
+              <a:defRPr sz="1400"/>
+            </a:lvl1pPr>
+            <a:lvl2pPr>
+              <a:defRPr sz="1100"/>
+            </a:lvl2pPr>
+            <a:lvl3pPr>
+              <a:defRPr sz="1100"/>
+            </a:lvl3pPr>
+            <a:lvl4pPr>
+              <a:defRPr sz="1100"/>
+            </a:lvl4pPr>
+            <a:lvl5pPr>
+              <a:defRPr sz="1100"/>
+            </a:lvl5pPr>
+          </a:lstStyle>
+          <a:p>
+            <a:pPr lvl="0"/>
+            <a:r>
+              <a:rPr lang="en-US"/>
+              <a:t>Click to edit Master text styles</a:t>
+            </a:r>
+          </a:p>
+          <a:p>
+            <a:pPr lvl="1"/>
+            <a:r>
+              <a:rPr lang="en-US"/>
+              <a:t>Second level</a:t>
+            </a:r>
+          </a:p>
+          <a:p>
+            <a:pPr lvl="2"/>
+            <a:r>
+              <a:rPr lang="en-US"/>
+              <a:t>Third level</a:t>
+            </a:r>
+          </a:p>
+          <a:p>
+            <a:pPr lvl="3"/>
+            <a:r>
+              <a:rPr lang="en-US"/>
+              <a:t>Fourth level</a:t>
+            </a:r>
+          </a:p>
+          <a:p>
+            <a:pPr lvl="4"/>
+            <a:r>
+              <a:rPr lang="en-US"/>
+              <a:t>Fifth level</a:t>
+            </a:r>
+            <a:endParaRPr lang="en-PE"/>
+          </a:p>
+        </p:txBody>
+      </p:sp>
+      <p:sp>
+        <p:nvSpPr>
+          <p:cNvPr id="11" name="Text Placeholder 9">
+            <a:extLst>
+              <a:ext uri="{FF2B5EF4-FFF2-40B4-BE49-F238E27FC236}">
+                <a16:creationId xmlns:a16="http://schemas.microsoft.com/office/drawing/2014/main" id="{6C0D5753-3F06-573C-2A52-4C7432C384AB}"/>
+              </a:ext>
+            </a:extLst>
+          </p:cNvPr>
+          <p:cNvSpPr>
+            <a:spLocks noGrp="1"/>
+          </p:cNvSpPr>
+          <p:nvPr>
+            <p:ph type="body" sz="quarter" idx="12"/>
+          </p:nvPr>
+        </p:nvSpPr>
+        <p:spPr>
+          <a:xfrm>
+            <a:off x="7472362" y="6340475"/>
+            <a:ext cx="4503738" cy="398463"/>
+          </a:xfrm>
+        </p:spPr>
+        <p:txBody>
+          <a:bodyPr>
+            <a:noAutofit/>
+          </a:bodyPr>
+          <a:lstStyle>
+            <a:lvl1pPr algn="r">
+              <a:defRPr sz="1400"/>
+            </a:lvl1pPr>
+            <a:lvl2pPr algn="r">
+              <a:defRPr sz="1100"/>
+            </a:lvl2pPr>
+            <a:lvl3pPr algn="r">
+              <a:defRPr sz="1100"/>
+            </a:lvl3pPr>
+            <a:lvl4pPr algn="r">
+              <a:defRPr sz="1100"/>
+            </a:lvl4pPr>
+            <a:lvl5pPr algn="r">
+              <a:defRPr sz="1100"/>
+            </a:lvl5pPr>
+          </a:lstStyle>
+          <a:p>
+            <a:pPr lvl="0"/>
+            <a:r>
+              <a:rPr lang="en-US"/>
+              <a:t>Click to edit Master text styles</a:t>
+            </a:r>
+          </a:p>
+          <a:p>
+            <a:pPr lvl="1"/>
+            <a:r>
+              <a:rPr lang="en-US"/>
+              <a:t>Second level</a:t>
+            </a:r>
+          </a:p>
+          <a:p>
+            <a:pPr lvl="2"/>
+            <a:r>
+              <a:rPr lang="en-US"/>
+              <a:t>Third level</a:t>
+            </a:r>
+          </a:p>
+          <a:p>
+            <a:pPr lvl="3"/>
+            <a:r>
+              <a:rPr lang="en-US"/>
+              <a:t>Fourth level</a:t>
+            </a:r>
+          </a:p>
+          <a:p>
+            <a:pPr lvl="4"/>
+            <a:r>
+              <a:rPr lang="en-US"/>
+              <a:t>Fifth level</a:t>
+            </a:r>
+            <a:endParaRPr lang="en-PE"/>
+          </a:p>
+        </p:txBody>
+      </p:sp>
+    </p:spTree>
+    <p:extLst>
+      <p:ext uri="{BB962C8B-B14F-4D97-AF65-F5344CB8AC3E}">
+        <p14:creationId xmlns:p14="http://schemas.microsoft.com/office/powerpoint/2010/main" val="3015644538"/>
+      </p:ext>
+    </p:extLst>
+  </p:cSld>
+  <p:clrMapOvr>
+    <a:masterClrMapping/>
+  </p:clrMapOvr>
+</p:sldLayout>
+</file>
+
+<file path=ppt/slideLayouts/slideLayout5.xml><?xml version="1.0" encoding="utf-8"?>
 <p:sldLayout xmlns:a="http://schemas.openxmlformats.org/drawingml/2006/main" xmlns:r="http://schemas.openxmlformats.org/officeDocument/2006/relationships" xmlns:p="http://schemas.openxmlformats.org/presentationml/2006/main" showMasterSp="0" matchingName="Contraportada" preserve="1">
   <p:cSld name="Contraportada">
     <p:spTree>
@@ -5894,7 +6847,7 @@
 </p:sldLayout>
 </file>
 
-<file path=ppt/slideLayouts/slideLayout5.xml><?xml version="1.0" encoding="utf-8"?>
+<file path=ppt/slideLayouts/slideLayout6.xml><?xml version="1.0" encoding="utf-8"?>
 <p:sldLayout xmlns:a="http://schemas.openxmlformats.org/drawingml/2006/main" xmlns:r="http://schemas.openxmlformats.org/officeDocument/2006/relationships" xmlns:p="http://schemas.openxmlformats.org/presentationml/2006/main" matchingName="3_Índice" preserve="1" userDrawn="1">
   <p:cSld name="Index">
     <p:bg>
@@ -10810,7 +11763,7 @@
 </p:sldLayout>
 </file>
 
-<file path=ppt/slideLayouts/slideLayout6.xml><?xml version="1.0" encoding="utf-8"?>
+<file path=ppt/slideLayouts/slideLayout7.xml><?xml version="1.0" encoding="utf-8"?>
 <p:sldLayout xmlns:a="http://schemas.openxmlformats.org/drawingml/2006/main" xmlns:r="http://schemas.openxmlformats.org/officeDocument/2006/relationships" xmlns:p="http://schemas.openxmlformats.org/presentationml/2006/main" preserve="1" userDrawn="1">
   <p:cSld name="Content with Caption">
     <p:spTree>
@@ -11391,7 +12344,7 @@
 </p:sldLayout>
 </file>
 
-<file path=ppt/slideLayouts/slideLayout7.xml><?xml version="1.0" encoding="utf-8"?>
+<file path=ppt/slideLayouts/slideLayout8.xml><?xml version="1.0" encoding="utf-8"?>
 <p:sldLayout xmlns:a="http://schemas.openxmlformats.org/drawingml/2006/main" xmlns:r="http://schemas.openxmlformats.org/officeDocument/2006/relationships" xmlns:p="http://schemas.openxmlformats.org/presentationml/2006/main" matchingName="diseño contenido 3" preserve="1">
   <p:cSld name="General Objective">
     <p:spTree>
@@ -12878,7 +13831,7 @@
 </p:sldLayout>
 </file>
 
-<file path=ppt/slideLayouts/slideLayout8.xml><?xml version="1.0" encoding="utf-8"?>
+<file path=ppt/slideLayouts/slideLayout9.xml><?xml version="1.0" encoding="utf-8"?>
 <p:sldLayout xmlns:a="http://schemas.openxmlformats.org/drawingml/2006/main" xmlns:r="http://schemas.openxmlformats.org/officeDocument/2006/relationships" xmlns:p="http://schemas.openxmlformats.org/presentationml/2006/main" preserve="1" userDrawn="1">
   <p:cSld name="Comparison">
     <p:spTree>
@@ -12971,483 +13924,6 @@
 </p:sldLayout>
 </file>
 
-<file path=ppt/slideLayouts/slideLayout9.xml><?xml version="1.0" encoding="utf-8"?>
-<p:sldLayout xmlns:a="http://schemas.openxmlformats.org/drawingml/2006/main" xmlns:r="http://schemas.openxmlformats.org/officeDocument/2006/relationships" xmlns:p="http://schemas.openxmlformats.org/presentationml/2006/main" matchingName="Dos objetos" userDrawn="1">
-  <p:cSld name="Two Content">
-    <p:spTree>
-      <p:nvGrpSpPr>
-        <p:cNvPr id="1" name="Shape 84"/>
-        <p:cNvGrpSpPr/>
-        <p:nvPr/>
-      </p:nvGrpSpPr>
-      <p:grpSpPr>
-        <a:xfrm>
-          <a:off x="0" y="0"/>
-          <a:ext cx="0" cy="0"/>
-          <a:chOff x="0" y="0"/>
-          <a:chExt cx="0" cy="0"/>
-        </a:xfrm>
-      </p:grpSpPr>
-      <p:pic>
-        <p:nvPicPr>
-          <p:cNvPr id="87" name="Google Shape;87;p51"/>
-          <p:cNvPicPr preferRelativeResize="0"/>
-          <p:nvPr/>
-        </p:nvPicPr>
-        <p:blipFill rotWithShape="1">
-          <a:blip r:embed="rId2">
-            <a:alphaModFix/>
-          </a:blip>
-          <a:srcRect t="29471" b="26643"/>
-          <a:stretch/>
-        </p:blipFill>
-        <p:spPr>
-          <a:xfrm>
-            <a:off x="10088216" y="158826"/>
-            <a:ext cx="1927827" cy="846037"/>
-          </a:xfrm>
-          <a:prstGeom prst="rect">
-            <a:avLst/>
-          </a:prstGeom>
-          <a:noFill/>
-          <a:ln>
-            <a:noFill/>
-          </a:ln>
-        </p:spPr>
-      </p:pic>
-      <p:sp>
-        <p:nvSpPr>
-          <p:cNvPr id="88" name="Google Shape;88;p51"/>
-          <p:cNvSpPr txBox="1">
-            <a:spLocks noGrp="1"/>
-          </p:cNvSpPr>
-          <p:nvPr>
-            <p:ph type="title"/>
-          </p:nvPr>
-        </p:nvSpPr>
-        <p:spPr>
-          <a:xfrm>
-            <a:off x="461464" y="338268"/>
-            <a:ext cx="9626752" cy="666595"/>
-          </a:xfrm>
-          <a:prstGeom prst="rect">
-            <a:avLst/>
-          </a:prstGeom>
-          <a:noFill/>
-          <a:ln>
-            <a:noFill/>
-          </a:ln>
-        </p:spPr>
-        <p:txBody>
-          <a:bodyPr spcFirstLastPara="1" wrap="square" lIns="91425" tIns="45700" rIns="91425" bIns="45700" anchor="ctr" anchorCtr="0">
-            <a:normAutofit/>
-          </a:bodyPr>
-          <a:lstStyle>
-            <a:lvl1pPr lvl="0" algn="l">
-              <a:lnSpc>
-                <a:spcPct val="90000"/>
-              </a:lnSpc>
-              <a:spcBef>
-                <a:spcPts val="0"/>
-              </a:spcBef>
-              <a:spcAft>
-                <a:spcPts val="0"/>
-              </a:spcAft>
-              <a:buClr>
-                <a:srgbClr val="DA4C4C"/>
-              </a:buClr>
-              <a:buSzPts val="2400"/>
-              <a:buFont typeface="Arial"/>
-              <a:buNone/>
-              <a:defRPr sz="2400" b="1" cap="none">
-                <a:solidFill>
-                  <a:srgbClr val="DA4C4C"/>
-                </a:solidFill>
-                <a:latin typeface="Arial"/>
-                <a:ea typeface="Arial"/>
-                <a:cs typeface="Arial"/>
-                <a:sym typeface="Arial"/>
-              </a:defRPr>
-            </a:lvl1pPr>
-            <a:lvl2pPr lvl="1" algn="l">
-              <a:lnSpc>
-                <a:spcPct val="100000"/>
-              </a:lnSpc>
-              <a:spcBef>
-                <a:spcPts val="0"/>
-              </a:spcBef>
-              <a:spcAft>
-                <a:spcPts val="0"/>
-              </a:spcAft>
-              <a:buSzPts val="1400"/>
-              <a:buNone/>
-              <a:defRPr/>
-            </a:lvl2pPr>
-            <a:lvl3pPr lvl="2" algn="l">
-              <a:lnSpc>
-                <a:spcPct val="100000"/>
-              </a:lnSpc>
-              <a:spcBef>
-                <a:spcPts val="0"/>
-              </a:spcBef>
-              <a:spcAft>
-                <a:spcPts val="0"/>
-              </a:spcAft>
-              <a:buSzPts val="1400"/>
-              <a:buNone/>
-              <a:defRPr/>
-            </a:lvl3pPr>
-            <a:lvl4pPr lvl="3" algn="l">
-              <a:lnSpc>
-                <a:spcPct val="100000"/>
-              </a:lnSpc>
-              <a:spcBef>
-                <a:spcPts val="0"/>
-              </a:spcBef>
-              <a:spcAft>
-                <a:spcPts val="0"/>
-              </a:spcAft>
-              <a:buSzPts val="1400"/>
-              <a:buNone/>
-              <a:defRPr/>
-            </a:lvl4pPr>
-            <a:lvl5pPr lvl="4" algn="l">
-              <a:lnSpc>
-                <a:spcPct val="100000"/>
-              </a:lnSpc>
-              <a:spcBef>
-                <a:spcPts val="0"/>
-              </a:spcBef>
-              <a:spcAft>
-                <a:spcPts val="0"/>
-              </a:spcAft>
-              <a:buSzPts val="1400"/>
-              <a:buNone/>
-              <a:defRPr/>
-            </a:lvl5pPr>
-            <a:lvl6pPr lvl="5" algn="l">
-              <a:lnSpc>
-                <a:spcPct val="100000"/>
-              </a:lnSpc>
-              <a:spcBef>
-                <a:spcPts val="0"/>
-              </a:spcBef>
-              <a:spcAft>
-                <a:spcPts val="0"/>
-              </a:spcAft>
-              <a:buSzPts val="1400"/>
-              <a:buNone/>
-              <a:defRPr/>
-            </a:lvl6pPr>
-            <a:lvl7pPr lvl="6" algn="l">
-              <a:lnSpc>
-                <a:spcPct val="100000"/>
-              </a:lnSpc>
-              <a:spcBef>
-                <a:spcPts val="0"/>
-              </a:spcBef>
-              <a:spcAft>
-                <a:spcPts val="0"/>
-              </a:spcAft>
-              <a:buSzPts val="1400"/>
-              <a:buNone/>
-              <a:defRPr/>
-            </a:lvl7pPr>
-            <a:lvl8pPr lvl="7" algn="l">
-              <a:lnSpc>
-                <a:spcPct val="100000"/>
-              </a:lnSpc>
-              <a:spcBef>
-                <a:spcPts val="0"/>
-              </a:spcBef>
-              <a:spcAft>
-                <a:spcPts val="0"/>
-              </a:spcAft>
-              <a:buSzPts val="1400"/>
-              <a:buNone/>
-              <a:defRPr/>
-            </a:lvl8pPr>
-            <a:lvl9pPr lvl="8" algn="l">
-              <a:lnSpc>
-                <a:spcPct val="100000"/>
-              </a:lnSpc>
-              <a:spcBef>
-                <a:spcPts val="0"/>
-              </a:spcBef>
-              <a:spcAft>
-                <a:spcPts val="0"/>
-              </a:spcAft>
-              <a:buSzPts val="1400"/>
-              <a:buNone/>
-              <a:defRPr/>
-            </a:lvl9pPr>
-          </a:lstStyle>
-          <a:p>
-            <a:r>
-              <a:rPr lang="es-MX"/>
-              <a:t>Haz clic para modificar el estilo de título del patrón</a:t>
-            </a:r>
-            <a:endParaRPr dirty="0"/>
-          </a:p>
-        </p:txBody>
-      </p:sp>
-      <p:sp>
-        <p:nvSpPr>
-          <p:cNvPr id="2" name="Place holder 1">
-            <a:extLst>
-              <a:ext uri="{FF2B5EF4-FFF2-40B4-BE49-F238E27FC236}">
-                <a16:creationId xmlns:a16="http://schemas.microsoft.com/office/drawing/2014/main" id="{2D673E48-04D3-F5BF-45EB-9E91DBD21B82}"/>
-              </a:ext>
-            </a:extLst>
-          </p:cNvPr>
-          <p:cNvSpPr>
-            <a:spLocks noGrp="1"/>
-          </p:cNvSpPr>
-          <p:nvPr>
-            <p:ph sz="half" idx="10"/>
-          </p:nvPr>
-        </p:nvSpPr>
-        <p:spPr>
-          <a:xfrm>
-            <a:off x="355600" y="1300480"/>
-            <a:ext cx="4297680" cy="4876483"/>
-          </a:xfrm>
-        </p:spPr>
-        <p:txBody>
-          <a:bodyPr/>
-          <a:lstStyle>
-            <a:lvl1pPr>
-              <a:defRPr>
-                <a:solidFill>
-                  <a:srgbClr val="F2F2F2"/>
-                </a:solidFill>
-              </a:defRPr>
-            </a:lvl1pPr>
-            <a:lvl2pPr>
-              <a:defRPr>
-                <a:solidFill>
-                  <a:srgbClr val="F2F2F2"/>
-                </a:solidFill>
-              </a:defRPr>
-            </a:lvl2pPr>
-            <a:lvl3pPr>
-              <a:defRPr>
-                <a:solidFill>
-                  <a:srgbClr val="F2F2F2"/>
-                </a:solidFill>
-              </a:defRPr>
-            </a:lvl3pPr>
-            <a:lvl4pPr>
-              <a:defRPr>
-                <a:solidFill>
-                  <a:srgbClr val="F2F2F2"/>
-                </a:solidFill>
-              </a:defRPr>
-            </a:lvl4pPr>
-            <a:lvl5pPr>
-              <a:defRPr>
-                <a:solidFill>
-                  <a:srgbClr val="F2F2F2"/>
-                </a:solidFill>
-              </a:defRPr>
-            </a:lvl5pPr>
-          </a:lstStyle>
-          <a:p>
-            <a:pPr lvl="0"/>
-            <a:r>
-              <a:rPr lang="es-MX"/>
-              <a:t>Haga clic para modificar los estilos de texto del patrón</a:t>
-            </a:r>
-          </a:p>
-          <a:p>
-            <a:pPr lvl="1"/>
-            <a:r>
-              <a:rPr lang="es-MX"/>
-              <a:t>Segundo nivel</a:t>
-            </a:r>
-          </a:p>
-          <a:p>
-            <a:pPr lvl="2"/>
-            <a:r>
-              <a:rPr lang="es-MX"/>
-              <a:t>Tercer nivel</a:t>
-            </a:r>
-          </a:p>
-          <a:p>
-            <a:pPr lvl="3"/>
-            <a:r>
-              <a:rPr lang="es-MX"/>
-              <a:t>Cuarto nivel</a:t>
-            </a:r>
-          </a:p>
-          <a:p>
-            <a:pPr lvl="4"/>
-            <a:r>
-              <a:rPr lang="es-MX"/>
-              <a:t>Quinto nivel</a:t>
-            </a:r>
-            <a:endParaRPr lang="es-PE"/>
-          </a:p>
-        </p:txBody>
-      </p:sp>
-      <p:pic>
-        <p:nvPicPr>
-          <p:cNvPr id="4" name="Imagen 14">
-            <a:extLst>
-              <a:ext uri="{FF2B5EF4-FFF2-40B4-BE49-F238E27FC236}">
-                <a16:creationId xmlns:a16="http://schemas.microsoft.com/office/drawing/2014/main" id="{F5C15CB2-116C-62AB-DF69-FA295C9B465B}"/>
-              </a:ext>
-            </a:extLst>
-          </p:cNvPr>
-          <p:cNvPicPr>
-            <a:picLocks noChangeAspect="1"/>
-          </p:cNvPicPr>
-          <p:nvPr userDrawn="1"/>
-        </p:nvPicPr>
-        <p:blipFill>
-          <a:blip r:embed="rId3"/>
-          <a:stretch>
-            <a:fillRect/>
-          </a:stretch>
-        </p:blipFill>
-        <p:spPr>
-          <a:xfrm>
-            <a:off x="4842669" y="2193692"/>
-            <a:ext cx="2506662" cy="2506662"/>
-          </a:xfrm>
-          <a:prstGeom prst="rect">
-            <a:avLst/>
-          </a:prstGeom>
-        </p:spPr>
-      </p:pic>
-      <p:sp>
-        <p:nvSpPr>
-          <p:cNvPr id="5" name="Place holder 2">
-            <a:extLst>
-              <a:ext uri="{FF2B5EF4-FFF2-40B4-BE49-F238E27FC236}">
-                <a16:creationId xmlns:a16="http://schemas.microsoft.com/office/drawing/2014/main" id="{79837775-7BC6-2849-10D0-C24A5339D1C6}"/>
-              </a:ext>
-            </a:extLst>
-          </p:cNvPr>
-          <p:cNvSpPr>
-            <a:spLocks noGrp="1"/>
-          </p:cNvSpPr>
-          <p:nvPr>
-            <p:ph sz="half" idx="11"/>
-          </p:nvPr>
-        </p:nvSpPr>
-        <p:spPr>
-          <a:xfrm>
-            <a:off x="7538720" y="1300480"/>
-            <a:ext cx="4297680" cy="4876483"/>
-          </a:xfrm>
-        </p:spPr>
-        <p:txBody>
-          <a:bodyPr/>
-          <a:lstStyle>
-            <a:lvl1pPr>
-              <a:defRPr>
-                <a:solidFill>
-                  <a:srgbClr val="F2F2F2"/>
-                </a:solidFill>
-              </a:defRPr>
-            </a:lvl1pPr>
-            <a:lvl2pPr>
-              <a:defRPr>
-                <a:solidFill>
-                  <a:srgbClr val="F2F2F2"/>
-                </a:solidFill>
-              </a:defRPr>
-            </a:lvl2pPr>
-            <a:lvl3pPr>
-              <a:defRPr>
-                <a:solidFill>
-                  <a:srgbClr val="F2F2F2"/>
-                </a:solidFill>
-              </a:defRPr>
-            </a:lvl3pPr>
-            <a:lvl4pPr>
-              <a:defRPr>
-                <a:solidFill>
-                  <a:srgbClr val="F2F2F2"/>
-                </a:solidFill>
-              </a:defRPr>
-            </a:lvl4pPr>
-            <a:lvl5pPr>
-              <a:defRPr>
-                <a:solidFill>
-                  <a:srgbClr val="F2F2F2"/>
-                </a:solidFill>
-              </a:defRPr>
-            </a:lvl5pPr>
-          </a:lstStyle>
-          <a:p>
-            <a:pPr lvl="0"/>
-            <a:r>
-              <a:rPr lang="es-MX"/>
-              <a:t>Haga clic para modificar los estilos de texto del patrón</a:t>
-            </a:r>
-          </a:p>
-          <a:p>
-            <a:pPr lvl="1"/>
-            <a:r>
-              <a:rPr lang="es-MX"/>
-              <a:t>Segundo nivel</a:t>
-            </a:r>
-          </a:p>
-          <a:p>
-            <a:pPr lvl="2"/>
-            <a:r>
-              <a:rPr lang="es-MX"/>
-              <a:t>Tercer nivel</a:t>
-            </a:r>
-          </a:p>
-          <a:p>
-            <a:pPr lvl="3"/>
-            <a:r>
-              <a:rPr lang="es-MX"/>
-              <a:t>Cuarto nivel</a:t>
-            </a:r>
-          </a:p>
-          <a:p>
-            <a:pPr lvl="4"/>
-            <a:r>
-              <a:rPr lang="es-MX"/>
-              <a:t>Quinto nivel</a:t>
-            </a:r>
-            <a:endParaRPr lang="es-PE"/>
-          </a:p>
-        </p:txBody>
-      </p:sp>
-    </p:spTree>
-    <p:extLst>
-      <p:ext uri="{BB962C8B-B14F-4D97-AF65-F5344CB8AC3E}">
-        <p14:creationId xmlns:p14="http://schemas.microsoft.com/office/powerpoint/2010/main" val="1059164739"/>
-      </p:ext>
-    </p:extLst>
-  </p:cSld>
-  <p:clrMapOvr>
-    <a:masterClrMapping/>
-  </p:clrMapOvr>
-  <p:extLst>
-    <p:ext uri="{DCECCB84-F9BA-43D5-87BE-67443E8EF086}">
-      <p15:sldGuideLst xmlns:p15="http://schemas.microsoft.com/office/powerpoint/2012/main">
-        <p15:guide id="1" orient="horz" pos="4088">
-          <p15:clr>
-            <a:srgbClr val="FBAE40"/>
-          </p15:clr>
-        </p15:guide>
-        <p15:guide id="2" pos="7446">
-          <p15:clr>
-            <a:srgbClr val="FBAE40"/>
-          </p15:clr>
-        </p15:guide>
-      </p15:sldGuideLst>
-    </p:ext>
-  </p:extLst>
-</p:sldLayout>
-</file>
-
 <file path=ppt/slideMasters/slideMaster1.xml><?xml version="1.0" encoding="utf-8"?>
 <p:sldMaster xmlns:a="http://schemas.openxmlformats.org/drawingml/2006/main" xmlns:r="http://schemas.openxmlformats.org/officeDocument/2006/relationships" xmlns:p="http://schemas.openxmlformats.org/presentationml/2006/main">
   <p:cSld>
@@ -14387,14 +14863,15 @@
     <p:sldLayoutId id="2147483696" r:id="rId1"/>
     <p:sldLayoutId id="2147483713" r:id="rId2"/>
     <p:sldLayoutId id="2147483714" r:id="rId3"/>
-    <p:sldLayoutId id="2147483694" r:id="rId4"/>
-    <p:sldLayoutId id="2147483692" r:id="rId5"/>
-    <p:sldLayoutId id="2147483712" r:id="rId6"/>
-    <p:sldLayoutId id="2147483693" r:id="rId7"/>
-    <p:sldLayoutId id="2147483702" r:id="rId8"/>
-    <p:sldLayoutId id="2147483682" r:id="rId9"/>
-    <p:sldLayoutId id="2147483688" r:id="rId10"/>
-    <p:sldLayoutId id="2147483703" r:id="rId11"/>
+    <p:sldLayoutId id="2147483715" r:id="rId4"/>
+    <p:sldLayoutId id="2147483694" r:id="rId5"/>
+    <p:sldLayoutId id="2147483692" r:id="rId6"/>
+    <p:sldLayoutId id="2147483712" r:id="rId7"/>
+    <p:sldLayoutId id="2147483693" r:id="rId8"/>
+    <p:sldLayoutId id="2147483702" r:id="rId9"/>
+    <p:sldLayoutId id="2147483682" r:id="rId10"/>
+    <p:sldLayoutId id="2147483688" r:id="rId11"/>
+    <p:sldLayoutId id="2147483703" r:id="rId12"/>
   </p:sldLayoutIdLst>
   <p:txStyles>
     <p:titleStyle>
@@ -15724,4 +16201,319 @@
     </a:ext>
   </a:extLst>
 </a:theme>
+</file>
+
+<file path=ppt/theme/theme3.xml><?xml version="1.0" encoding="utf-8"?>
+<a:theme xmlns:a="http://schemas.openxmlformats.org/drawingml/2006/main" name="Office Theme">
+  <a:themeElements>
+    <a:clrScheme name="Office">
+      <a:dk1>
+        <a:sysClr val="windowText" lastClr="000000"/>
+      </a:dk1>
+      <a:lt1>
+        <a:sysClr val="window" lastClr="FFFFFF"/>
+      </a:lt1>
+      <a:dk2>
+        <a:srgbClr val="0E2841"/>
+      </a:dk2>
+      <a:lt2>
+        <a:srgbClr val="E8E8E8"/>
+      </a:lt2>
+      <a:accent1>
+        <a:srgbClr val="156082"/>
+      </a:accent1>
+      <a:accent2>
+        <a:srgbClr val="E97132"/>
+      </a:accent2>
+      <a:accent3>
+        <a:srgbClr val="196B24"/>
+      </a:accent3>
+      <a:accent4>
+        <a:srgbClr val="0F9ED5"/>
+      </a:accent4>
+      <a:accent5>
+        <a:srgbClr val="A02B93"/>
+      </a:accent5>
+      <a:accent6>
+        <a:srgbClr val="4EA72E"/>
+      </a:accent6>
+      <a:hlink>
+        <a:srgbClr val="467886"/>
+      </a:hlink>
+      <a:folHlink>
+        <a:srgbClr val="96607D"/>
+      </a:folHlink>
+    </a:clrScheme>
+    <a:fontScheme name="Office">
+      <a:majorFont>
+        <a:latin typeface="Aptos Display" panose="02110004020202020204"/>
+        <a:ea typeface=""/>
+        <a:cs typeface=""/>
+        <a:font script="Jpan" typeface="游ゴシック Light"/>
+        <a:font script="Hang" typeface="맑은 고딕"/>
+        <a:font script="Hans" typeface="等线 Light"/>
+        <a:font script="Hant" typeface="新細明體"/>
+        <a:font script="Arab" typeface="Times New Roman"/>
+        <a:font script="Hebr" typeface="Times New Roman"/>
+        <a:font script="Thai" typeface="Angsana New"/>
+        <a:font script="Ethi" typeface="Nyala"/>
+        <a:font script="Beng" typeface="Vrinda"/>
+        <a:font script="Gujr" typeface="Shruti"/>
+        <a:font script="Khmr" typeface="MoolBoran"/>
+        <a:font script="Knda" typeface="Tunga"/>
+        <a:font script="Guru" typeface="Raavi"/>
+        <a:font script="Cans" typeface="Euphemia"/>
+        <a:font script="Cher" typeface="Plantagenet Cherokee"/>
+        <a:font script="Yiii" typeface="Microsoft Yi Baiti"/>
+        <a:font script="Tibt" typeface="Microsoft Himalaya"/>
+        <a:font script="Thaa" typeface="MV Boli"/>
+        <a:font script="Deva" typeface="Mangal"/>
+        <a:font script="Telu" typeface="Gautami"/>
+        <a:font script="Taml" typeface="Latha"/>
+        <a:font script="Syrc" typeface="Estrangelo Edessa"/>
+        <a:font script="Orya" typeface="Kalinga"/>
+        <a:font script="Mlym" typeface="Kartika"/>
+        <a:font script="Laoo" typeface="DokChampa"/>
+        <a:font script="Sinh" typeface="Iskoola Pota"/>
+        <a:font script="Mong" typeface="Mongolian Baiti"/>
+        <a:font script="Viet" typeface="Times New Roman"/>
+        <a:font script="Uigh" typeface="Microsoft Uighur"/>
+        <a:font script="Geor" typeface="Sylfaen"/>
+        <a:font script="Armn" typeface="Arial"/>
+        <a:font script="Bugi" typeface="Leelawadee UI"/>
+        <a:font script="Bopo" typeface="Microsoft JhengHei"/>
+        <a:font script="Java" typeface="Javanese Text"/>
+        <a:font script="Lisu" typeface="Segoe UI"/>
+        <a:font script="Mymr" typeface="Myanmar Text"/>
+        <a:font script="Nkoo" typeface="Ebrima"/>
+        <a:font script="Olck" typeface="Nirmala UI"/>
+        <a:font script="Osma" typeface="Ebrima"/>
+        <a:font script="Phag" typeface="Phagspa"/>
+        <a:font script="Syrn" typeface="Estrangelo Edessa"/>
+        <a:font script="Syrj" typeface="Estrangelo Edessa"/>
+        <a:font script="Syre" typeface="Estrangelo Edessa"/>
+        <a:font script="Sora" typeface="Nirmala UI"/>
+        <a:font script="Tale" typeface="Microsoft Tai Le"/>
+        <a:font script="Talu" typeface="Microsoft New Tai Lue"/>
+        <a:font script="Tfng" typeface="Ebrima"/>
+      </a:majorFont>
+      <a:minorFont>
+        <a:latin typeface="Aptos" panose="02110004020202020204"/>
+        <a:ea typeface=""/>
+        <a:cs typeface=""/>
+        <a:font script="Jpan" typeface="游ゴシック"/>
+        <a:font script="Hang" typeface="맑은 고딕"/>
+        <a:font script="Hans" typeface="等线"/>
+        <a:font script="Hant" typeface="新細明體"/>
+        <a:font script="Arab" typeface="Arial"/>
+        <a:font script="Hebr" typeface="Arial"/>
+        <a:font script="Thai" typeface="Cordia New"/>
+        <a:font script="Ethi" typeface="Nyala"/>
+        <a:font script="Beng" typeface="Vrinda"/>
+        <a:font script="Gujr" typeface="Shruti"/>
+        <a:font script="Khmr" typeface="DaunPenh"/>
+        <a:font script="Knda" typeface="Tunga"/>
+        <a:font script="Guru" typeface="Raavi"/>
+        <a:font script="Cans" typeface="Euphemia"/>
+        <a:font script="Cher" typeface="Plantagenet Cherokee"/>
+        <a:font script="Yiii" typeface="Microsoft Yi Baiti"/>
+        <a:font script="Tibt" typeface="Microsoft Himalaya"/>
+        <a:font script="Thaa" typeface="MV Boli"/>
+        <a:font script="Deva" typeface="Mangal"/>
+        <a:font script="Telu" typeface="Gautami"/>
+        <a:font script="Taml" typeface="Latha"/>
+        <a:font script="Syrc" typeface="Estrangelo Edessa"/>
+        <a:font script="Orya" typeface="Kalinga"/>
+        <a:font script="Mlym" typeface="Kartika"/>
+        <a:font script="Laoo" typeface="DokChampa"/>
+        <a:font script="Sinh" typeface="Iskoola Pota"/>
+        <a:font script="Mong" typeface="Mongolian Baiti"/>
+        <a:font script="Viet" typeface="Arial"/>
+        <a:font script="Uigh" typeface="Microsoft Uighur"/>
+        <a:font script="Geor" typeface="Sylfaen"/>
+        <a:font script="Armn" typeface="Arial"/>
+        <a:font script="Bugi" typeface="Leelawadee UI"/>
+        <a:font script="Bopo" typeface="Microsoft JhengHei"/>
+        <a:font script="Java" typeface="Javanese Text"/>
+        <a:font script="Lisu" typeface="Segoe UI"/>
+        <a:font script="Mymr" typeface="Myanmar Text"/>
+        <a:font script="Nkoo" typeface="Ebrima"/>
+        <a:font script="Olck" typeface="Nirmala UI"/>
+        <a:font script="Osma" typeface="Ebrima"/>
+        <a:font script="Phag" typeface="Phagspa"/>
+        <a:font script="Syrn" typeface="Estrangelo Edessa"/>
+        <a:font script="Syrj" typeface="Estrangelo Edessa"/>
+        <a:font script="Syre" typeface="Estrangelo Edessa"/>
+        <a:font script="Sora" typeface="Nirmala UI"/>
+        <a:font script="Tale" typeface="Microsoft Tai Le"/>
+        <a:font script="Talu" typeface="Microsoft New Tai Lue"/>
+        <a:font script="Tfng" typeface="Ebrima"/>
+      </a:minorFont>
+    </a:fontScheme>
+    <a:fmtScheme name="Office">
+      <a:fillStyleLst>
+        <a:solidFill>
+          <a:schemeClr val="phClr"/>
+        </a:solidFill>
+        <a:gradFill rotWithShape="1">
+          <a:gsLst>
+            <a:gs pos="0">
+              <a:schemeClr val="phClr">
+                <a:lumMod val="110000"/>
+                <a:satMod val="105000"/>
+                <a:tint val="67000"/>
+              </a:schemeClr>
+            </a:gs>
+            <a:gs pos="50000">
+              <a:schemeClr val="phClr">
+                <a:lumMod val="105000"/>
+                <a:satMod val="103000"/>
+                <a:tint val="73000"/>
+              </a:schemeClr>
+            </a:gs>
+            <a:gs pos="100000">
+              <a:schemeClr val="phClr">
+                <a:lumMod val="105000"/>
+                <a:satMod val="109000"/>
+                <a:tint val="81000"/>
+              </a:schemeClr>
+            </a:gs>
+          </a:gsLst>
+          <a:lin ang="5400000" scaled="0"/>
+        </a:gradFill>
+        <a:gradFill rotWithShape="1">
+          <a:gsLst>
+            <a:gs pos="0">
+              <a:schemeClr val="phClr">
+                <a:satMod val="103000"/>
+                <a:lumMod val="102000"/>
+                <a:tint val="94000"/>
+              </a:schemeClr>
+            </a:gs>
+            <a:gs pos="50000">
+              <a:schemeClr val="phClr">
+                <a:satMod val="110000"/>
+                <a:lumMod val="100000"/>
+                <a:shade val="100000"/>
+              </a:schemeClr>
+            </a:gs>
+            <a:gs pos="100000">
+              <a:schemeClr val="phClr">
+                <a:lumMod val="99000"/>
+                <a:satMod val="120000"/>
+                <a:shade val="78000"/>
+              </a:schemeClr>
+            </a:gs>
+          </a:gsLst>
+          <a:lin ang="5400000" scaled="0"/>
+        </a:gradFill>
+      </a:fillStyleLst>
+      <a:lnStyleLst>
+        <a:ln w="12700" cap="flat" cmpd="sng" algn="ctr">
+          <a:solidFill>
+            <a:schemeClr val="phClr"/>
+          </a:solidFill>
+          <a:prstDash val="solid"/>
+          <a:miter lim="800000"/>
+        </a:ln>
+        <a:ln w="19050" cap="flat" cmpd="sng" algn="ctr">
+          <a:solidFill>
+            <a:schemeClr val="phClr"/>
+          </a:solidFill>
+          <a:prstDash val="solid"/>
+          <a:miter lim="800000"/>
+        </a:ln>
+        <a:ln w="25400" cap="flat" cmpd="sng" algn="ctr">
+          <a:solidFill>
+            <a:schemeClr val="phClr"/>
+          </a:solidFill>
+          <a:prstDash val="solid"/>
+          <a:miter lim="800000"/>
+        </a:ln>
+      </a:lnStyleLst>
+      <a:effectStyleLst>
+        <a:effectStyle>
+          <a:effectLst/>
+        </a:effectStyle>
+        <a:effectStyle>
+          <a:effectLst/>
+        </a:effectStyle>
+        <a:effectStyle>
+          <a:effectLst>
+            <a:outerShdw blurRad="57150" dist="19050" dir="5400000" algn="ctr" rotWithShape="0">
+              <a:srgbClr val="000000">
+                <a:alpha val="63000"/>
+              </a:srgbClr>
+            </a:outerShdw>
+          </a:effectLst>
+        </a:effectStyle>
+      </a:effectStyleLst>
+      <a:bgFillStyleLst>
+        <a:solidFill>
+          <a:schemeClr val="phClr"/>
+        </a:solidFill>
+        <a:solidFill>
+          <a:schemeClr val="phClr">
+            <a:tint val="95000"/>
+            <a:satMod val="170000"/>
+          </a:schemeClr>
+        </a:solidFill>
+        <a:gradFill rotWithShape="1">
+          <a:gsLst>
+            <a:gs pos="0">
+              <a:schemeClr val="phClr">
+                <a:tint val="93000"/>
+                <a:satMod val="150000"/>
+                <a:shade val="98000"/>
+                <a:lumMod val="102000"/>
+              </a:schemeClr>
+            </a:gs>
+            <a:gs pos="50000">
+              <a:schemeClr val="phClr">
+                <a:tint val="98000"/>
+                <a:satMod val="130000"/>
+                <a:shade val="90000"/>
+                <a:lumMod val="103000"/>
+              </a:schemeClr>
+            </a:gs>
+            <a:gs pos="100000">
+              <a:schemeClr val="phClr">
+                <a:shade val="63000"/>
+                <a:satMod val="120000"/>
+              </a:schemeClr>
+            </a:gs>
+          </a:gsLst>
+          <a:lin ang="5400000" scaled="0"/>
+        </a:gradFill>
+      </a:bgFillStyleLst>
+    </a:fmtScheme>
+  </a:themeElements>
+  <a:objectDefaults>
+    <a:lnDef>
+      <a:spPr/>
+      <a:bodyPr/>
+      <a:lstStyle/>
+      <a:style>
+        <a:lnRef idx="2">
+          <a:schemeClr val="accent1"/>
+        </a:lnRef>
+        <a:fillRef idx="0">
+          <a:schemeClr val="accent1"/>
+        </a:fillRef>
+        <a:effectRef idx="1">
+          <a:schemeClr val="accent1"/>
+        </a:effectRef>
+        <a:fontRef idx="minor">
+          <a:schemeClr val="tx1"/>
+        </a:fontRef>
+      </a:style>
+    </a:lnDef>
+  </a:objectDefaults>
+  <a:extraClrSchemeLst/>
+  <a:extLst>
+    <a:ext uri="{05A4C25C-085E-4340-85A3-A5531E510DB2}">
+      <thm15:themeFamily xmlns:thm15="http://schemas.microsoft.com/office/thememl/2012/main" name="Office Theme" id="{2E142A2C-CD16-42D6-873A-C26D2A0506FA}" vid="{1BDDFF52-6CD6-40A5-AB3C-68EB2F1E4D0A}"/>
+    </a:ext>
+  </a:extLst>
+</a:theme>
 </file>
</xml_diff>

<commit_message>
Mejora en el pie de las diapositivas para reporte_ppt
</commit_message>
<xml_diff>
--- a/inst/plantillas/plantilla_16_9.pptx
+++ b/inst/plantillas/plantilla_16_9.pptx
@@ -346,7 +346,7 @@
           <a:p>
             <a:fld id="{A9DF37BE-63F7-D04E-AEC4-DC43A32AA23E}" type="datetimeFigureOut">
               <a:rPr lang="en-PE" smtClean="0"/>
-              <a:t>29/11/25</a:t>
+              <a:t>6/12/25</a:t>
             </a:fld>
             <a:endParaRPr lang="en-PE"/>
           </a:p>
@@ -523,7 +523,7 @@
           <a:p>
             <a:fld id="{EE8340E0-AD77-4043-A3C3-5BEDD4FD6B77}" type="datetimeFigureOut">
               <a:rPr lang="es-PE" smtClean="0"/>
-              <a:t>29/11/25</a:t>
+              <a:t>6/12/25</a:t>
             </a:fld>
             <a:endParaRPr lang="es-PE"/>
           </a:p>
@@ -1323,7 +1323,7 @@
                 </a:buClr>
                 <a:buSzPts val="1800"/>
               </a:pPr>
-              <a:t>29/11/25</a:t>
+              <a:t>6/12/25</a:t>
             </a:fld>
             <a:endParaRPr lang="en-PE" dirty="0"/>
           </a:p>
@@ -3325,8 +3325,8 @@
         </p:nvSpPr>
         <p:spPr>
           <a:xfrm>
-            <a:off x="175957" y="1152939"/>
-            <a:ext cx="11840086" cy="5068958"/>
+            <a:off x="288235" y="1162878"/>
+            <a:ext cx="11439939" cy="5068958"/>
           </a:xfrm>
         </p:spPr>
         <p:txBody>
@@ -3388,8 +3388,8 @@
         </p:nvSpPr>
         <p:spPr>
           <a:xfrm>
-            <a:off x="175957" y="195961"/>
-            <a:ext cx="9912259" cy="818842"/>
+            <a:off x="288235" y="195961"/>
+            <a:ext cx="9799981" cy="818842"/>
           </a:xfrm>
         </p:spPr>
         <p:txBody>
@@ -3397,10 +3397,10 @@
           <a:lstStyle/>
           <a:p>
             <a:r>
-              <a:rPr lang="en-US"/>
+              <a:rPr lang="en-US" dirty="0"/>
               <a:t>Click to edit Master title style</a:t>
             </a:r>
-            <a:endParaRPr lang="en-PE"/>
+            <a:endParaRPr lang="en-PE" dirty="0"/>
           </a:p>
         </p:txBody>
       </p:sp>
@@ -3462,7 +3462,7 @@
         </p:nvSpPr>
         <p:spPr>
           <a:xfrm>
-            <a:off x="8656983" y="6327467"/>
+            <a:off x="8408685" y="6327467"/>
             <a:ext cx="3359062" cy="334572"/>
           </a:xfrm>
         </p:spPr>
@@ -11932,7 +11932,7 @@
           <a:p>
             <a:fld id="{744CB4CB-0240-FB4C-81F1-218533927016}" type="datetimeFigureOut">
               <a:rPr lang="es-PE" smtClean="0"/>
-              <a:t>29/11/25</a:t>
+              <a:t>6/12/25</a:t>
             </a:fld>
             <a:endParaRPr lang="es-PE"/>
           </a:p>
@@ -14305,7 +14305,7 @@
           <a:p>
             <a:fld id="{75C70C58-02E6-BE4A-9320-917330A400ED}" type="datetimeFigureOut">
               <a:rPr lang="es-PE" smtClean="0"/>
-              <a:t>29/11/25</a:t>
+              <a:t>6/12/25</a:t>
             </a:fld>
             <a:endParaRPr lang="es-PE"/>
           </a:p>

</xml_diff>

<commit_message>
Nueva estilo de diapositiva y argumento pera reporte_ppt: diapositiva con dos columnas de gráficos
</commit_message>
<xml_diff>
--- a/inst/plantillas/plantilla_16_9.pptx
+++ b/inst/plantillas/plantilla_16_9.pptx
@@ -1359,6 +1359,99 @@
 </file>
 
 <file path=ppt/slideLayouts/slideLayout10.xml><?xml version="1.0" encoding="utf-8"?>
+<p:sldLayout xmlns:a="http://schemas.openxmlformats.org/drawingml/2006/main" xmlns:r="http://schemas.openxmlformats.org/officeDocument/2006/relationships" xmlns:p="http://schemas.openxmlformats.org/presentationml/2006/main" preserve="1" userDrawn="1">
+  <p:cSld name="Comparison">
+    <p:spTree>
+      <p:nvGrpSpPr>
+        <p:cNvPr id="1" name=""/>
+        <p:cNvGrpSpPr/>
+        <p:nvPr/>
+      </p:nvGrpSpPr>
+      <p:grpSpPr>
+        <a:xfrm>
+          <a:off x="0" y="0"/>
+          <a:ext cx="0" cy="0"/>
+          <a:chOff x="0" y="0"/>
+          <a:chExt cx="0" cy="0"/>
+        </a:xfrm>
+      </p:grpSpPr>
+      <p:pic>
+        <p:nvPicPr>
+          <p:cNvPr id="21" name="Google Shape;83;p50">
+            <a:extLst>
+              <a:ext uri="{FF2B5EF4-FFF2-40B4-BE49-F238E27FC236}">
+                <a16:creationId xmlns:a16="http://schemas.microsoft.com/office/drawing/2014/main" id="{68C69994-8571-CF4D-63D7-22A19CC07C6D}"/>
+              </a:ext>
+            </a:extLst>
+          </p:cNvPr>
+          <p:cNvPicPr preferRelativeResize="0"/>
+          <p:nvPr userDrawn="1"/>
+        </p:nvPicPr>
+        <p:blipFill rotWithShape="1">
+          <a:blip r:embed="rId2">
+            <a:alphaModFix/>
+          </a:blip>
+          <a:srcRect t="29471" b="26643"/>
+          <a:stretch/>
+        </p:blipFill>
+        <p:spPr>
+          <a:xfrm>
+            <a:off x="10088216" y="158826"/>
+            <a:ext cx="1927827" cy="846037"/>
+          </a:xfrm>
+          <a:prstGeom prst="rect">
+            <a:avLst/>
+          </a:prstGeom>
+          <a:noFill/>
+          <a:ln>
+            <a:noFill/>
+          </a:ln>
+        </p:spPr>
+      </p:pic>
+      <p:sp>
+        <p:nvSpPr>
+          <p:cNvPr id="7" name="Picture Placeholder 6">
+            <a:extLst>
+              <a:ext uri="{FF2B5EF4-FFF2-40B4-BE49-F238E27FC236}">
+                <a16:creationId xmlns:a16="http://schemas.microsoft.com/office/drawing/2014/main" id="{61DE5BAB-AAF2-6FE6-0DA4-29396849529B}"/>
+              </a:ext>
+            </a:extLst>
+          </p:cNvPr>
+          <p:cNvSpPr>
+            <a:spLocks noGrp="1"/>
+          </p:cNvSpPr>
+          <p:nvPr>
+            <p:ph type="pic" sz="quarter" idx="10"/>
+          </p:nvPr>
+        </p:nvSpPr>
+        <p:spPr>
+          <a:xfrm>
+            <a:off x="0" y="0"/>
+            <a:ext cx="12192000" cy="6858000"/>
+          </a:xfrm>
+        </p:spPr>
+        <p:txBody>
+          <a:bodyPr/>
+          <a:lstStyle/>
+          <a:p>
+            <a:endParaRPr lang="en-PE"/>
+          </a:p>
+        </p:txBody>
+      </p:sp>
+    </p:spTree>
+    <p:extLst>
+      <p:ext uri="{BB962C8B-B14F-4D97-AF65-F5344CB8AC3E}">
+        <p14:creationId xmlns:p14="http://schemas.microsoft.com/office/powerpoint/2010/main" val="2321386189"/>
+      </p:ext>
+    </p:extLst>
+  </p:cSld>
+  <p:clrMapOvr>
+    <a:masterClrMapping/>
+  </p:clrMapOvr>
+</p:sldLayout>
+</file>
+
+<file path=ppt/slideLayouts/slideLayout11.xml><?xml version="1.0" encoding="utf-8"?>
 <p:sldLayout xmlns:a="http://schemas.openxmlformats.org/drawingml/2006/main" xmlns:r="http://schemas.openxmlformats.org/officeDocument/2006/relationships" xmlns:p="http://schemas.openxmlformats.org/presentationml/2006/main" matchingName="Dos objetos" userDrawn="1">
   <p:cSld name="Two Content">
     <p:spTree>
@@ -1835,7 +1928,7 @@
 </p:sldLayout>
 </file>
 
-<file path=ppt/slideLayouts/slideLayout11.xml><?xml version="1.0" encoding="utf-8"?>
+<file path=ppt/slideLayouts/slideLayout12.xml><?xml version="1.0" encoding="utf-8"?>
 <p:sldLayout xmlns:a="http://schemas.openxmlformats.org/drawingml/2006/main" xmlns:r="http://schemas.openxmlformats.org/officeDocument/2006/relationships" xmlns:p="http://schemas.openxmlformats.org/presentationml/2006/main" matchingName="Título y objetos" preserve="1" userDrawn="1">
   <p:cSld name="Title and Content">
     <p:bg>
@@ -2291,7 +2384,7 @@
 </p:sldLayout>
 </file>
 
-<file path=ppt/slideLayouts/slideLayout12.xml><?xml version="1.0" encoding="utf-8"?>
+<file path=ppt/slideLayouts/slideLayout13.xml><?xml version="1.0" encoding="utf-8"?>
 <p:sldLayout xmlns:a="http://schemas.openxmlformats.org/drawingml/2006/main" xmlns:r="http://schemas.openxmlformats.org/officeDocument/2006/relationships" xmlns:p="http://schemas.openxmlformats.org/presentationml/2006/main" matchingName="ubicacion1" preserve="1" userDrawn="1">
   <p:cSld name="1_ubicacion1">
     <p:spTree>
@@ -3532,8 +3625,8 @@
         </p:nvSpPr>
         <p:spPr>
           <a:xfrm>
-            <a:off x="317500" y="259024"/>
-            <a:ext cx="9730221" cy="790158"/>
+            <a:off x="317500" y="119062"/>
+            <a:ext cx="9730221" cy="846037"/>
           </a:xfrm>
         </p:spPr>
         <p:txBody>
@@ -3569,7 +3662,7 @@
         </p:blipFill>
         <p:spPr>
           <a:xfrm>
-            <a:off x="10047721" y="203145"/>
+            <a:off x="10047721" y="119062"/>
             <a:ext cx="1927827" cy="846037"/>
           </a:xfrm>
           <a:prstGeom prst="rect">
@@ -3599,8 +3692,8 @@
         </p:nvSpPr>
         <p:spPr>
           <a:xfrm>
-            <a:off x="317500" y="1212574"/>
-            <a:ext cx="11440491" cy="5019262"/>
+            <a:off x="317500" y="1103243"/>
+            <a:ext cx="11440491" cy="5128593"/>
           </a:xfrm>
         </p:spPr>
         <p:txBody>
@@ -3787,6 +3880,325 @@
 </file>
 
 <file path=ppt/slideLayouts/slideLayout5.xml><?xml version="1.0" encoding="utf-8"?>
+<p:sldLayout xmlns:a="http://schemas.openxmlformats.org/drawingml/2006/main" xmlns:r="http://schemas.openxmlformats.org/officeDocument/2006/relationships" xmlns:p="http://schemas.openxmlformats.org/presentationml/2006/main" preserve="1" userDrawn="1">
+  <p:cSld name="Graficos_2columnas">
+    <p:spTree>
+      <p:nvGrpSpPr>
+        <p:cNvPr id="1" name=""/>
+        <p:cNvGrpSpPr/>
+        <p:nvPr/>
+      </p:nvGrpSpPr>
+      <p:grpSpPr>
+        <a:xfrm>
+          <a:off x="0" y="0"/>
+          <a:ext cx="0" cy="0"/>
+          <a:chOff x="0" y="0"/>
+          <a:chExt cx="0" cy="0"/>
+        </a:xfrm>
+      </p:grpSpPr>
+      <p:sp>
+        <p:nvSpPr>
+          <p:cNvPr id="2" name="Title 1">
+            <a:extLst>
+              <a:ext uri="{FF2B5EF4-FFF2-40B4-BE49-F238E27FC236}">
+                <a16:creationId xmlns:a16="http://schemas.microsoft.com/office/drawing/2014/main" id="{E161B1F1-83C7-C3F7-BF29-A7102FCCB32B}"/>
+              </a:ext>
+            </a:extLst>
+          </p:cNvPr>
+          <p:cNvSpPr>
+            <a:spLocks noGrp="1"/>
+          </p:cNvSpPr>
+          <p:nvPr>
+            <p:ph type="title"/>
+          </p:nvPr>
+        </p:nvSpPr>
+        <p:spPr>
+          <a:xfrm>
+            <a:off x="317500" y="119062"/>
+            <a:ext cx="9730221" cy="846037"/>
+          </a:xfrm>
+        </p:spPr>
+        <p:txBody>
+          <a:bodyPr/>
+          <a:lstStyle/>
+          <a:p>
+            <a:r>
+              <a:rPr lang="en-US" dirty="0"/>
+              <a:t>Click to edit Master title style</a:t>
+            </a:r>
+            <a:endParaRPr lang="en-PE" dirty="0"/>
+          </a:p>
+        </p:txBody>
+      </p:sp>
+      <p:pic>
+        <p:nvPicPr>
+          <p:cNvPr id="6" name="Google Shape;66;p47">
+            <a:extLst>
+              <a:ext uri="{FF2B5EF4-FFF2-40B4-BE49-F238E27FC236}">
+                <a16:creationId xmlns:a16="http://schemas.microsoft.com/office/drawing/2014/main" id="{323E205B-F311-E78C-D6A8-0122851FE66D}"/>
+              </a:ext>
+            </a:extLst>
+          </p:cNvPr>
+          <p:cNvPicPr preferRelativeResize="0"/>
+          <p:nvPr userDrawn="1"/>
+        </p:nvPicPr>
+        <p:blipFill rotWithShape="1">
+          <a:blip r:embed="rId2">
+            <a:alphaModFix/>
+          </a:blip>
+          <a:srcRect t="29471" b="26643"/>
+          <a:stretch/>
+        </p:blipFill>
+        <p:spPr>
+          <a:xfrm>
+            <a:off x="10047721" y="119062"/>
+            <a:ext cx="1927827" cy="846037"/>
+          </a:xfrm>
+          <a:prstGeom prst="rect">
+            <a:avLst/>
+          </a:prstGeom>
+          <a:noFill/>
+          <a:ln>
+            <a:noFill/>
+          </a:ln>
+        </p:spPr>
+      </p:pic>
+      <p:sp>
+        <p:nvSpPr>
+          <p:cNvPr id="8" name="Picture Placeholder 7">
+            <a:extLst>
+              <a:ext uri="{FF2B5EF4-FFF2-40B4-BE49-F238E27FC236}">
+                <a16:creationId xmlns:a16="http://schemas.microsoft.com/office/drawing/2014/main" id="{0FB415E7-8491-13B2-0A7D-52BF25F1EA60}"/>
+              </a:ext>
+            </a:extLst>
+          </p:cNvPr>
+          <p:cNvSpPr>
+            <a:spLocks noGrp="1"/>
+          </p:cNvSpPr>
+          <p:nvPr>
+            <p:ph type="pic" sz="quarter" idx="10"/>
+          </p:nvPr>
+        </p:nvSpPr>
+        <p:spPr>
+          <a:xfrm>
+            <a:off x="317501" y="1103243"/>
+            <a:ext cx="5584687" cy="5128593"/>
+          </a:xfrm>
+        </p:spPr>
+        <p:txBody>
+          <a:bodyPr/>
+          <a:lstStyle/>
+          <a:p>
+            <a:endParaRPr lang="en-PE"/>
+          </a:p>
+        </p:txBody>
+      </p:sp>
+      <p:sp>
+        <p:nvSpPr>
+          <p:cNvPr id="10" name="Text Placeholder 9">
+            <a:extLst>
+              <a:ext uri="{FF2B5EF4-FFF2-40B4-BE49-F238E27FC236}">
+                <a16:creationId xmlns:a16="http://schemas.microsoft.com/office/drawing/2014/main" id="{F97A4842-2728-8D6A-D2DE-B6E2062C5B64}"/>
+              </a:ext>
+            </a:extLst>
+          </p:cNvPr>
+          <p:cNvSpPr>
+            <a:spLocks noGrp="1"/>
+          </p:cNvSpPr>
+          <p:nvPr>
+            <p:ph type="body" sz="quarter" idx="11"/>
+          </p:nvPr>
+        </p:nvSpPr>
+        <p:spPr>
+          <a:xfrm>
+            <a:off x="317500" y="6340475"/>
+            <a:ext cx="4503738" cy="398463"/>
+          </a:xfrm>
+        </p:spPr>
+        <p:txBody>
+          <a:bodyPr>
+            <a:noAutofit/>
+          </a:bodyPr>
+          <a:lstStyle>
+            <a:lvl1pPr>
+              <a:defRPr sz="1100"/>
+            </a:lvl1pPr>
+            <a:lvl2pPr>
+              <a:defRPr sz="1000"/>
+            </a:lvl2pPr>
+            <a:lvl3pPr>
+              <a:defRPr sz="1000"/>
+            </a:lvl3pPr>
+            <a:lvl4pPr>
+              <a:defRPr sz="1000"/>
+            </a:lvl4pPr>
+            <a:lvl5pPr>
+              <a:defRPr sz="1000"/>
+            </a:lvl5pPr>
+          </a:lstStyle>
+          <a:p>
+            <a:pPr lvl="0"/>
+            <a:r>
+              <a:rPr lang="en-US" dirty="0"/>
+              <a:t>Click to edit Master text styles</a:t>
+            </a:r>
+          </a:p>
+          <a:p>
+            <a:pPr lvl="1"/>
+            <a:r>
+              <a:rPr lang="en-US" dirty="0"/>
+              <a:t>Second level</a:t>
+            </a:r>
+          </a:p>
+          <a:p>
+            <a:pPr lvl="2"/>
+            <a:r>
+              <a:rPr lang="en-US" dirty="0"/>
+              <a:t>Third level</a:t>
+            </a:r>
+          </a:p>
+          <a:p>
+            <a:pPr lvl="3"/>
+            <a:r>
+              <a:rPr lang="en-US" dirty="0"/>
+              <a:t>Fourth level</a:t>
+            </a:r>
+          </a:p>
+          <a:p>
+            <a:pPr lvl="4"/>
+            <a:r>
+              <a:rPr lang="en-US" dirty="0"/>
+              <a:t>Fifth level</a:t>
+            </a:r>
+            <a:endParaRPr lang="en-PE" dirty="0"/>
+          </a:p>
+        </p:txBody>
+      </p:sp>
+      <p:sp>
+        <p:nvSpPr>
+          <p:cNvPr id="11" name="Text Placeholder 9">
+            <a:extLst>
+              <a:ext uri="{FF2B5EF4-FFF2-40B4-BE49-F238E27FC236}">
+                <a16:creationId xmlns:a16="http://schemas.microsoft.com/office/drawing/2014/main" id="{6C0D5753-3F06-573C-2A52-4C7432C384AB}"/>
+              </a:ext>
+            </a:extLst>
+          </p:cNvPr>
+          <p:cNvSpPr>
+            <a:spLocks noGrp="1"/>
+          </p:cNvSpPr>
+          <p:nvPr>
+            <p:ph type="body" sz="quarter" idx="12"/>
+          </p:nvPr>
+        </p:nvSpPr>
+        <p:spPr>
+          <a:xfrm>
+            <a:off x="7472362" y="6340475"/>
+            <a:ext cx="4285629" cy="398463"/>
+          </a:xfrm>
+        </p:spPr>
+        <p:txBody>
+          <a:bodyPr>
+            <a:noAutofit/>
+          </a:bodyPr>
+          <a:lstStyle>
+            <a:lvl1pPr algn="r">
+              <a:defRPr sz="1100"/>
+            </a:lvl1pPr>
+            <a:lvl2pPr algn="r">
+              <a:defRPr sz="1000"/>
+            </a:lvl2pPr>
+            <a:lvl3pPr algn="r">
+              <a:defRPr sz="1000"/>
+            </a:lvl3pPr>
+            <a:lvl4pPr algn="r">
+              <a:defRPr sz="1000"/>
+            </a:lvl4pPr>
+            <a:lvl5pPr algn="r">
+              <a:defRPr sz="1000"/>
+            </a:lvl5pPr>
+          </a:lstStyle>
+          <a:p>
+            <a:pPr lvl="0"/>
+            <a:r>
+              <a:rPr lang="en-US" dirty="0"/>
+              <a:t>Click to edit Master text styles</a:t>
+            </a:r>
+          </a:p>
+          <a:p>
+            <a:pPr lvl="1"/>
+            <a:r>
+              <a:rPr lang="en-US" dirty="0"/>
+              <a:t>Second level</a:t>
+            </a:r>
+          </a:p>
+          <a:p>
+            <a:pPr lvl="2"/>
+            <a:r>
+              <a:rPr lang="en-US" dirty="0"/>
+              <a:t>Third level</a:t>
+            </a:r>
+          </a:p>
+          <a:p>
+            <a:pPr lvl="3"/>
+            <a:r>
+              <a:rPr lang="en-US" dirty="0"/>
+              <a:t>Fourth level</a:t>
+            </a:r>
+          </a:p>
+          <a:p>
+            <a:pPr lvl="4"/>
+            <a:r>
+              <a:rPr lang="en-US" dirty="0"/>
+              <a:t>Fifth level</a:t>
+            </a:r>
+            <a:endParaRPr lang="en-PE" dirty="0"/>
+          </a:p>
+        </p:txBody>
+      </p:sp>
+      <p:sp>
+        <p:nvSpPr>
+          <p:cNvPr id="3" name="Picture Placeholder 7">
+            <a:extLst>
+              <a:ext uri="{FF2B5EF4-FFF2-40B4-BE49-F238E27FC236}">
+                <a16:creationId xmlns:a16="http://schemas.microsoft.com/office/drawing/2014/main" id="{20E02211-8E49-B661-C872-8E183915B04C}"/>
+              </a:ext>
+            </a:extLst>
+          </p:cNvPr>
+          <p:cNvSpPr>
+            <a:spLocks noGrp="1"/>
+          </p:cNvSpPr>
+          <p:nvPr>
+            <p:ph type="pic" sz="quarter" idx="13"/>
+          </p:nvPr>
+        </p:nvSpPr>
+        <p:spPr>
+          <a:xfrm>
+            <a:off x="6390860" y="1073427"/>
+            <a:ext cx="5584687" cy="5128593"/>
+          </a:xfrm>
+        </p:spPr>
+        <p:txBody>
+          <a:bodyPr/>
+          <a:lstStyle/>
+          <a:p>
+            <a:endParaRPr lang="en-PE"/>
+          </a:p>
+        </p:txBody>
+      </p:sp>
+    </p:spTree>
+    <p:extLst>
+      <p:ext uri="{BB962C8B-B14F-4D97-AF65-F5344CB8AC3E}">
+        <p14:creationId xmlns:p14="http://schemas.microsoft.com/office/powerpoint/2010/main" val="54144204"/>
+      </p:ext>
+    </p:extLst>
+  </p:cSld>
+  <p:clrMapOvr>
+    <a:masterClrMapping/>
+  </p:clrMapOvr>
+</p:sldLayout>
+</file>
+
+<file path=ppt/slideLayouts/slideLayout6.xml><?xml version="1.0" encoding="utf-8"?>
 <p:sldLayout xmlns:a="http://schemas.openxmlformats.org/drawingml/2006/main" xmlns:r="http://schemas.openxmlformats.org/officeDocument/2006/relationships" xmlns:p="http://schemas.openxmlformats.org/presentationml/2006/main" showMasterSp="0" matchingName="Contraportada" preserve="1">
   <p:cSld name="Contraportada">
     <p:spTree>
@@ -6847,7 +7259,7 @@
 </p:sldLayout>
 </file>
 
-<file path=ppt/slideLayouts/slideLayout6.xml><?xml version="1.0" encoding="utf-8"?>
+<file path=ppt/slideLayouts/slideLayout7.xml><?xml version="1.0" encoding="utf-8"?>
 <p:sldLayout xmlns:a="http://schemas.openxmlformats.org/drawingml/2006/main" xmlns:r="http://schemas.openxmlformats.org/officeDocument/2006/relationships" xmlns:p="http://schemas.openxmlformats.org/presentationml/2006/main" matchingName="3_Índice" preserve="1" userDrawn="1">
   <p:cSld name="Index">
     <p:bg>
@@ -11763,7 +12175,7 @@
 </p:sldLayout>
 </file>
 
-<file path=ppt/slideLayouts/slideLayout7.xml><?xml version="1.0" encoding="utf-8"?>
+<file path=ppt/slideLayouts/slideLayout8.xml><?xml version="1.0" encoding="utf-8"?>
 <p:sldLayout xmlns:a="http://schemas.openxmlformats.org/drawingml/2006/main" xmlns:r="http://schemas.openxmlformats.org/officeDocument/2006/relationships" xmlns:p="http://schemas.openxmlformats.org/presentationml/2006/main" preserve="1" userDrawn="1">
   <p:cSld name="Content with Caption">
     <p:spTree>
@@ -12344,7 +12756,7 @@
 </p:sldLayout>
 </file>
 
-<file path=ppt/slideLayouts/slideLayout8.xml><?xml version="1.0" encoding="utf-8"?>
+<file path=ppt/slideLayouts/slideLayout9.xml><?xml version="1.0" encoding="utf-8"?>
 <p:sldLayout xmlns:a="http://schemas.openxmlformats.org/drawingml/2006/main" xmlns:r="http://schemas.openxmlformats.org/officeDocument/2006/relationships" xmlns:p="http://schemas.openxmlformats.org/presentationml/2006/main" matchingName="diseño contenido 3" preserve="1">
   <p:cSld name="General Objective">
     <p:spTree>
@@ -13831,99 +14243,6 @@
 </p:sldLayout>
 </file>
 
-<file path=ppt/slideLayouts/slideLayout9.xml><?xml version="1.0" encoding="utf-8"?>
-<p:sldLayout xmlns:a="http://schemas.openxmlformats.org/drawingml/2006/main" xmlns:r="http://schemas.openxmlformats.org/officeDocument/2006/relationships" xmlns:p="http://schemas.openxmlformats.org/presentationml/2006/main" preserve="1" userDrawn="1">
-  <p:cSld name="Comparison">
-    <p:spTree>
-      <p:nvGrpSpPr>
-        <p:cNvPr id="1" name=""/>
-        <p:cNvGrpSpPr/>
-        <p:nvPr/>
-      </p:nvGrpSpPr>
-      <p:grpSpPr>
-        <a:xfrm>
-          <a:off x="0" y="0"/>
-          <a:ext cx="0" cy="0"/>
-          <a:chOff x="0" y="0"/>
-          <a:chExt cx="0" cy="0"/>
-        </a:xfrm>
-      </p:grpSpPr>
-      <p:pic>
-        <p:nvPicPr>
-          <p:cNvPr id="21" name="Google Shape;83;p50">
-            <a:extLst>
-              <a:ext uri="{FF2B5EF4-FFF2-40B4-BE49-F238E27FC236}">
-                <a16:creationId xmlns:a16="http://schemas.microsoft.com/office/drawing/2014/main" id="{68C69994-8571-CF4D-63D7-22A19CC07C6D}"/>
-              </a:ext>
-            </a:extLst>
-          </p:cNvPr>
-          <p:cNvPicPr preferRelativeResize="0"/>
-          <p:nvPr userDrawn="1"/>
-        </p:nvPicPr>
-        <p:blipFill rotWithShape="1">
-          <a:blip r:embed="rId2">
-            <a:alphaModFix/>
-          </a:blip>
-          <a:srcRect t="29471" b="26643"/>
-          <a:stretch/>
-        </p:blipFill>
-        <p:spPr>
-          <a:xfrm>
-            <a:off x="10088216" y="158826"/>
-            <a:ext cx="1927827" cy="846037"/>
-          </a:xfrm>
-          <a:prstGeom prst="rect">
-            <a:avLst/>
-          </a:prstGeom>
-          <a:noFill/>
-          <a:ln>
-            <a:noFill/>
-          </a:ln>
-        </p:spPr>
-      </p:pic>
-      <p:sp>
-        <p:nvSpPr>
-          <p:cNvPr id="7" name="Picture Placeholder 6">
-            <a:extLst>
-              <a:ext uri="{FF2B5EF4-FFF2-40B4-BE49-F238E27FC236}">
-                <a16:creationId xmlns:a16="http://schemas.microsoft.com/office/drawing/2014/main" id="{61DE5BAB-AAF2-6FE6-0DA4-29396849529B}"/>
-              </a:ext>
-            </a:extLst>
-          </p:cNvPr>
-          <p:cNvSpPr>
-            <a:spLocks noGrp="1"/>
-          </p:cNvSpPr>
-          <p:nvPr>
-            <p:ph type="pic" sz="quarter" idx="10"/>
-          </p:nvPr>
-        </p:nvSpPr>
-        <p:spPr>
-          <a:xfrm>
-            <a:off x="0" y="0"/>
-            <a:ext cx="12192000" cy="6858000"/>
-          </a:xfrm>
-        </p:spPr>
-        <p:txBody>
-          <a:bodyPr/>
-          <a:lstStyle/>
-          <a:p>
-            <a:endParaRPr lang="en-PE"/>
-          </a:p>
-        </p:txBody>
-      </p:sp>
-    </p:spTree>
-    <p:extLst>
-      <p:ext uri="{BB962C8B-B14F-4D97-AF65-F5344CB8AC3E}">
-        <p14:creationId xmlns:p14="http://schemas.microsoft.com/office/powerpoint/2010/main" val="2321386189"/>
-      </p:ext>
-    </p:extLst>
-  </p:cSld>
-  <p:clrMapOvr>
-    <a:masterClrMapping/>
-  </p:clrMapOvr>
-</p:sldLayout>
-</file>
-
 <file path=ppt/slideMasters/slideMaster1.xml><?xml version="1.0" encoding="utf-8"?>
 <p:sldMaster xmlns:a="http://schemas.openxmlformats.org/drawingml/2006/main" xmlns:r="http://schemas.openxmlformats.org/officeDocument/2006/relationships" xmlns:p="http://schemas.openxmlformats.org/presentationml/2006/main">
   <p:cSld>
@@ -14864,14 +15183,15 @@
     <p:sldLayoutId id="2147483713" r:id="rId2"/>
     <p:sldLayoutId id="2147483714" r:id="rId3"/>
     <p:sldLayoutId id="2147483715" r:id="rId4"/>
-    <p:sldLayoutId id="2147483694" r:id="rId5"/>
-    <p:sldLayoutId id="2147483692" r:id="rId6"/>
-    <p:sldLayoutId id="2147483712" r:id="rId7"/>
-    <p:sldLayoutId id="2147483693" r:id="rId8"/>
-    <p:sldLayoutId id="2147483702" r:id="rId9"/>
-    <p:sldLayoutId id="2147483682" r:id="rId10"/>
-    <p:sldLayoutId id="2147483688" r:id="rId11"/>
-    <p:sldLayoutId id="2147483703" r:id="rId12"/>
+    <p:sldLayoutId id="2147483716" r:id="rId5"/>
+    <p:sldLayoutId id="2147483694" r:id="rId6"/>
+    <p:sldLayoutId id="2147483692" r:id="rId7"/>
+    <p:sldLayoutId id="2147483712" r:id="rId8"/>
+    <p:sldLayoutId id="2147483693" r:id="rId9"/>
+    <p:sldLayoutId id="2147483702" r:id="rId10"/>
+    <p:sldLayoutId id="2147483682" r:id="rId11"/>
+    <p:sldLayoutId id="2147483688" r:id="rId12"/>
+    <p:sldLayoutId id="2147483703" r:id="rId13"/>
   </p:sldLayoutIdLst>
   <p:txStyles>
     <p:titleStyle>

</xml_diff>

<commit_message>
Nuevo layout de una barra en reporte_ppt para grafico de barras apiladas de una sola variable.
</commit_message>
<xml_diff>
--- a/inst/plantillas/plantilla_16_9.pptx
+++ b/inst/plantillas/plantilla_16_9.pptx
@@ -346,7 +346,7 @@
           <a:p>
             <a:fld id="{A9DF37BE-63F7-D04E-AEC4-DC43A32AA23E}" type="datetimeFigureOut">
               <a:rPr lang="en-PE" smtClean="0"/>
-              <a:t>6/12/25</a:t>
+              <a:t>9/12/25</a:t>
             </a:fld>
             <a:endParaRPr lang="en-PE"/>
           </a:p>
@@ -523,7 +523,7 @@
           <a:p>
             <a:fld id="{EE8340E0-AD77-4043-A3C3-5BEDD4FD6B77}" type="datetimeFigureOut">
               <a:rPr lang="es-PE" smtClean="0"/>
-              <a:t>6/12/25</a:t>
+              <a:t>9/12/25</a:t>
             </a:fld>
             <a:endParaRPr lang="es-PE"/>
           </a:p>
@@ -1323,7 +1323,7 @@
                 </a:buClr>
                 <a:buSzPts val="1800"/>
               </a:pPr>
-              <a:t>6/12/25</a:t>
+              <a:t>9/12/25</a:t>
             </a:fld>
             <a:endParaRPr lang="en-PE" dirty="0"/>
           </a:p>
@@ -1359,6 +1359,1493 @@
 </file>
 
 <file path=ppt/slideLayouts/slideLayout10.xml><?xml version="1.0" encoding="utf-8"?>
+<p:sldLayout xmlns:a="http://schemas.openxmlformats.org/drawingml/2006/main" xmlns:r="http://schemas.openxmlformats.org/officeDocument/2006/relationships" xmlns:p="http://schemas.openxmlformats.org/presentationml/2006/main" matchingName="diseño contenido 3" preserve="1">
+  <p:cSld name="General Objective">
+    <p:spTree>
+      <p:nvGrpSpPr>
+        <p:cNvPr id="1" name="Shape 67"/>
+        <p:cNvGrpSpPr/>
+        <p:nvPr/>
+      </p:nvGrpSpPr>
+      <p:grpSpPr>
+        <a:xfrm>
+          <a:off x="0" y="0"/>
+          <a:ext cx="0" cy="0"/>
+          <a:chOff x="0" y="0"/>
+          <a:chExt cx="0" cy="0"/>
+        </a:xfrm>
+      </p:grpSpPr>
+      <p:sp>
+        <p:nvSpPr>
+          <p:cNvPr id="68" name="Google Shape;68;p48"/>
+          <p:cNvSpPr txBox="1">
+            <a:spLocks noGrp="1"/>
+          </p:cNvSpPr>
+          <p:nvPr>
+            <p:ph type="dt" idx="10"/>
+          </p:nvPr>
+        </p:nvSpPr>
+        <p:spPr>
+          <a:xfrm>
+            <a:off x="9178312" y="6356351"/>
+            <a:ext cx="2743200" cy="365125"/>
+          </a:xfrm>
+          <a:prstGeom prst="rect">
+            <a:avLst/>
+          </a:prstGeom>
+          <a:noFill/>
+          <a:ln>
+            <a:noFill/>
+          </a:ln>
+        </p:spPr>
+        <p:txBody>
+          <a:bodyPr spcFirstLastPara="1" wrap="square" lIns="91425" tIns="45700" rIns="91425" bIns="45700" anchor="ctr" anchorCtr="0">
+            <a:noAutofit/>
+          </a:bodyPr>
+          <a:lstStyle>
+            <a:lvl1pPr lvl="0" algn="l">
+              <a:lnSpc>
+                <a:spcPct val="100000"/>
+              </a:lnSpc>
+              <a:spcBef>
+                <a:spcPts val="0"/>
+              </a:spcBef>
+              <a:spcAft>
+                <a:spcPts val="0"/>
+              </a:spcAft>
+              <a:buClr>
+                <a:srgbClr val="888888"/>
+              </a:buClr>
+              <a:buSzPts val="1400"/>
+              <a:buFont typeface="Arial"/>
+              <a:buNone/>
+              <a:defRPr/>
+            </a:lvl1pPr>
+            <a:lvl2pPr lvl="1" algn="l">
+              <a:lnSpc>
+                <a:spcPct val="100000"/>
+              </a:lnSpc>
+              <a:spcBef>
+                <a:spcPts val="0"/>
+              </a:spcBef>
+              <a:spcAft>
+                <a:spcPts val="0"/>
+              </a:spcAft>
+              <a:buClr>
+                <a:schemeClr val="dk1"/>
+              </a:buClr>
+              <a:buSzPts val="1400"/>
+              <a:buFont typeface="Arial"/>
+              <a:buNone/>
+              <a:defRPr/>
+            </a:lvl2pPr>
+            <a:lvl3pPr lvl="2" algn="l">
+              <a:lnSpc>
+                <a:spcPct val="100000"/>
+              </a:lnSpc>
+              <a:spcBef>
+                <a:spcPts val="0"/>
+              </a:spcBef>
+              <a:spcAft>
+                <a:spcPts val="0"/>
+              </a:spcAft>
+              <a:buClr>
+                <a:schemeClr val="dk1"/>
+              </a:buClr>
+              <a:buSzPts val="1400"/>
+              <a:buFont typeface="Arial"/>
+              <a:buNone/>
+              <a:defRPr/>
+            </a:lvl3pPr>
+            <a:lvl4pPr lvl="3" algn="l">
+              <a:lnSpc>
+                <a:spcPct val="100000"/>
+              </a:lnSpc>
+              <a:spcBef>
+                <a:spcPts val="0"/>
+              </a:spcBef>
+              <a:spcAft>
+                <a:spcPts val="0"/>
+              </a:spcAft>
+              <a:buClr>
+                <a:schemeClr val="dk1"/>
+              </a:buClr>
+              <a:buSzPts val="1400"/>
+              <a:buFont typeface="Arial"/>
+              <a:buNone/>
+              <a:defRPr/>
+            </a:lvl4pPr>
+            <a:lvl5pPr lvl="4" algn="l">
+              <a:lnSpc>
+                <a:spcPct val="100000"/>
+              </a:lnSpc>
+              <a:spcBef>
+                <a:spcPts val="0"/>
+              </a:spcBef>
+              <a:spcAft>
+                <a:spcPts val="0"/>
+              </a:spcAft>
+              <a:buClr>
+                <a:schemeClr val="dk1"/>
+              </a:buClr>
+              <a:buSzPts val="1400"/>
+              <a:buFont typeface="Arial"/>
+              <a:buNone/>
+              <a:defRPr/>
+            </a:lvl5pPr>
+            <a:lvl6pPr lvl="5" algn="l">
+              <a:lnSpc>
+                <a:spcPct val="100000"/>
+              </a:lnSpc>
+              <a:spcBef>
+                <a:spcPts val="0"/>
+              </a:spcBef>
+              <a:spcAft>
+                <a:spcPts val="0"/>
+              </a:spcAft>
+              <a:buClr>
+                <a:schemeClr val="dk1"/>
+              </a:buClr>
+              <a:buSzPts val="1400"/>
+              <a:buFont typeface="Arial"/>
+              <a:buNone/>
+              <a:defRPr/>
+            </a:lvl6pPr>
+            <a:lvl7pPr lvl="6" algn="l">
+              <a:lnSpc>
+                <a:spcPct val="100000"/>
+              </a:lnSpc>
+              <a:spcBef>
+                <a:spcPts val="0"/>
+              </a:spcBef>
+              <a:spcAft>
+                <a:spcPts val="0"/>
+              </a:spcAft>
+              <a:buClr>
+                <a:schemeClr val="dk1"/>
+              </a:buClr>
+              <a:buSzPts val="1400"/>
+              <a:buFont typeface="Arial"/>
+              <a:buNone/>
+              <a:defRPr/>
+            </a:lvl7pPr>
+            <a:lvl8pPr lvl="7" algn="l">
+              <a:lnSpc>
+                <a:spcPct val="100000"/>
+              </a:lnSpc>
+              <a:spcBef>
+                <a:spcPts val="0"/>
+              </a:spcBef>
+              <a:spcAft>
+                <a:spcPts val="0"/>
+              </a:spcAft>
+              <a:buClr>
+                <a:schemeClr val="dk1"/>
+              </a:buClr>
+              <a:buSzPts val="1400"/>
+              <a:buFont typeface="Arial"/>
+              <a:buNone/>
+              <a:defRPr/>
+            </a:lvl8pPr>
+            <a:lvl9pPr lvl="8" algn="l">
+              <a:lnSpc>
+                <a:spcPct val="100000"/>
+              </a:lnSpc>
+              <a:spcBef>
+                <a:spcPts val="0"/>
+              </a:spcBef>
+              <a:spcAft>
+                <a:spcPts val="0"/>
+              </a:spcAft>
+              <a:buClr>
+                <a:schemeClr val="dk1"/>
+              </a:buClr>
+              <a:buSzPts val="1400"/>
+              <a:buFont typeface="Arial"/>
+              <a:buNone/>
+              <a:defRPr/>
+            </a:lvl9pPr>
+          </a:lstStyle>
+          <a:p>
+            <a:endParaRPr/>
+          </a:p>
+        </p:txBody>
+      </p:sp>
+      <p:sp>
+        <p:nvSpPr>
+          <p:cNvPr id="69" name="Google Shape;69;p48"/>
+          <p:cNvSpPr txBox="1">
+            <a:spLocks noGrp="1"/>
+          </p:cNvSpPr>
+          <p:nvPr>
+            <p:ph type="ftr" idx="11"/>
+          </p:nvPr>
+        </p:nvSpPr>
+        <p:spPr>
+          <a:xfrm>
+            <a:off x="4038600" y="6356351"/>
+            <a:ext cx="4114800" cy="365125"/>
+          </a:xfrm>
+          <a:prstGeom prst="rect">
+            <a:avLst/>
+          </a:prstGeom>
+          <a:noFill/>
+          <a:ln>
+            <a:noFill/>
+          </a:ln>
+        </p:spPr>
+        <p:txBody>
+          <a:bodyPr spcFirstLastPara="1" wrap="square" lIns="91425" tIns="45700" rIns="91425" bIns="45700" anchor="ctr" anchorCtr="0">
+            <a:noAutofit/>
+          </a:bodyPr>
+          <a:lstStyle>
+            <a:lvl1pPr lvl="0" algn="ctr">
+              <a:lnSpc>
+                <a:spcPct val="100000"/>
+              </a:lnSpc>
+              <a:spcBef>
+                <a:spcPts val="0"/>
+              </a:spcBef>
+              <a:spcAft>
+                <a:spcPts val="0"/>
+              </a:spcAft>
+              <a:buClr>
+                <a:srgbClr val="888888"/>
+              </a:buClr>
+              <a:buSzPts val="1400"/>
+              <a:buFont typeface="Arial"/>
+              <a:buNone/>
+              <a:defRPr/>
+            </a:lvl1pPr>
+            <a:lvl2pPr lvl="1" algn="l">
+              <a:lnSpc>
+                <a:spcPct val="100000"/>
+              </a:lnSpc>
+              <a:spcBef>
+                <a:spcPts val="0"/>
+              </a:spcBef>
+              <a:spcAft>
+                <a:spcPts val="0"/>
+              </a:spcAft>
+              <a:buClr>
+                <a:schemeClr val="dk1"/>
+              </a:buClr>
+              <a:buSzPts val="1400"/>
+              <a:buFont typeface="Arial"/>
+              <a:buNone/>
+              <a:defRPr/>
+            </a:lvl2pPr>
+            <a:lvl3pPr lvl="2" algn="l">
+              <a:lnSpc>
+                <a:spcPct val="100000"/>
+              </a:lnSpc>
+              <a:spcBef>
+                <a:spcPts val="0"/>
+              </a:spcBef>
+              <a:spcAft>
+                <a:spcPts val="0"/>
+              </a:spcAft>
+              <a:buClr>
+                <a:schemeClr val="dk1"/>
+              </a:buClr>
+              <a:buSzPts val="1400"/>
+              <a:buFont typeface="Arial"/>
+              <a:buNone/>
+              <a:defRPr/>
+            </a:lvl3pPr>
+            <a:lvl4pPr lvl="3" algn="l">
+              <a:lnSpc>
+                <a:spcPct val="100000"/>
+              </a:lnSpc>
+              <a:spcBef>
+                <a:spcPts val="0"/>
+              </a:spcBef>
+              <a:spcAft>
+                <a:spcPts val="0"/>
+              </a:spcAft>
+              <a:buClr>
+                <a:schemeClr val="dk1"/>
+              </a:buClr>
+              <a:buSzPts val="1400"/>
+              <a:buFont typeface="Arial"/>
+              <a:buNone/>
+              <a:defRPr/>
+            </a:lvl4pPr>
+            <a:lvl5pPr lvl="4" algn="l">
+              <a:lnSpc>
+                <a:spcPct val="100000"/>
+              </a:lnSpc>
+              <a:spcBef>
+                <a:spcPts val="0"/>
+              </a:spcBef>
+              <a:spcAft>
+                <a:spcPts val="0"/>
+              </a:spcAft>
+              <a:buClr>
+                <a:schemeClr val="dk1"/>
+              </a:buClr>
+              <a:buSzPts val="1400"/>
+              <a:buFont typeface="Arial"/>
+              <a:buNone/>
+              <a:defRPr/>
+            </a:lvl5pPr>
+            <a:lvl6pPr lvl="5" algn="l">
+              <a:lnSpc>
+                <a:spcPct val="100000"/>
+              </a:lnSpc>
+              <a:spcBef>
+                <a:spcPts val="0"/>
+              </a:spcBef>
+              <a:spcAft>
+                <a:spcPts val="0"/>
+              </a:spcAft>
+              <a:buClr>
+                <a:schemeClr val="dk1"/>
+              </a:buClr>
+              <a:buSzPts val="1400"/>
+              <a:buFont typeface="Arial"/>
+              <a:buNone/>
+              <a:defRPr/>
+            </a:lvl6pPr>
+            <a:lvl7pPr lvl="6" algn="l">
+              <a:lnSpc>
+                <a:spcPct val="100000"/>
+              </a:lnSpc>
+              <a:spcBef>
+                <a:spcPts val="0"/>
+              </a:spcBef>
+              <a:spcAft>
+                <a:spcPts val="0"/>
+              </a:spcAft>
+              <a:buClr>
+                <a:schemeClr val="dk1"/>
+              </a:buClr>
+              <a:buSzPts val="1400"/>
+              <a:buFont typeface="Arial"/>
+              <a:buNone/>
+              <a:defRPr/>
+            </a:lvl7pPr>
+            <a:lvl8pPr lvl="7" algn="l">
+              <a:lnSpc>
+                <a:spcPct val="100000"/>
+              </a:lnSpc>
+              <a:spcBef>
+                <a:spcPts val="0"/>
+              </a:spcBef>
+              <a:spcAft>
+                <a:spcPts val="0"/>
+              </a:spcAft>
+              <a:buClr>
+                <a:schemeClr val="dk1"/>
+              </a:buClr>
+              <a:buSzPts val="1400"/>
+              <a:buFont typeface="Arial"/>
+              <a:buNone/>
+              <a:defRPr/>
+            </a:lvl8pPr>
+            <a:lvl9pPr lvl="8" algn="l">
+              <a:lnSpc>
+                <a:spcPct val="100000"/>
+              </a:lnSpc>
+              <a:spcBef>
+                <a:spcPts val="0"/>
+              </a:spcBef>
+              <a:spcAft>
+                <a:spcPts val="0"/>
+              </a:spcAft>
+              <a:buClr>
+                <a:schemeClr val="dk1"/>
+              </a:buClr>
+              <a:buSzPts val="1400"/>
+              <a:buFont typeface="Arial"/>
+              <a:buNone/>
+              <a:defRPr/>
+            </a:lvl9pPr>
+          </a:lstStyle>
+          <a:p>
+            <a:endParaRPr/>
+          </a:p>
+        </p:txBody>
+      </p:sp>
+      <p:sp>
+        <p:nvSpPr>
+          <p:cNvPr id="70" name="Google Shape;70;p48"/>
+          <p:cNvSpPr txBox="1">
+            <a:spLocks noGrp="1"/>
+          </p:cNvSpPr>
+          <p:nvPr>
+            <p:ph type="sldNum" idx="12"/>
+          </p:nvPr>
+        </p:nvSpPr>
+        <p:spPr>
+          <a:xfrm>
+            <a:off x="332429" y="6356351"/>
+            <a:ext cx="2743200" cy="365125"/>
+          </a:xfrm>
+          <a:prstGeom prst="rect">
+            <a:avLst/>
+          </a:prstGeom>
+          <a:noFill/>
+          <a:ln>
+            <a:noFill/>
+          </a:ln>
+        </p:spPr>
+        <p:txBody>
+          <a:bodyPr spcFirstLastPara="1" wrap="square" lIns="91425" tIns="45700" rIns="91425" bIns="45700" anchor="ctr" anchorCtr="0">
+            <a:noAutofit/>
+          </a:bodyPr>
+          <a:lstStyle>
+            <a:lvl1pPr marL="0" marR="0" lvl="0" indent="0" algn="l">
+              <a:lnSpc>
+                <a:spcPct val="100000"/>
+              </a:lnSpc>
+              <a:spcBef>
+                <a:spcPts val="0"/>
+              </a:spcBef>
+              <a:spcAft>
+                <a:spcPts val="0"/>
+              </a:spcAft>
+              <a:buClr>
+                <a:srgbClr val="888888"/>
+              </a:buClr>
+              <a:buSzPts val="1200"/>
+              <a:buFont typeface="Calibri"/>
+              <a:buNone/>
+              <a:defRPr sz="1200" b="0" i="0" u="none" strike="noStrike" cap="none">
+                <a:solidFill>
+                  <a:srgbClr val="888888"/>
+                </a:solidFill>
+                <a:latin typeface="Calibri"/>
+                <a:ea typeface="Calibri"/>
+                <a:cs typeface="Calibri"/>
+                <a:sym typeface="Calibri"/>
+              </a:defRPr>
+            </a:lvl1pPr>
+            <a:lvl2pPr marL="0" marR="0" lvl="1" indent="0" algn="l">
+              <a:lnSpc>
+                <a:spcPct val="100000"/>
+              </a:lnSpc>
+              <a:spcBef>
+                <a:spcPts val="0"/>
+              </a:spcBef>
+              <a:spcAft>
+                <a:spcPts val="0"/>
+              </a:spcAft>
+              <a:buClr>
+                <a:srgbClr val="888888"/>
+              </a:buClr>
+              <a:buSzPts val="1200"/>
+              <a:buFont typeface="Calibri"/>
+              <a:buNone/>
+              <a:defRPr sz="1200" b="0" i="0" u="none" strike="noStrike" cap="none">
+                <a:solidFill>
+                  <a:srgbClr val="888888"/>
+                </a:solidFill>
+                <a:latin typeface="Calibri"/>
+                <a:ea typeface="Calibri"/>
+                <a:cs typeface="Calibri"/>
+                <a:sym typeface="Calibri"/>
+              </a:defRPr>
+            </a:lvl2pPr>
+            <a:lvl3pPr marL="0" marR="0" lvl="2" indent="0" algn="l">
+              <a:lnSpc>
+                <a:spcPct val="100000"/>
+              </a:lnSpc>
+              <a:spcBef>
+                <a:spcPts val="0"/>
+              </a:spcBef>
+              <a:spcAft>
+                <a:spcPts val="0"/>
+              </a:spcAft>
+              <a:buClr>
+                <a:srgbClr val="888888"/>
+              </a:buClr>
+              <a:buSzPts val="1200"/>
+              <a:buFont typeface="Calibri"/>
+              <a:buNone/>
+              <a:defRPr sz="1200" b="0" i="0" u="none" strike="noStrike" cap="none">
+                <a:solidFill>
+                  <a:srgbClr val="888888"/>
+                </a:solidFill>
+                <a:latin typeface="Calibri"/>
+                <a:ea typeface="Calibri"/>
+                <a:cs typeface="Calibri"/>
+                <a:sym typeface="Calibri"/>
+              </a:defRPr>
+            </a:lvl3pPr>
+            <a:lvl4pPr marL="0" marR="0" lvl="3" indent="0" algn="l">
+              <a:lnSpc>
+                <a:spcPct val="100000"/>
+              </a:lnSpc>
+              <a:spcBef>
+                <a:spcPts val="0"/>
+              </a:spcBef>
+              <a:spcAft>
+                <a:spcPts val="0"/>
+              </a:spcAft>
+              <a:buClr>
+                <a:srgbClr val="888888"/>
+              </a:buClr>
+              <a:buSzPts val="1200"/>
+              <a:buFont typeface="Calibri"/>
+              <a:buNone/>
+              <a:defRPr sz="1200" b="0" i="0" u="none" strike="noStrike" cap="none">
+                <a:solidFill>
+                  <a:srgbClr val="888888"/>
+                </a:solidFill>
+                <a:latin typeface="Calibri"/>
+                <a:ea typeface="Calibri"/>
+                <a:cs typeface="Calibri"/>
+                <a:sym typeface="Calibri"/>
+              </a:defRPr>
+            </a:lvl4pPr>
+            <a:lvl5pPr marL="0" marR="0" lvl="4" indent="0" algn="l">
+              <a:lnSpc>
+                <a:spcPct val="100000"/>
+              </a:lnSpc>
+              <a:spcBef>
+                <a:spcPts val="0"/>
+              </a:spcBef>
+              <a:spcAft>
+                <a:spcPts val="0"/>
+              </a:spcAft>
+              <a:buClr>
+                <a:srgbClr val="888888"/>
+              </a:buClr>
+              <a:buSzPts val="1200"/>
+              <a:buFont typeface="Calibri"/>
+              <a:buNone/>
+              <a:defRPr sz="1200" b="0" i="0" u="none" strike="noStrike" cap="none">
+                <a:solidFill>
+                  <a:srgbClr val="888888"/>
+                </a:solidFill>
+                <a:latin typeface="Calibri"/>
+                <a:ea typeface="Calibri"/>
+                <a:cs typeface="Calibri"/>
+                <a:sym typeface="Calibri"/>
+              </a:defRPr>
+            </a:lvl5pPr>
+            <a:lvl6pPr marL="0" marR="0" lvl="5" indent="0" algn="l">
+              <a:lnSpc>
+                <a:spcPct val="100000"/>
+              </a:lnSpc>
+              <a:spcBef>
+                <a:spcPts val="0"/>
+              </a:spcBef>
+              <a:spcAft>
+                <a:spcPts val="0"/>
+              </a:spcAft>
+              <a:buClr>
+                <a:srgbClr val="888888"/>
+              </a:buClr>
+              <a:buSzPts val="1200"/>
+              <a:buFont typeface="Calibri"/>
+              <a:buNone/>
+              <a:defRPr sz="1200" b="0" i="0" u="none" strike="noStrike" cap="none">
+                <a:solidFill>
+                  <a:srgbClr val="888888"/>
+                </a:solidFill>
+                <a:latin typeface="Calibri"/>
+                <a:ea typeface="Calibri"/>
+                <a:cs typeface="Calibri"/>
+                <a:sym typeface="Calibri"/>
+              </a:defRPr>
+            </a:lvl6pPr>
+            <a:lvl7pPr marL="0" marR="0" lvl="6" indent="0" algn="l">
+              <a:lnSpc>
+                <a:spcPct val="100000"/>
+              </a:lnSpc>
+              <a:spcBef>
+                <a:spcPts val="0"/>
+              </a:spcBef>
+              <a:spcAft>
+                <a:spcPts val="0"/>
+              </a:spcAft>
+              <a:buClr>
+                <a:srgbClr val="888888"/>
+              </a:buClr>
+              <a:buSzPts val="1200"/>
+              <a:buFont typeface="Calibri"/>
+              <a:buNone/>
+              <a:defRPr sz="1200" b="0" i="0" u="none" strike="noStrike" cap="none">
+                <a:solidFill>
+                  <a:srgbClr val="888888"/>
+                </a:solidFill>
+                <a:latin typeface="Calibri"/>
+                <a:ea typeface="Calibri"/>
+                <a:cs typeface="Calibri"/>
+                <a:sym typeface="Calibri"/>
+              </a:defRPr>
+            </a:lvl7pPr>
+            <a:lvl8pPr marL="0" marR="0" lvl="7" indent="0" algn="l">
+              <a:lnSpc>
+                <a:spcPct val="100000"/>
+              </a:lnSpc>
+              <a:spcBef>
+                <a:spcPts val="0"/>
+              </a:spcBef>
+              <a:spcAft>
+                <a:spcPts val="0"/>
+              </a:spcAft>
+              <a:buClr>
+                <a:srgbClr val="888888"/>
+              </a:buClr>
+              <a:buSzPts val="1200"/>
+              <a:buFont typeface="Calibri"/>
+              <a:buNone/>
+              <a:defRPr sz="1200" b="0" i="0" u="none" strike="noStrike" cap="none">
+                <a:solidFill>
+                  <a:srgbClr val="888888"/>
+                </a:solidFill>
+                <a:latin typeface="Calibri"/>
+                <a:ea typeface="Calibri"/>
+                <a:cs typeface="Calibri"/>
+                <a:sym typeface="Calibri"/>
+              </a:defRPr>
+            </a:lvl8pPr>
+            <a:lvl9pPr marL="0" marR="0" lvl="8" indent="0" algn="l">
+              <a:lnSpc>
+                <a:spcPct val="100000"/>
+              </a:lnSpc>
+              <a:spcBef>
+                <a:spcPts val="0"/>
+              </a:spcBef>
+              <a:spcAft>
+                <a:spcPts val="0"/>
+              </a:spcAft>
+              <a:buClr>
+                <a:srgbClr val="888888"/>
+              </a:buClr>
+              <a:buSzPts val="1200"/>
+              <a:buFont typeface="Calibri"/>
+              <a:buNone/>
+              <a:defRPr sz="1200" b="0" i="0" u="none" strike="noStrike" cap="none">
+                <a:solidFill>
+                  <a:srgbClr val="888888"/>
+                </a:solidFill>
+                <a:latin typeface="Calibri"/>
+                <a:ea typeface="Calibri"/>
+                <a:cs typeface="Calibri"/>
+                <a:sym typeface="Calibri"/>
+              </a:defRPr>
+            </a:lvl9pPr>
+          </a:lstStyle>
+          <a:p>
+            <a:pPr marL="0" lvl="0" indent="0" algn="l" rtl="0">
+              <a:spcBef>
+                <a:spcPts val="0"/>
+              </a:spcBef>
+              <a:spcAft>
+                <a:spcPts val="0"/>
+              </a:spcAft>
+              <a:buNone/>
+            </a:pPr>
+            <a:fld id="{00000000-1234-1234-1234-123412341234}" type="slidenum">
+              <a:rPr lang="es-ES"/>
+              <a:t>‹#›</a:t>
+            </a:fld>
+            <a:endParaRPr/>
+          </a:p>
+        </p:txBody>
+      </p:sp>
+      <p:sp>
+        <p:nvSpPr>
+          <p:cNvPr id="71" name="Google Shape;71;p48"/>
+          <p:cNvSpPr txBox="1">
+            <a:spLocks noGrp="1"/>
+          </p:cNvSpPr>
+          <p:nvPr>
+            <p:ph type="body" idx="1"/>
+          </p:nvPr>
+        </p:nvSpPr>
+        <p:spPr>
+          <a:xfrm>
+            <a:off x="3224465" y="1973179"/>
+            <a:ext cx="7908759" cy="2172936"/>
+          </a:xfrm>
+          <a:prstGeom prst="rect">
+            <a:avLst/>
+          </a:prstGeom>
+          <a:noFill/>
+          <a:ln>
+            <a:noFill/>
+          </a:ln>
+        </p:spPr>
+        <p:txBody>
+          <a:bodyPr spcFirstLastPara="1" wrap="square" lIns="91425" tIns="45700" rIns="91425" bIns="45700" anchor="t" anchorCtr="0">
+            <a:normAutofit/>
+          </a:bodyPr>
+          <a:lstStyle>
+            <a:lvl1pPr marL="457200" lvl="0" indent="-228600" algn="l">
+              <a:lnSpc>
+                <a:spcPct val="90000"/>
+              </a:lnSpc>
+              <a:spcBef>
+                <a:spcPts val="1000"/>
+              </a:spcBef>
+              <a:spcAft>
+                <a:spcPts val="0"/>
+              </a:spcAft>
+              <a:buClr>
+                <a:schemeClr val="dk1"/>
+              </a:buClr>
+              <a:buSzPts val="2800"/>
+              <a:buNone/>
+              <a:defRPr/>
+            </a:lvl1pPr>
+            <a:lvl2pPr marL="914400" lvl="1" indent="-342900" algn="l">
+              <a:lnSpc>
+                <a:spcPct val="90000"/>
+              </a:lnSpc>
+              <a:spcBef>
+                <a:spcPts val="500"/>
+              </a:spcBef>
+              <a:spcAft>
+                <a:spcPts val="0"/>
+              </a:spcAft>
+              <a:buClr>
+                <a:schemeClr val="dk1"/>
+              </a:buClr>
+              <a:buSzPts val="1800"/>
+              <a:buChar char="•"/>
+              <a:defRPr/>
+            </a:lvl2pPr>
+            <a:lvl3pPr marL="1371600" lvl="2" indent="-342900" algn="l">
+              <a:lnSpc>
+                <a:spcPct val="90000"/>
+              </a:lnSpc>
+              <a:spcBef>
+                <a:spcPts val="500"/>
+              </a:spcBef>
+              <a:spcAft>
+                <a:spcPts val="0"/>
+              </a:spcAft>
+              <a:buClr>
+                <a:schemeClr val="dk1"/>
+              </a:buClr>
+              <a:buSzPts val="1800"/>
+              <a:buChar char="•"/>
+              <a:defRPr/>
+            </a:lvl3pPr>
+            <a:lvl4pPr marL="1828800" lvl="3" indent="-342900" algn="l">
+              <a:lnSpc>
+                <a:spcPct val="90000"/>
+              </a:lnSpc>
+              <a:spcBef>
+                <a:spcPts val="500"/>
+              </a:spcBef>
+              <a:spcAft>
+                <a:spcPts val="0"/>
+              </a:spcAft>
+              <a:buClr>
+                <a:schemeClr val="dk1"/>
+              </a:buClr>
+              <a:buSzPts val="1800"/>
+              <a:buChar char="•"/>
+              <a:defRPr/>
+            </a:lvl4pPr>
+            <a:lvl5pPr marL="2286000" lvl="4" indent="-342900" algn="l">
+              <a:lnSpc>
+                <a:spcPct val="90000"/>
+              </a:lnSpc>
+              <a:spcBef>
+                <a:spcPts val="500"/>
+              </a:spcBef>
+              <a:spcAft>
+                <a:spcPts val="0"/>
+              </a:spcAft>
+              <a:buClr>
+                <a:schemeClr val="dk1"/>
+              </a:buClr>
+              <a:buSzPts val="1800"/>
+              <a:buChar char="•"/>
+              <a:defRPr/>
+            </a:lvl5pPr>
+            <a:lvl6pPr marL="2743200" lvl="5" indent="-342900" algn="l">
+              <a:lnSpc>
+                <a:spcPct val="90000"/>
+              </a:lnSpc>
+              <a:spcBef>
+                <a:spcPts val="500"/>
+              </a:spcBef>
+              <a:spcAft>
+                <a:spcPts val="0"/>
+              </a:spcAft>
+              <a:buClr>
+                <a:schemeClr val="dk1"/>
+              </a:buClr>
+              <a:buSzPts val="1800"/>
+              <a:buChar char="•"/>
+              <a:defRPr/>
+            </a:lvl6pPr>
+            <a:lvl7pPr marL="3200400" lvl="6" indent="-342900" algn="l">
+              <a:lnSpc>
+                <a:spcPct val="90000"/>
+              </a:lnSpc>
+              <a:spcBef>
+                <a:spcPts val="500"/>
+              </a:spcBef>
+              <a:spcAft>
+                <a:spcPts val="0"/>
+              </a:spcAft>
+              <a:buClr>
+                <a:schemeClr val="dk1"/>
+              </a:buClr>
+              <a:buSzPts val="1800"/>
+              <a:buChar char="•"/>
+              <a:defRPr/>
+            </a:lvl7pPr>
+            <a:lvl8pPr marL="3657600" lvl="7" indent="-342900" algn="l">
+              <a:lnSpc>
+                <a:spcPct val="90000"/>
+              </a:lnSpc>
+              <a:spcBef>
+                <a:spcPts val="500"/>
+              </a:spcBef>
+              <a:spcAft>
+                <a:spcPts val="0"/>
+              </a:spcAft>
+              <a:buClr>
+                <a:schemeClr val="dk1"/>
+              </a:buClr>
+              <a:buSzPts val="1800"/>
+              <a:buChar char="•"/>
+              <a:defRPr/>
+            </a:lvl8pPr>
+            <a:lvl9pPr marL="4114800" lvl="8" indent="-342900" algn="l">
+              <a:lnSpc>
+                <a:spcPct val="90000"/>
+              </a:lnSpc>
+              <a:spcBef>
+                <a:spcPts val="500"/>
+              </a:spcBef>
+              <a:spcAft>
+                <a:spcPts val="0"/>
+              </a:spcAft>
+              <a:buClr>
+                <a:schemeClr val="dk1"/>
+              </a:buClr>
+              <a:buSzPts val="1800"/>
+              <a:buChar char="•"/>
+              <a:defRPr/>
+            </a:lvl9pPr>
+          </a:lstStyle>
+          <a:p>
+            <a:pPr lvl="0"/>
+            <a:r>
+              <a:rPr lang="es-MX"/>
+              <a:t>Haga clic para modificar los estilos de texto del patrón</a:t>
+            </a:r>
+          </a:p>
+        </p:txBody>
+      </p:sp>
+      <p:cxnSp>
+        <p:nvCxnSpPr>
+          <p:cNvPr id="72" name="Google Shape;72;p48"/>
+          <p:cNvCxnSpPr/>
+          <p:nvPr/>
+        </p:nvCxnSpPr>
+        <p:spPr>
+          <a:xfrm>
+            <a:off x="1" y="1973179"/>
+            <a:ext cx="546871" cy="0"/>
+          </a:xfrm>
+          <a:prstGeom prst="straightConnector1">
+            <a:avLst/>
+          </a:prstGeom>
+          <a:noFill/>
+          <a:ln w="38100" cap="flat" cmpd="sng">
+            <a:solidFill>
+              <a:srgbClr val="DA4C4C"/>
+            </a:solidFill>
+            <a:prstDash val="dot"/>
+            <a:miter lim="800000"/>
+            <a:headEnd type="none" w="sm" len="sm"/>
+            <a:tailEnd type="none" w="sm" len="sm"/>
+          </a:ln>
+        </p:spPr>
+      </p:cxnSp>
+      <p:cxnSp>
+        <p:nvCxnSpPr>
+          <p:cNvPr id="73" name="Google Shape;73;p48"/>
+          <p:cNvCxnSpPr/>
+          <p:nvPr/>
+        </p:nvCxnSpPr>
+        <p:spPr>
+          <a:xfrm>
+            <a:off x="1078187" y="2470066"/>
+            <a:ext cx="0" cy="1421565"/>
+          </a:xfrm>
+          <a:prstGeom prst="straightConnector1">
+            <a:avLst/>
+          </a:prstGeom>
+          <a:noFill/>
+          <a:ln w="38100" cap="flat" cmpd="sng">
+            <a:solidFill>
+              <a:srgbClr val="DA4C4C"/>
+            </a:solidFill>
+            <a:prstDash val="dot"/>
+            <a:miter lim="800000"/>
+            <a:headEnd type="none" w="sm" len="sm"/>
+            <a:tailEnd type="none" w="sm" len="sm"/>
+          </a:ln>
+        </p:spPr>
+      </p:cxnSp>
+      <p:sp>
+        <p:nvSpPr>
+          <p:cNvPr id="74" name="Google Shape;74;p48"/>
+          <p:cNvSpPr/>
+          <p:nvPr/>
+        </p:nvSpPr>
+        <p:spPr>
+          <a:xfrm>
+            <a:off x="123133" y="1978203"/>
+            <a:ext cx="955055" cy="927957"/>
+          </a:xfrm>
+          <a:prstGeom prst="arc">
+            <a:avLst>
+              <a:gd name="adj1" fmla="val 16200000"/>
+              <a:gd name="adj2" fmla="val 0"/>
+            </a:avLst>
+          </a:prstGeom>
+          <a:noFill/>
+          <a:ln w="38100" cap="flat" cmpd="sng">
+            <a:solidFill>
+              <a:srgbClr val="DA4C4C"/>
+            </a:solidFill>
+            <a:prstDash val="dot"/>
+            <a:miter lim="800000"/>
+            <a:headEnd type="none" w="sm" len="sm"/>
+            <a:tailEnd type="none" w="sm" len="sm"/>
+          </a:ln>
+        </p:spPr>
+        <p:txBody>
+          <a:bodyPr spcFirstLastPara="1" wrap="square" lIns="91425" tIns="45700" rIns="91425" bIns="45700" anchor="ctr" anchorCtr="0">
+            <a:noAutofit/>
+          </a:bodyPr>
+          <a:lstStyle/>
+          <a:p>
+            <a:pPr marL="0" marR="0" lvl="0" indent="0" algn="ctr" rtl="0">
+              <a:lnSpc>
+                <a:spcPct val="100000"/>
+              </a:lnSpc>
+              <a:spcBef>
+                <a:spcPts val="0"/>
+              </a:spcBef>
+              <a:spcAft>
+                <a:spcPts val="0"/>
+              </a:spcAft>
+              <a:buClr>
+                <a:schemeClr val="dk1"/>
+              </a:buClr>
+              <a:buSzPts val="1800"/>
+              <a:buFont typeface="Arial"/>
+              <a:buNone/>
+            </a:pPr>
+            <a:endParaRPr sz="1800" b="0" i="0" u="none" strike="noStrike" cap="none">
+              <a:solidFill>
+                <a:schemeClr val="dk1"/>
+              </a:solidFill>
+              <a:latin typeface="Calibri"/>
+              <a:ea typeface="Calibri"/>
+              <a:cs typeface="Calibri"/>
+              <a:sym typeface="Calibri"/>
+            </a:endParaRPr>
+          </a:p>
+        </p:txBody>
+      </p:sp>
+      <p:sp>
+        <p:nvSpPr>
+          <p:cNvPr id="75" name="Google Shape;75;p48"/>
+          <p:cNvSpPr/>
+          <p:nvPr/>
+        </p:nvSpPr>
+        <p:spPr>
+          <a:xfrm rot="10800000">
+            <a:off x="1083730" y="3452335"/>
+            <a:ext cx="955055" cy="927957"/>
+          </a:xfrm>
+          <a:prstGeom prst="arc">
+            <a:avLst>
+              <a:gd name="adj1" fmla="val 16200000"/>
+              <a:gd name="adj2" fmla="val 0"/>
+            </a:avLst>
+          </a:prstGeom>
+          <a:noFill/>
+          <a:ln w="38100" cap="flat" cmpd="sng">
+            <a:solidFill>
+              <a:srgbClr val="DA4C4C"/>
+            </a:solidFill>
+            <a:prstDash val="dot"/>
+            <a:miter lim="800000"/>
+            <a:headEnd type="none" w="sm" len="sm"/>
+            <a:tailEnd type="none" w="sm" len="sm"/>
+          </a:ln>
+        </p:spPr>
+        <p:txBody>
+          <a:bodyPr spcFirstLastPara="1" wrap="square" lIns="91425" tIns="45700" rIns="91425" bIns="45700" anchor="ctr" anchorCtr="0">
+            <a:noAutofit/>
+          </a:bodyPr>
+          <a:lstStyle/>
+          <a:p>
+            <a:pPr marL="0" marR="0" lvl="0" indent="0" algn="ctr" rtl="0">
+              <a:lnSpc>
+                <a:spcPct val="100000"/>
+              </a:lnSpc>
+              <a:spcBef>
+                <a:spcPts val="0"/>
+              </a:spcBef>
+              <a:spcAft>
+                <a:spcPts val="0"/>
+              </a:spcAft>
+              <a:buClr>
+                <a:schemeClr val="dk1"/>
+              </a:buClr>
+              <a:buSzPts val="1800"/>
+              <a:buFont typeface="Arial"/>
+              <a:buNone/>
+            </a:pPr>
+            <a:endParaRPr sz="1800" b="0" i="0" u="none" strike="noStrike" cap="none">
+              <a:solidFill>
+                <a:schemeClr val="dk1"/>
+              </a:solidFill>
+              <a:latin typeface="Calibri"/>
+              <a:ea typeface="Calibri"/>
+              <a:cs typeface="Calibri"/>
+              <a:sym typeface="Calibri"/>
+            </a:endParaRPr>
+          </a:p>
+        </p:txBody>
+      </p:sp>
+      <p:cxnSp>
+        <p:nvCxnSpPr>
+          <p:cNvPr id="76" name="Google Shape;76;p48"/>
+          <p:cNvCxnSpPr/>
+          <p:nvPr/>
+        </p:nvCxnSpPr>
+        <p:spPr>
+          <a:xfrm>
+            <a:off x="1602826" y="4380291"/>
+            <a:ext cx="10589175" cy="0"/>
+          </a:xfrm>
+          <a:prstGeom prst="straightConnector1">
+            <a:avLst/>
+          </a:prstGeom>
+          <a:noFill/>
+          <a:ln w="38100" cap="flat" cmpd="sng">
+            <a:solidFill>
+              <a:srgbClr val="DA4C4C"/>
+            </a:solidFill>
+            <a:prstDash val="dot"/>
+            <a:miter lim="800000"/>
+            <a:headEnd type="none" w="sm" len="sm"/>
+            <a:tailEnd type="none" w="sm" len="sm"/>
+          </a:ln>
+        </p:spPr>
+      </p:cxnSp>
+      <p:cxnSp>
+        <p:nvCxnSpPr>
+          <p:cNvPr id="77" name="Google Shape;77;p48"/>
+          <p:cNvCxnSpPr/>
+          <p:nvPr/>
+        </p:nvCxnSpPr>
+        <p:spPr>
+          <a:xfrm>
+            <a:off x="0" y="6324266"/>
+            <a:ext cx="749901" cy="19295"/>
+          </a:xfrm>
+          <a:prstGeom prst="straightConnector1">
+            <a:avLst/>
+          </a:prstGeom>
+          <a:noFill/>
+          <a:ln w="25400" cap="flat" cmpd="sng">
+            <a:solidFill>
+              <a:srgbClr val="8DA9DB"/>
+            </a:solidFill>
+            <a:prstDash val="dot"/>
+            <a:miter lim="800000"/>
+            <a:headEnd type="none" w="sm" len="sm"/>
+            <a:tailEnd type="none" w="sm" len="sm"/>
+          </a:ln>
+        </p:spPr>
+      </p:cxnSp>
+      <p:sp>
+        <p:nvSpPr>
+          <p:cNvPr id="78" name="Google Shape;78;p48"/>
+          <p:cNvSpPr txBox="1">
+            <a:spLocks noGrp="1"/>
+          </p:cNvSpPr>
+          <p:nvPr>
+            <p:ph type="title"/>
+          </p:nvPr>
+        </p:nvSpPr>
+        <p:spPr>
+          <a:xfrm rot="-5400000">
+            <a:off x="-2054354" y="4995992"/>
+            <a:ext cx="5230631" cy="457064"/>
+          </a:xfrm>
+          <a:prstGeom prst="rect">
+            <a:avLst/>
+          </a:prstGeom>
+          <a:noFill/>
+          <a:ln>
+            <a:noFill/>
+          </a:ln>
+        </p:spPr>
+        <p:txBody>
+          <a:bodyPr spcFirstLastPara="1" wrap="square" lIns="91425" tIns="45700" rIns="91425" bIns="45700" anchor="ctr" anchorCtr="0">
+            <a:normAutofit/>
+          </a:bodyPr>
+          <a:lstStyle>
+            <a:lvl1pPr lvl="0" algn="r">
+              <a:lnSpc>
+                <a:spcPct val="90000"/>
+              </a:lnSpc>
+              <a:spcBef>
+                <a:spcPts val="0"/>
+              </a:spcBef>
+              <a:spcAft>
+                <a:spcPts val="0"/>
+              </a:spcAft>
+              <a:buClr>
+                <a:schemeClr val="dk1"/>
+              </a:buClr>
+              <a:buSzPts val="2500"/>
+              <a:buFont typeface="Calibri"/>
+              <a:buNone/>
+              <a:defRPr sz="2500" u="none"/>
+            </a:lvl1pPr>
+            <a:lvl2pPr lvl="1" algn="l">
+              <a:lnSpc>
+                <a:spcPct val="100000"/>
+              </a:lnSpc>
+              <a:spcBef>
+                <a:spcPts val="0"/>
+              </a:spcBef>
+              <a:spcAft>
+                <a:spcPts val="0"/>
+              </a:spcAft>
+              <a:buSzPts val="1400"/>
+              <a:buNone/>
+              <a:defRPr/>
+            </a:lvl2pPr>
+            <a:lvl3pPr lvl="2" algn="l">
+              <a:lnSpc>
+                <a:spcPct val="100000"/>
+              </a:lnSpc>
+              <a:spcBef>
+                <a:spcPts val="0"/>
+              </a:spcBef>
+              <a:spcAft>
+                <a:spcPts val="0"/>
+              </a:spcAft>
+              <a:buSzPts val="1400"/>
+              <a:buNone/>
+              <a:defRPr/>
+            </a:lvl3pPr>
+            <a:lvl4pPr lvl="3" algn="l">
+              <a:lnSpc>
+                <a:spcPct val="100000"/>
+              </a:lnSpc>
+              <a:spcBef>
+                <a:spcPts val="0"/>
+              </a:spcBef>
+              <a:spcAft>
+                <a:spcPts val="0"/>
+              </a:spcAft>
+              <a:buSzPts val="1400"/>
+              <a:buNone/>
+              <a:defRPr/>
+            </a:lvl4pPr>
+            <a:lvl5pPr lvl="4" algn="l">
+              <a:lnSpc>
+                <a:spcPct val="100000"/>
+              </a:lnSpc>
+              <a:spcBef>
+                <a:spcPts val="0"/>
+              </a:spcBef>
+              <a:spcAft>
+                <a:spcPts val="0"/>
+              </a:spcAft>
+              <a:buSzPts val="1400"/>
+              <a:buNone/>
+              <a:defRPr/>
+            </a:lvl5pPr>
+            <a:lvl6pPr lvl="5" algn="l">
+              <a:lnSpc>
+                <a:spcPct val="100000"/>
+              </a:lnSpc>
+              <a:spcBef>
+                <a:spcPts val="0"/>
+              </a:spcBef>
+              <a:spcAft>
+                <a:spcPts val="0"/>
+              </a:spcAft>
+              <a:buSzPts val="1400"/>
+              <a:buNone/>
+              <a:defRPr/>
+            </a:lvl6pPr>
+            <a:lvl7pPr lvl="6" algn="l">
+              <a:lnSpc>
+                <a:spcPct val="100000"/>
+              </a:lnSpc>
+              <a:spcBef>
+                <a:spcPts val="0"/>
+              </a:spcBef>
+              <a:spcAft>
+                <a:spcPts val="0"/>
+              </a:spcAft>
+              <a:buSzPts val="1400"/>
+              <a:buNone/>
+              <a:defRPr/>
+            </a:lvl7pPr>
+            <a:lvl8pPr lvl="7" algn="l">
+              <a:lnSpc>
+                <a:spcPct val="100000"/>
+              </a:lnSpc>
+              <a:spcBef>
+                <a:spcPts val="0"/>
+              </a:spcBef>
+              <a:spcAft>
+                <a:spcPts val="0"/>
+              </a:spcAft>
+              <a:buSzPts val="1400"/>
+              <a:buNone/>
+              <a:defRPr/>
+            </a:lvl8pPr>
+            <a:lvl9pPr lvl="8" algn="l">
+              <a:lnSpc>
+                <a:spcPct val="100000"/>
+              </a:lnSpc>
+              <a:spcBef>
+                <a:spcPts val="0"/>
+              </a:spcBef>
+              <a:spcAft>
+                <a:spcPts val="0"/>
+              </a:spcAft>
+              <a:buSzPts val="1400"/>
+              <a:buNone/>
+              <a:defRPr/>
+            </a:lvl9pPr>
+          </a:lstStyle>
+          <a:p>
+            <a:r>
+              <a:rPr lang="es-MX"/>
+              <a:t>Haz clic para modificar el estilo de título del patrón</a:t>
+            </a:r>
+            <a:endParaRPr/>
+          </a:p>
+        </p:txBody>
+      </p:sp>
+      <p:sp>
+        <p:nvSpPr>
+          <p:cNvPr id="79" name="Google Shape;79;p48"/>
+          <p:cNvSpPr txBox="1">
+            <a:spLocks noGrp="1"/>
+          </p:cNvSpPr>
+          <p:nvPr>
+            <p:ph type="body" idx="2"/>
+          </p:nvPr>
+        </p:nvSpPr>
+        <p:spPr>
+          <a:xfrm>
+            <a:off x="939250" y="462990"/>
+            <a:ext cx="8733879" cy="882316"/>
+          </a:xfrm>
+          <a:prstGeom prst="rect">
+            <a:avLst/>
+          </a:prstGeom>
+          <a:noFill/>
+          <a:ln>
+            <a:noFill/>
+          </a:ln>
+        </p:spPr>
+        <p:txBody>
+          <a:bodyPr spcFirstLastPara="1" wrap="square" lIns="91425" tIns="45700" rIns="91425" bIns="45700" anchor="t" anchorCtr="0">
+            <a:normAutofit/>
+          </a:bodyPr>
+          <a:lstStyle>
+            <a:lvl1pPr marL="457200" lvl="0" indent="-228600" algn="l">
+              <a:lnSpc>
+                <a:spcPct val="90000"/>
+              </a:lnSpc>
+              <a:spcBef>
+                <a:spcPts val="1000"/>
+              </a:spcBef>
+              <a:spcAft>
+                <a:spcPts val="0"/>
+              </a:spcAft>
+              <a:buClr>
+                <a:srgbClr val="666666"/>
+              </a:buClr>
+              <a:buSzPts val="3000"/>
+              <a:buNone/>
+              <a:defRPr sz="3000">
+                <a:solidFill>
+                  <a:srgbClr val="666666"/>
+                </a:solidFill>
+              </a:defRPr>
+            </a:lvl1pPr>
+            <a:lvl2pPr marL="914400" lvl="1" indent="-342900" algn="l">
+              <a:lnSpc>
+                <a:spcPct val="90000"/>
+              </a:lnSpc>
+              <a:spcBef>
+                <a:spcPts val="500"/>
+              </a:spcBef>
+              <a:spcAft>
+                <a:spcPts val="0"/>
+              </a:spcAft>
+              <a:buClr>
+                <a:schemeClr val="dk1"/>
+              </a:buClr>
+              <a:buSzPts val="1800"/>
+              <a:buChar char="•"/>
+              <a:defRPr/>
+            </a:lvl2pPr>
+            <a:lvl3pPr marL="1371600" lvl="2" indent="-342900" algn="l">
+              <a:lnSpc>
+                <a:spcPct val="90000"/>
+              </a:lnSpc>
+              <a:spcBef>
+                <a:spcPts val="500"/>
+              </a:spcBef>
+              <a:spcAft>
+                <a:spcPts val="0"/>
+              </a:spcAft>
+              <a:buClr>
+                <a:schemeClr val="dk1"/>
+              </a:buClr>
+              <a:buSzPts val="1800"/>
+              <a:buChar char="•"/>
+              <a:defRPr/>
+            </a:lvl3pPr>
+            <a:lvl4pPr marL="1828800" lvl="3" indent="-342900" algn="l">
+              <a:lnSpc>
+                <a:spcPct val="90000"/>
+              </a:lnSpc>
+              <a:spcBef>
+                <a:spcPts val="500"/>
+              </a:spcBef>
+              <a:spcAft>
+                <a:spcPts val="0"/>
+              </a:spcAft>
+              <a:buClr>
+                <a:schemeClr val="dk1"/>
+              </a:buClr>
+              <a:buSzPts val="1800"/>
+              <a:buChar char="•"/>
+              <a:defRPr/>
+            </a:lvl4pPr>
+            <a:lvl5pPr marL="2286000" lvl="4" indent="-342900" algn="l">
+              <a:lnSpc>
+                <a:spcPct val="90000"/>
+              </a:lnSpc>
+              <a:spcBef>
+                <a:spcPts val="500"/>
+              </a:spcBef>
+              <a:spcAft>
+                <a:spcPts val="0"/>
+              </a:spcAft>
+              <a:buClr>
+                <a:schemeClr val="dk1"/>
+              </a:buClr>
+              <a:buSzPts val="1800"/>
+              <a:buChar char="•"/>
+              <a:defRPr/>
+            </a:lvl5pPr>
+            <a:lvl6pPr marL="2743200" lvl="5" indent="-342900" algn="l">
+              <a:lnSpc>
+                <a:spcPct val="90000"/>
+              </a:lnSpc>
+              <a:spcBef>
+                <a:spcPts val="500"/>
+              </a:spcBef>
+              <a:spcAft>
+                <a:spcPts val="0"/>
+              </a:spcAft>
+              <a:buClr>
+                <a:schemeClr val="dk1"/>
+              </a:buClr>
+              <a:buSzPts val="1800"/>
+              <a:buChar char="•"/>
+              <a:defRPr/>
+            </a:lvl6pPr>
+            <a:lvl7pPr marL="3200400" lvl="6" indent="-342900" algn="l">
+              <a:lnSpc>
+                <a:spcPct val="90000"/>
+              </a:lnSpc>
+              <a:spcBef>
+                <a:spcPts val="500"/>
+              </a:spcBef>
+              <a:spcAft>
+                <a:spcPts val="0"/>
+              </a:spcAft>
+              <a:buClr>
+                <a:schemeClr val="dk1"/>
+              </a:buClr>
+              <a:buSzPts val="1800"/>
+              <a:buChar char="•"/>
+              <a:defRPr/>
+            </a:lvl7pPr>
+            <a:lvl8pPr marL="3657600" lvl="7" indent="-342900" algn="l">
+              <a:lnSpc>
+                <a:spcPct val="90000"/>
+              </a:lnSpc>
+              <a:spcBef>
+                <a:spcPts val="500"/>
+              </a:spcBef>
+              <a:spcAft>
+                <a:spcPts val="0"/>
+              </a:spcAft>
+              <a:buClr>
+                <a:schemeClr val="dk1"/>
+              </a:buClr>
+              <a:buSzPts val="1800"/>
+              <a:buChar char="•"/>
+              <a:defRPr/>
+            </a:lvl8pPr>
+            <a:lvl9pPr marL="4114800" lvl="8" indent="-342900" algn="l">
+              <a:lnSpc>
+                <a:spcPct val="90000"/>
+              </a:lnSpc>
+              <a:spcBef>
+                <a:spcPts val="500"/>
+              </a:spcBef>
+              <a:spcAft>
+                <a:spcPts val="0"/>
+              </a:spcAft>
+              <a:buClr>
+                <a:schemeClr val="dk1"/>
+              </a:buClr>
+              <a:buSzPts val="1800"/>
+              <a:buChar char="•"/>
+              <a:defRPr/>
+            </a:lvl9pPr>
+          </a:lstStyle>
+          <a:p>
+            <a:pPr lvl="0"/>
+            <a:r>
+              <a:rPr lang="es-MX"/>
+              <a:t>Haga clic para modificar los estilos de texto del patrón</a:t>
+            </a:r>
+          </a:p>
+        </p:txBody>
+      </p:sp>
+    </p:spTree>
+    <p:extLst>
+      <p:ext uri="{BB962C8B-B14F-4D97-AF65-F5344CB8AC3E}">
+        <p14:creationId xmlns:p14="http://schemas.microsoft.com/office/powerpoint/2010/main" val="2275540259"/>
+      </p:ext>
+    </p:extLst>
+  </p:cSld>
+  <p:clrMapOvr>
+    <a:masterClrMapping/>
+  </p:clrMapOvr>
+</p:sldLayout>
+</file>
+
+<file path=ppt/slideLayouts/slideLayout11.xml><?xml version="1.0" encoding="utf-8"?>
 <p:sldLayout xmlns:a="http://schemas.openxmlformats.org/drawingml/2006/main" xmlns:r="http://schemas.openxmlformats.org/officeDocument/2006/relationships" xmlns:p="http://schemas.openxmlformats.org/presentationml/2006/main" preserve="1" userDrawn="1">
   <p:cSld name="Comparison">
     <p:spTree>
@@ -1451,7 +2938,7 @@
 </p:sldLayout>
 </file>
 
-<file path=ppt/slideLayouts/slideLayout11.xml><?xml version="1.0" encoding="utf-8"?>
+<file path=ppt/slideLayouts/slideLayout12.xml><?xml version="1.0" encoding="utf-8"?>
 <p:sldLayout xmlns:a="http://schemas.openxmlformats.org/drawingml/2006/main" xmlns:r="http://schemas.openxmlformats.org/officeDocument/2006/relationships" xmlns:p="http://schemas.openxmlformats.org/presentationml/2006/main" matchingName="Dos objetos" userDrawn="1">
   <p:cSld name="Two Content">
     <p:spTree>
@@ -1928,7 +3415,7 @@
 </p:sldLayout>
 </file>
 
-<file path=ppt/slideLayouts/slideLayout12.xml><?xml version="1.0" encoding="utf-8"?>
+<file path=ppt/slideLayouts/slideLayout13.xml><?xml version="1.0" encoding="utf-8"?>
 <p:sldLayout xmlns:a="http://schemas.openxmlformats.org/drawingml/2006/main" xmlns:r="http://schemas.openxmlformats.org/officeDocument/2006/relationships" xmlns:p="http://schemas.openxmlformats.org/presentationml/2006/main" matchingName="Título y objetos" preserve="1" userDrawn="1">
   <p:cSld name="Title and Content">
     <p:bg>
@@ -2384,7 +3871,7 @@
 </p:sldLayout>
 </file>
 
-<file path=ppt/slideLayouts/slideLayout13.xml><?xml version="1.0" encoding="utf-8"?>
+<file path=ppt/slideLayouts/slideLayout14.xml><?xml version="1.0" encoding="utf-8"?>
 <p:sldLayout xmlns:a="http://schemas.openxmlformats.org/drawingml/2006/main" xmlns:r="http://schemas.openxmlformats.org/officeDocument/2006/relationships" xmlns:p="http://schemas.openxmlformats.org/presentationml/2006/main" matchingName="ubicacion1" preserve="1" userDrawn="1">
   <p:cSld name="1_ubicacion1">
     <p:spTree>
@@ -3881,6 +5368,295 @@
 
 <file path=ppt/slideLayouts/slideLayout5.xml><?xml version="1.0" encoding="utf-8"?>
 <p:sldLayout xmlns:a="http://schemas.openxmlformats.org/drawingml/2006/main" xmlns:r="http://schemas.openxmlformats.org/officeDocument/2006/relationships" xmlns:p="http://schemas.openxmlformats.org/presentationml/2006/main" preserve="1" userDrawn="1">
+  <p:cSld name="Graficos_unabarra">
+    <p:spTree>
+      <p:nvGrpSpPr>
+        <p:cNvPr id="1" name=""/>
+        <p:cNvGrpSpPr/>
+        <p:nvPr/>
+      </p:nvGrpSpPr>
+      <p:grpSpPr>
+        <a:xfrm>
+          <a:off x="0" y="0"/>
+          <a:ext cx="0" cy="0"/>
+          <a:chOff x="0" y="0"/>
+          <a:chExt cx="0" cy="0"/>
+        </a:xfrm>
+      </p:grpSpPr>
+      <p:sp>
+        <p:nvSpPr>
+          <p:cNvPr id="2" name="Title 1">
+            <a:extLst>
+              <a:ext uri="{FF2B5EF4-FFF2-40B4-BE49-F238E27FC236}">
+                <a16:creationId xmlns:a16="http://schemas.microsoft.com/office/drawing/2014/main" id="{E161B1F1-83C7-C3F7-BF29-A7102FCCB32B}"/>
+              </a:ext>
+            </a:extLst>
+          </p:cNvPr>
+          <p:cNvSpPr>
+            <a:spLocks noGrp="1"/>
+          </p:cNvSpPr>
+          <p:nvPr>
+            <p:ph type="title"/>
+          </p:nvPr>
+        </p:nvSpPr>
+        <p:spPr>
+          <a:xfrm>
+            <a:off x="317500" y="119062"/>
+            <a:ext cx="9730221" cy="1143899"/>
+          </a:xfrm>
+        </p:spPr>
+        <p:txBody>
+          <a:bodyPr/>
+          <a:lstStyle/>
+          <a:p>
+            <a:r>
+              <a:rPr lang="en-US" dirty="0"/>
+              <a:t>Click to edit Master title style</a:t>
+            </a:r>
+            <a:endParaRPr lang="en-PE" dirty="0"/>
+          </a:p>
+        </p:txBody>
+      </p:sp>
+      <p:pic>
+        <p:nvPicPr>
+          <p:cNvPr id="6" name="Google Shape;66;p47">
+            <a:extLst>
+              <a:ext uri="{FF2B5EF4-FFF2-40B4-BE49-F238E27FC236}">
+                <a16:creationId xmlns:a16="http://schemas.microsoft.com/office/drawing/2014/main" id="{323E205B-F311-E78C-D6A8-0122851FE66D}"/>
+              </a:ext>
+            </a:extLst>
+          </p:cNvPr>
+          <p:cNvPicPr preferRelativeResize="0"/>
+          <p:nvPr userDrawn="1"/>
+        </p:nvPicPr>
+        <p:blipFill rotWithShape="1">
+          <a:blip r:embed="rId2">
+            <a:alphaModFix/>
+          </a:blip>
+          <a:srcRect t="29471" b="26643"/>
+          <a:stretch/>
+        </p:blipFill>
+        <p:spPr>
+          <a:xfrm>
+            <a:off x="10047721" y="119062"/>
+            <a:ext cx="1927827" cy="846037"/>
+          </a:xfrm>
+          <a:prstGeom prst="rect">
+            <a:avLst/>
+          </a:prstGeom>
+          <a:noFill/>
+          <a:ln>
+            <a:noFill/>
+          </a:ln>
+        </p:spPr>
+      </p:pic>
+      <p:sp>
+        <p:nvSpPr>
+          <p:cNvPr id="8" name="Picture Placeholder 7">
+            <a:extLst>
+              <a:ext uri="{FF2B5EF4-FFF2-40B4-BE49-F238E27FC236}">
+                <a16:creationId xmlns:a16="http://schemas.microsoft.com/office/drawing/2014/main" id="{0FB415E7-8491-13B2-0A7D-52BF25F1EA60}"/>
+              </a:ext>
+            </a:extLst>
+          </p:cNvPr>
+          <p:cNvSpPr>
+            <a:spLocks noGrp="1"/>
+          </p:cNvSpPr>
+          <p:nvPr>
+            <p:ph type="pic" sz="quarter" idx="10"/>
+          </p:nvPr>
+        </p:nvSpPr>
+        <p:spPr>
+          <a:xfrm>
+            <a:off x="317500" y="2057400"/>
+            <a:ext cx="11440491" cy="2971800"/>
+          </a:xfrm>
+        </p:spPr>
+        <p:txBody>
+          <a:bodyPr/>
+          <a:lstStyle/>
+          <a:p>
+            <a:endParaRPr lang="en-PE"/>
+          </a:p>
+        </p:txBody>
+      </p:sp>
+      <p:sp>
+        <p:nvSpPr>
+          <p:cNvPr id="10" name="Text Placeholder 9">
+            <a:extLst>
+              <a:ext uri="{FF2B5EF4-FFF2-40B4-BE49-F238E27FC236}">
+                <a16:creationId xmlns:a16="http://schemas.microsoft.com/office/drawing/2014/main" id="{F97A4842-2728-8D6A-D2DE-B6E2062C5B64}"/>
+              </a:ext>
+            </a:extLst>
+          </p:cNvPr>
+          <p:cNvSpPr>
+            <a:spLocks noGrp="1"/>
+          </p:cNvSpPr>
+          <p:nvPr>
+            <p:ph type="body" sz="quarter" idx="11"/>
+          </p:nvPr>
+        </p:nvSpPr>
+        <p:spPr>
+          <a:xfrm>
+            <a:off x="317500" y="6340475"/>
+            <a:ext cx="4503738" cy="398463"/>
+          </a:xfrm>
+        </p:spPr>
+        <p:txBody>
+          <a:bodyPr>
+            <a:noAutofit/>
+          </a:bodyPr>
+          <a:lstStyle>
+            <a:lvl1pPr>
+              <a:defRPr sz="1100"/>
+            </a:lvl1pPr>
+            <a:lvl2pPr>
+              <a:defRPr sz="1000"/>
+            </a:lvl2pPr>
+            <a:lvl3pPr>
+              <a:defRPr sz="1000"/>
+            </a:lvl3pPr>
+            <a:lvl4pPr>
+              <a:defRPr sz="1000"/>
+            </a:lvl4pPr>
+            <a:lvl5pPr>
+              <a:defRPr sz="1000"/>
+            </a:lvl5pPr>
+          </a:lstStyle>
+          <a:p>
+            <a:pPr lvl="0"/>
+            <a:r>
+              <a:rPr lang="en-US" dirty="0"/>
+              <a:t>Click to edit Master text styles</a:t>
+            </a:r>
+          </a:p>
+          <a:p>
+            <a:pPr lvl="1"/>
+            <a:r>
+              <a:rPr lang="en-US" dirty="0"/>
+              <a:t>Second level</a:t>
+            </a:r>
+          </a:p>
+          <a:p>
+            <a:pPr lvl="2"/>
+            <a:r>
+              <a:rPr lang="en-US" dirty="0"/>
+              <a:t>Third level</a:t>
+            </a:r>
+          </a:p>
+          <a:p>
+            <a:pPr lvl="3"/>
+            <a:r>
+              <a:rPr lang="en-US" dirty="0"/>
+              <a:t>Fourth level</a:t>
+            </a:r>
+          </a:p>
+          <a:p>
+            <a:pPr lvl="4"/>
+            <a:r>
+              <a:rPr lang="en-US" dirty="0"/>
+              <a:t>Fifth level</a:t>
+            </a:r>
+            <a:endParaRPr lang="en-PE" dirty="0"/>
+          </a:p>
+        </p:txBody>
+      </p:sp>
+      <p:sp>
+        <p:nvSpPr>
+          <p:cNvPr id="11" name="Text Placeholder 9">
+            <a:extLst>
+              <a:ext uri="{FF2B5EF4-FFF2-40B4-BE49-F238E27FC236}">
+                <a16:creationId xmlns:a16="http://schemas.microsoft.com/office/drawing/2014/main" id="{6C0D5753-3F06-573C-2A52-4C7432C384AB}"/>
+              </a:ext>
+            </a:extLst>
+          </p:cNvPr>
+          <p:cNvSpPr>
+            <a:spLocks noGrp="1"/>
+          </p:cNvSpPr>
+          <p:nvPr>
+            <p:ph type="body" sz="quarter" idx="12"/>
+          </p:nvPr>
+        </p:nvSpPr>
+        <p:spPr>
+          <a:xfrm>
+            <a:off x="7472362" y="6340475"/>
+            <a:ext cx="4285629" cy="398463"/>
+          </a:xfrm>
+        </p:spPr>
+        <p:txBody>
+          <a:bodyPr>
+            <a:noAutofit/>
+          </a:bodyPr>
+          <a:lstStyle>
+            <a:lvl1pPr algn="r">
+              <a:defRPr sz="1100"/>
+            </a:lvl1pPr>
+            <a:lvl2pPr algn="r">
+              <a:defRPr sz="1000"/>
+            </a:lvl2pPr>
+            <a:lvl3pPr algn="r">
+              <a:defRPr sz="1000"/>
+            </a:lvl3pPr>
+            <a:lvl4pPr algn="r">
+              <a:defRPr sz="1000"/>
+            </a:lvl4pPr>
+            <a:lvl5pPr algn="r">
+              <a:defRPr sz="1000"/>
+            </a:lvl5pPr>
+          </a:lstStyle>
+          <a:p>
+            <a:pPr lvl="0"/>
+            <a:r>
+              <a:rPr lang="en-US" dirty="0"/>
+              <a:t>Click to edit Master text styles</a:t>
+            </a:r>
+          </a:p>
+          <a:p>
+            <a:pPr lvl="1"/>
+            <a:r>
+              <a:rPr lang="en-US" dirty="0"/>
+              <a:t>Second level</a:t>
+            </a:r>
+          </a:p>
+          <a:p>
+            <a:pPr lvl="2"/>
+            <a:r>
+              <a:rPr lang="en-US" dirty="0"/>
+              <a:t>Third level</a:t>
+            </a:r>
+          </a:p>
+          <a:p>
+            <a:pPr lvl="3"/>
+            <a:r>
+              <a:rPr lang="en-US" dirty="0"/>
+              <a:t>Fourth level</a:t>
+            </a:r>
+          </a:p>
+          <a:p>
+            <a:pPr lvl="4"/>
+            <a:r>
+              <a:rPr lang="en-US" dirty="0"/>
+              <a:t>Fifth level</a:t>
+            </a:r>
+            <a:endParaRPr lang="en-PE" dirty="0"/>
+          </a:p>
+        </p:txBody>
+      </p:sp>
+    </p:spTree>
+    <p:extLst>
+      <p:ext uri="{BB962C8B-B14F-4D97-AF65-F5344CB8AC3E}">
+        <p14:creationId xmlns:p14="http://schemas.microsoft.com/office/powerpoint/2010/main" val="311544014"/>
+      </p:ext>
+    </p:extLst>
+  </p:cSld>
+  <p:clrMapOvr>
+    <a:masterClrMapping/>
+  </p:clrMapOvr>
+</p:sldLayout>
+</file>
+
+<file path=ppt/slideLayouts/slideLayout6.xml><?xml version="1.0" encoding="utf-8"?>
+<p:sldLayout xmlns:a="http://schemas.openxmlformats.org/drawingml/2006/main" xmlns:r="http://schemas.openxmlformats.org/officeDocument/2006/relationships" xmlns:p="http://schemas.openxmlformats.org/presentationml/2006/main" preserve="1" userDrawn="1">
   <p:cSld name="Graficos_2columnas">
     <p:spTree>
       <p:nvGrpSpPr>
@@ -4198,7 +5974,7 @@
 </p:sldLayout>
 </file>
 
-<file path=ppt/slideLayouts/slideLayout6.xml><?xml version="1.0" encoding="utf-8"?>
+<file path=ppt/slideLayouts/slideLayout7.xml><?xml version="1.0" encoding="utf-8"?>
 <p:sldLayout xmlns:a="http://schemas.openxmlformats.org/drawingml/2006/main" xmlns:r="http://schemas.openxmlformats.org/officeDocument/2006/relationships" xmlns:p="http://schemas.openxmlformats.org/presentationml/2006/main" showMasterSp="0" matchingName="Contraportada" preserve="1">
   <p:cSld name="Contraportada">
     <p:spTree>
@@ -7259,7 +9035,7 @@
 </p:sldLayout>
 </file>
 
-<file path=ppt/slideLayouts/slideLayout7.xml><?xml version="1.0" encoding="utf-8"?>
+<file path=ppt/slideLayouts/slideLayout8.xml><?xml version="1.0" encoding="utf-8"?>
 <p:sldLayout xmlns:a="http://schemas.openxmlformats.org/drawingml/2006/main" xmlns:r="http://schemas.openxmlformats.org/officeDocument/2006/relationships" xmlns:p="http://schemas.openxmlformats.org/presentationml/2006/main" matchingName="3_Índice" preserve="1" userDrawn="1">
   <p:cSld name="Index">
     <p:bg>
@@ -12175,7 +13951,7 @@
 </p:sldLayout>
 </file>
 
-<file path=ppt/slideLayouts/slideLayout8.xml><?xml version="1.0" encoding="utf-8"?>
+<file path=ppt/slideLayouts/slideLayout9.xml><?xml version="1.0" encoding="utf-8"?>
 <p:sldLayout xmlns:a="http://schemas.openxmlformats.org/drawingml/2006/main" xmlns:r="http://schemas.openxmlformats.org/officeDocument/2006/relationships" xmlns:p="http://schemas.openxmlformats.org/presentationml/2006/main" preserve="1" userDrawn="1">
   <p:cSld name="Content with Caption">
     <p:spTree>
@@ -12344,7 +14120,7 @@
           <a:p>
             <a:fld id="{744CB4CB-0240-FB4C-81F1-218533927016}" type="datetimeFigureOut">
               <a:rPr lang="es-PE" smtClean="0"/>
-              <a:t>6/12/25</a:t>
+              <a:t>9/12/25</a:t>
             </a:fld>
             <a:endParaRPr lang="es-PE"/>
           </a:p>
@@ -12756,1493 +14532,6 @@
 </p:sldLayout>
 </file>
 
-<file path=ppt/slideLayouts/slideLayout9.xml><?xml version="1.0" encoding="utf-8"?>
-<p:sldLayout xmlns:a="http://schemas.openxmlformats.org/drawingml/2006/main" xmlns:r="http://schemas.openxmlformats.org/officeDocument/2006/relationships" xmlns:p="http://schemas.openxmlformats.org/presentationml/2006/main" matchingName="diseño contenido 3" preserve="1">
-  <p:cSld name="General Objective">
-    <p:spTree>
-      <p:nvGrpSpPr>
-        <p:cNvPr id="1" name="Shape 67"/>
-        <p:cNvGrpSpPr/>
-        <p:nvPr/>
-      </p:nvGrpSpPr>
-      <p:grpSpPr>
-        <a:xfrm>
-          <a:off x="0" y="0"/>
-          <a:ext cx="0" cy="0"/>
-          <a:chOff x="0" y="0"/>
-          <a:chExt cx="0" cy="0"/>
-        </a:xfrm>
-      </p:grpSpPr>
-      <p:sp>
-        <p:nvSpPr>
-          <p:cNvPr id="68" name="Google Shape;68;p48"/>
-          <p:cNvSpPr txBox="1">
-            <a:spLocks noGrp="1"/>
-          </p:cNvSpPr>
-          <p:nvPr>
-            <p:ph type="dt" idx="10"/>
-          </p:nvPr>
-        </p:nvSpPr>
-        <p:spPr>
-          <a:xfrm>
-            <a:off x="9178312" y="6356351"/>
-            <a:ext cx="2743200" cy="365125"/>
-          </a:xfrm>
-          <a:prstGeom prst="rect">
-            <a:avLst/>
-          </a:prstGeom>
-          <a:noFill/>
-          <a:ln>
-            <a:noFill/>
-          </a:ln>
-        </p:spPr>
-        <p:txBody>
-          <a:bodyPr spcFirstLastPara="1" wrap="square" lIns="91425" tIns="45700" rIns="91425" bIns="45700" anchor="ctr" anchorCtr="0">
-            <a:noAutofit/>
-          </a:bodyPr>
-          <a:lstStyle>
-            <a:lvl1pPr lvl="0" algn="l">
-              <a:lnSpc>
-                <a:spcPct val="100000"/>
-              </a:lnSpc>
-              <a:spcBef>
-                <a:spcPts val="0"/>
-              </a:spcBef>
-              <a:spcAft>
-                <a:spcPts val="0"/>
-              </a:spcAft>
-              <a:buClr>
-                <a:srgbClr val="888888"/>
-              </a:buClr>
-              <a:buSzPts val="1400"/>
-              <a:buFont typeface="Arial"/>
-              <a:buNone/>
-              <a:defRPr/>
-            </a:lvl1pPr>
-            <a:lvl2pPr lvl="1" algn="l">
-              <a:lnSpc>
-                <a:spcPct val="100000"/>
-              </a:lnSpc>
-              <a:spcBef>
-                <a:spcPts val="0"/>
-              </a:spcBef>
-              <a:spcAft>
-                <a:spcPts val="0"/>
-              </a:spcAft>
-              <a:buClr>
-                <a:schemeClr val="dk1"/>
-              </a:buClr>
-              <a:buSzPts val="1400"/>
-              <a:buFont typeface="Arial"/>
-              <a:buNone/>
-              <a:defRPr/>
-            </a:lvl2pPr>
-            <a:lvl3pPr lvl="2" algn="l">
-              <a:lnSpc>
-                <a:spcPct val="100000"/>
-              </a:lnSpc>
-              <a:spcBef>
-                <a:spcPts val="0"/>
-              </a:spcBef>
-              <a:spcAft>
-                <a:spcPts val="0"/>
-              </a:spcAft>
-              <a:buClr>
-                <a:schemeClr val="dk1"/>
-              </a:buClr>
-              <a:buSzPts val="1400"/>
-              <a:buFont typeface="Arial"/>
-              <a:buNone/>
-              <a:defRPr/>
-            </a:lvl3pPr>
-            <a:lvl4pPr lvl="3" algn="l">
-              <a:lnSpc>
-                <a:spcPct val="100000"/>
-              </a:lnSpc>
-              <a:spcBef>
-                <a:spcPts val="0"/>
-              </a:spcBef>
-              <a:spcAft>
-                <a:spcPts val="0"/>
-              </a:spcAft>
-              <a:buClr>
-                <a:schemeClr val="dk1"/>
-              </a:buClr>
-              <a:buSzPts val="1400"/>
-              <a:buFont typeface="Arial"/>
-              <a:buNone/>
-              <a:defRPr/>
-            </a:lvl4pPr>
-            <a:lvl5pPr lvl="4" algn="l">
-              <a:lnSpc>
-                <a:spcPct val="100000"/>
-              </a:lnSpc>
-              <a:spcBef>
-                <a:spcPts val="0"/>
-              </a:spcBef>
-              <a:spcAft>
-                <a:spcPts val="0"/>
-              </a:spcAft>
-              <a:buClr>
-                <a:schemeClr val="dk1"/>
-              </a:buClr>
-              <a:buSzPts val="1400"/>
-              <a:buFont typeface="Arial"/>
-              <a:buNone/>
-              <a:defRPr/>
-            </a:lvl5pPr>
-            <a:lvl6pPr lvl="5" algn="l">
-              <a:lnSpc>
-                <a:spcPct val="100000"/>
-              </a:lnSpc>
-              <a:spcBef>
-                <a:spcPts val="0"/>
-              </a:spcBef>
-              <a:spcAft>
-                <a:spcPts val="0"/>
-              </a:spcAft>
-              <a:buClr>
-                <a:schemeClr val="dk1"/>
-              </a:buClr>
-              <a:buSzPts val="1400"/>
-              <a:buFont typeface="Arial"/>
-              <a:buNone/>
-              <a:defRPr/>
-            </a:lvl6pPr>
-            <a:lvl7pPr lvl="6" algn="l">
-              <a:lnSpc>
-                <a:spcPct val="100000"/>
-              </a:lnSpc>
-              <a:spcBef>
-                <a:spcPts val="0"/>
-              </a:spcBef>
-              <a:spcAft>
-                <a:spcPts val="0"/>
-              </a:spcAft>
-              <a:buClr>
-                <a:schemeClr val="dk1"/>
-              </a:buClr>
-              <a:buSzPts val="1400"/>
-              <a:buFont typeface="Arial"/>
-              <a:buNone/>
-              <a:defRPr/>
-            </a:lvl7pPr>
-            <a:lvl8pPr lvl="7" algn="l">
-              <a:lnSpc>
-                <a:spcPct val="100000"/>
-              </a:lnSpc>
-              <a:spcBef>
-                <a:spcPts val="0"/>
-              </a:spcBef>
-              <a:spcAft>
-                <a:spcPts val="0"/>
-              </a:spcAft>
-              <a:buClr>
-                <a:schemeClr val="dk1"/>
-              </a:buClr>
-              <a:buSzPts val="1400"/>
-              <a:buFont typeface="Arial"/>
-              <a:buNone/>
-              <a:defRPr/>
-            </a:lvl8pPr>
-            <a:lvl9pPr lvl="8" algn="l">
-              <a:lnSpc>
-                <a:spcPct val="100000"/>
-              </a:lnSpc>
-              <a:spcBef>
-                <a:spcPts val="0"/>
-              </a:spcBef>
-              <a:spcAft>
-                <a:spcPts val="0"/>
-              </a:spcAft>
-              <a:buClr>
-                <a:schemeClr val="dk1"/>
-              </a:buClr>
-              <a:buSzPts val="1400"/>
-              <a:buFont typeface="Arial"/>
-              <a:buNone/>
-              <a:defRPr/>
-            </a:lvl9pPr>
-          </a:lstStyle>
-          <a:p>
-            <a:endParaRPr/>
-          </a:p>
-        </p:txBody>
-      </p:sp>
-      <p:sp>
-        <p:nvSpPr>
-          <p:cNvPr id="69" name="Google Shape;69;p48"/>
-          <p:cNvSpPr txBox="1">
-            <a:spLocks noGrp="1"/>
-          </p:cNvSpPr>
-          <p:nvPr>
-            <p:ph type="ftr" idx="11"/>
-          </p:nvPr>
-        </p:nvSpPr>
-        <p:spPr>
-          <a:xfrm>
-            <a:off x="4038600" y="6356351"/>
-            <a:ext cx="4114800" cy="365125"/>
-          </a:xfrm>
-          <a:prstGeom prst="rect">
-            <a:avLst/>
-          </a:prstGeom>
-          <a:noFill/>
-          <a:ln>
-            <a:noFill/>
-          </a:ln>
-        </p:spPr>
-        <p:txBody>
-          <a:bodyPr spcFirstLastPara="1" wrap="square" lIns="91425" tIns="45700" rIns="91425" bIns="45700" anchor="ctr" anchorCtr="0">
-            <a:noAutofit/>
-          </a:bodyPr>
-          <a:lstStyle>
-            <a:lvl1pPr lvl="0" algn="ctr">
-              <a:lnSpc>
-                <a:spcPct val="100000"/>
-              </a:lnSpc>
-              <a:spcBef>
-                <a:spcPts val="0"/>
-              </a:spcBef>
-              <a:spcAft>
-                <a:spcPts val="0"/>
-              </a:spcAft>
-              <a:buClr>
-                <a:srgbClr val="888888"/>
-              </a:buClr>
-              <a:buSzPts val="1400"/>
-              <a:buFont typeface="Arial"/>
-              <a:buNone/>
-              <a:defRPr/>
-            </a:lvl1pPr>
-            <a:lvl2pPr lvl="1" algn="l">
-              <a:lnSpc>
-                <a:spcPct val="100000"/>
-              </a:lnSpc>
-              <a:spcBef>
-                <a:spcPts val="0"/>
-              </a:spcBef>
-              <a:spcAft>
-                <a:spcPts val="0"/>
-              </a:spcAft>
-              <a:buClr>
-                <a:schemeClr val="dk1"/>
-              </a:buClr>
-              <a:buSzPts val="1400"/>
-              <a:buFont typeface="Arial"/>
-              <a:buNone/>
-              <a:defRPr/>
-            </a:lvl2pPr>
-            <a:lvl3pPr lvl="2" algn="l">
-              <a:lnSpc>
-                <a:spcPct val="100000"/>
-              </a:lnSpc>
-              <a:spcBef>
-                <a:spcPts val="0"/>
-              </a:spcBef>
-              <a:spcAft>
-                <a:spcPts val="0"/>
-              </a:spcAft>
-              <a:buClr>
-                <a:schemeClr val="dk1"/>
-              </a:buClr>
-              <a:buSzPts val="1400"/>
-              <a:buFont typeface="Arial"/>
-              <a:buNone/>
-              <a:defRPr/>
-            </a:lvl3pPr>
-            <a:lvl4pPr lvl="3" algn="l">
-              <a:lnSpc>
-                <a:spcPct val="100000"/>
-              </a:lnSpc>
-              <a:spcBef>
-                <a:spcPts val="0"/>
-              </a:spcBef>
-              <a:spcAft>
-                <a:spcPts val="0"/>
-              </a:spcAft>
-              <a:buClr>
-                <a:schemeClr val="dk1"/>
-              </a:buClr>
-              <a:buSzPts val="1400"/>
-              <a:buFont typeface="Arial"/>
-              <a:buNone/>
-              <a:defRPr/>
-            </a:lvl4pPr>
-            <a:lvl5pPr lvl="4" algn="l">
-              <a:lnSpc>
-                <a:spcPct val="100000"/>
-              </a:lnSpc>
-              <a:spcBef>
-                <a:spcPts val="0"/>
-              </a:spcBef>
-              <a:spcAft>
-                <a:spcPts val="0"/>
-              </a:spcAft>
-              <a:buClr>
-                <a:schemeClr val="dk1"/>
-              </a:buClr>
-              <a:buSzPts val="1400"/>
-              <a:buFont typeface="Arial"/>
-              <a:buNone/>
-              <a:defRPr/>
-            </a:lvl5pPr>
-            <a:lvl6pPr lvl="5" algn="l">
-              <a:lnSpc>
-                <a:spcPct val="100000"/>
-              </a:lnSpc>
-              <a:spcBef>
-                <a:spcPts val="0"/>
-              </a:spcBef>
-              <a:spcAft>
-                <a:spcPts val="0"/>
-              </a:spcAft>
-              <a:buClr>
-                <a:schemeClr val="dk1"/>
-              </a:buClr>
-              <a:buSzPts val="1400"/>
-              <a:buFont typeface="Arial"/>
-              <a:buNone/>
-              <a:defRPr/>
-            </a:lvl6pPr>
-            <a:lvl7pPr lvl="6" algn="l">
-              <a:lnSpc>
-                <a:spcPct val="100000"/>
-              </a:lnSpc>
-              <a:spcBef>
-                <a:spcPts val="0"/>
-              </a:spcBef>
-              <a:spcAft>
-                <a:spcPts val="0"/>
-              </a:spcAft>
-              <a:buClr>
-                <a:schemeClr val="dk1"/>
-              </a:buClr>
-              <a:buSzPts val="1400"/>
-              <a:buFont typeface="Arial"/>
-              <a:buNone/>
-              <a:defRPr/>
-            </a:lvl7pPr>
-            <a:lvl8pPr lvl="7" algn="l">
-              <a:lnSpc>
-                <a:spcPct val="100000"/>
-              </a:lnSpc>
-              <a:spcBef>
-                <a:spcPts val="0"/>
-              </a:spcBef>
-              <a:spcAft>
-                <a:spcPts val="0"/>
-              </a:spcAft>
-              <a:buClr>
-                <a:schemeClr val="dk1"/>
-              </a:buClr>
-              <a:buSzPts val="1400"/>
-              <a:buFont typeface="Arial"/>
-              <a:buNone/>
-              <a:defRPr/>
-            </a:lvl8pPr>
-            <a:lvl9pPr lvl="8" algn="l">
-              <a:lnSpc>
-                <a:spcPct val="100000"/>
-              </a:lnSpc>
-              <a:spcBef>
-                <a:spcPts val="0"/>
-              </a:spcBef>
-              <a:spcAft>
-                <a:spcPts val="0"/>
-              </a:spcAft>
-              <a:buClr>
-                <a:schemeClr val="dk1"/>
-              </a:buClr>
-              <a:buSzPts val="1400"/>
-              <a:buFont typeface="Arial"/>
-              <a:buNone/>
-              <a:defRPr/>
-            </a:lvl9pPr>
-          </a:lstStyle>
-          <a:p>
-            <a:endParaRPr/>
-          </a:p>
-        </p:txBody>
-      </p:sp>
-      <p:sp>
-        <p:nvSpPr>
-          <p:cNvPr id="70" name="Google Shape;70;p48"/>
-          <p:cNvSpPr txBox="1">
-            <a:spLocks noGrp="1"/>
-          </p:cNvSpPr>
-          <p:nvPr>
-            <p:ph type="sldNum" idx="12"/>
-          </p:nvPr>
-        </p:nvSpPr>
-        <p:spPr>
-          <a:xfrm>
-            <a:off x="332429" y="6356351"/>
-            <a:ext cx="2743200" cy="365125"/>
-          </a:xfrm>
-          <a:prstGeom prst="rect">
-            <a:avLst/>
-          </a:prstGeom>
-          <a:noFill/>
-          <a:ln>
-            <a:noFill/>
-          </a:ln>
-        </p:spPr>
-        <p:txBody>
-          <a:bodyPr spcFirstLastPara="1" wrap="square" lIns="91425" tIns="45700" rIns="91425" bIns="45700" anchor="ctr" anchorCtr="0">
-            <a:noAutofit/>
-          </a:bodyPr>
-          <a:lstStyle>
-            <a:lvl1pPr marL="0" marR="0" lvl="0" indent="0" algn="l">
-              <a:lnSpc>
-                <a:spcPct val="100000"/>
-              </a:lnSpc>
-              <a:spcBef>
-                <a:spcPts val="0"/>
-              </a:spcBef>
-              <a:spcAft>
-                <a:spcPts val="0"/>
-              </a:spcAft>
-              <a:buClr>
-                <a:srgbClr val="888888"/>
-              </a:buClr>
-              <a:buSzPts val="1200"/>
-              <a:buFont typeface="Calibri"/>
-              <a:buNone/>
-              <a:defRPr sz="1200" b="0" i="0" u="none" strike="noStrike" cap="none">
-                <a:solidFill>
-                  <a:srgbClr val="888888"/>
-                </a:solidFill>
-                <a:latin typeface="Calibri"/>
-                <a:ea typeface="Calibri"/>
-                <a:cs typeface="Calibri"/>
-                <a:sym typeface="Calibri"/>
-              </a:defRPr>
-            </a:lvl1pPr>
-            <a:lvl2pPr marL="0" marR="0" lvl="1" indent="0" algn="l">
-              <a:lnSpc>
-                <a:spcPct val="100000"/>
-              </a:lnSpc>
-              <a:spcBef>
-                <a:spcPts val="0"/>
-              </a:spcBef>
-              <a:spcAft>
-                <a:spcPts val="0"/>
-              </a:spcAft>
-              <a:buClr>
-                <a:srgbClr val="888888"/>
-              </a:buClr>
-              <a:buSzPts val="1200"/>
-              <a:buFont typeface="Calibri"/>
-              <a:buNone/>
-              <a:defRPr sz="1200" b="0" i="0" u="none" strike="noStrike" cap="none">
-                <a:solidFill>
-                  <a:srgbClr val="888888"/>
-                </a:solidFill>
-                <a:latin typeface="Calibri"/>
-                <a:ea typeface="Calibri"/>
-                <a:cs typeface="Calibri"/>
-                <a:sym typeface="Calibri"/>
-              </a:defRPr>
-            </a:lvl2pPr>
-            <a:lvl3pPr marL="0" marR="0" lvl="2" indent="0" algn="l">
-              <a:lnSpc>
-                <a:spcPct val="100000"/>
-              </a:lnSpc>
-              <a:spcBef>
-                <a:spcPts val="0"/>
-              </a:spcBef>
-              <a:spcAft>
-                <a:spcPts val="0"/>
-              </a:spcAft>
-              <a:buClr>
-                <a:srgbClr val="888888"/>
-              </a:buClr>
-              <a:buSzPts val="1200"/>
-              <a:buFont typeface="Calibri"/>
-              <a:buNone/>
-              <a:defRPr sz="1200" b="0" i="0" u="none" strike="noStrike" cap="none">
-                <a:solidFill>
-                  <a:srgbClr val="888888"/>
-                </a:solidFill>
-                <a:latin typeface="Calibri"/>
-                <a:ea typeface="Calibri"/>
-                <a:cs typeface="Calibri"/>
-                <a:sym typeface="Calibri"/>
-              </a:defRPr>
-            </a:lvl3pPr>
-            <a:lvl4pPr marL="0" marR="0" lvl="3" indent="0" algn="l">
-              <a:lnSpc>
-                <a:spcPct val="100000"/>
-              </a:lnSpc>
-              <a:spcBef>
-                <a:spcPts val="0"/>
-              </a:spcBef>
-              <a:spcAft>
-                <a:spcPts val="0"/>
-              </a:spcAft>
-              <a:buClr>
-                <a:srgbClr val="888888"/>
-              </a:buClr>
-              <a:buSzPts val="1200"/>
-              <a:buFont typeface="Calibri"/>
-              <a:buNone/>
-              <a:defRPr sz="1200" b="0" i="0" u="none" strike="noStrike" cap="none">
-                <a:solidFill>
-                  <a:srgbClr val="888888"/>
-                </a:solidFill>
-                <a:latin typeface="Calibri"/>
-                <a:ea typeface="Calibri"/>
-                <a:cs typeface="Calibri"/>
-                <a:sym typeface="Calibri"/>
-              </a:defRPr>
-            </a:lvl4pPr>
-            <a:lvl5pPr marL="0" marR="0" lvl="4" indent="0" algn="l">
-              <a:lnSpc>
-                <a:spcPct val="100000"/>
-              </a:lnSpc>
-              <a:spcBef>
-                <a:spcPts val="0"/>
-              </a:spcBef>
-              <a:spcAft>
-                <a:spcPts val="0"/>
-              </a:spcAft>
-              <a:buClr>
-                <a:srgbClr val="888888"/>
-              </a:buClr>
-              <a:buSzPts val="1200"/>
-              <a:buFont typeface="Calibri"/>
-              <a:buNone/>
-              <a:defRPr sz="1200" b="0" i="0" u="none" strike="noStrike" cap="none">
-                <a:solidFill>
-                  <a:srgbClr val="888888"/>
-                </a:solidFill>
-                <a:latin typeface="Calibri"/>
-                <a:ea typeface="Calibri"/>
-                <a:cs typeface="Calibri"/>
-                <a:sym typeface="Calibri"/>
-              </a:defRPr>
-            </a:lvl5pPr>
-            <a:lvl6pPr marL="0" marR="0" lvl="5" indent="0" algn="l">
-              <a:lnSpc>
-                <a:spcPct val="100000"/>
-              </a:lnSpc>
-              <a:spcBef>
-                <a:spcPts val="0"/>
-              </a:spcBef>
-              <a:spcAft>
-                <a:spcPts val="0"/>
-              </a:spcAft>
-              <a:buClr>
-                <a:srgbClr val="888888"/>
-              </a:buClr>
-              <a:buSzPts val="1200"/>
-              <a:buFont typeface="Calibri"/>
-              <a:buNone/>
-              <a:defRPr sz="1200" b="0" i="0" u="none" strike="noStrike" cap="none">
-                <a:solidFill>
-                  <a:srgbClr val="888888"/>
-                </a:solidFill>
-                <a:latin typeface="Calibri"/>
-                <a:ea typeface="Calibri"/>
-                <a:cs typeface="Calibri"/>
-                <a:sym typeface="Calibri"/>
-              </a:defRPr>
-            </a:lvl6pPr>
-            <a:lvl7pPr marL="0" marR="0" lvl="6" indent="0" algn="l">
-              <a:lnSpc>
-                <a:spcPct val="100000"/>
-              </a:lnSpc>
-              <a:spcBef>
-                <a:spcPts val="0"/>
-              </a:spcBef>
-              <a:spcAft>
-                <a:spcPts val="0"/>
-              </a:spcAft>
-              <a:buClr>
-                <a:srgbClr val="888888"/>
-              </a:buClr>
-              <a:buSzPts val="1200"/>
-              <a:buFont typeface="Calibri"/>
-              <a:buNone/>
-              <a:defRPr sz="1200" b="0" i="0" u="none" strike="noStrike" cap="none">
-                <a:solidFill>
-                  <a:srgbClr val="888888"/>
-                </a:solidFill>
-                <a:latin typeface="Calibri"/>
-                <a:ea typeface="Calibri"/>
-                <a:cs typeface="Calibri"/>
-                <a:sym typeface="Calibri"/>
-              </a:defRPr>
-            </a:lvl7pPr>
-            <a:lvl8pPr marL="0" marR="0" lvl="7" indent="0" algn="l">
-              <a:lnSpc>
-                <a:spcPct val="100000"/>
-              </a:lnSpc>
-              <a:spcBef>
-                <a:spcPts val="0"/>
-              </a:spcBef>
-              <a:spcAft>
-                <a:spcPts val="0"/>
-              </a:spcAft>
-              <a:buClr>
-                <a:srgbClr val="888888"/>
-              </a:buClr>
-              <a:buSzPts val="1200"/>
-              <a:buFont typeface="Calibri"/>
-              <a:buNone/>
-              <a:defRPr sz="1200" b="0" i="0" u="none" strike="noStrike" cap="none">
-                <a:solidFill>
-                  <a:srgbClr val="888888"/>
-                </a:solidFill>
-                <a:latin typeface="Calibri"/>
-                <a:ea typeface="Calibri"/>
-                <a:cs typeface="Calibri"/>
-                <a:sym typeface="Calibri"/>
-              </a:defRPr>
-            </a:lvl8pPr>
-            <a:lvl9pPr marL="0" marR="0" lvl="8" indent="0" algn="l">
-              <a:lnSpc>
-                <a:spcPct val="100000"/>
-              </a:lnSpc>
-              <a:spcBef>
-                <a:spcPts val="0"/>
-              </a:spcBef>
-              <a:spcAft>
-                <a:spcPts val="0"/>
-              </a:spcAft>
-              <a:buClr>
-                <a:srgbClr val="888888"/>
-              </a:buClr>
-              <a:buSzPts val="1200"/>
-              <a:buFont typeface="Calibri"/>
-              <a:buNone/>
-              <a:defRPr sz="1200" b="0" i="0" u="none" strike="noStrike" cap="none">
-                <a:solidFill>
-                  <a:srgbClr val="888888"/>
-                </a:solidFill>
-                <a:latin typeface="Calibri"/>
-                <a:ea typeface="Calibri"/>
-                <a:cs typeface="Calibri"/>
-                <a:sym typeface="Calibri"/>
-              </a:defRPr>
-            </a:lvl9pPr>
-          </a:lstStyle>
-          <a:p>
-            <a:pPr marL="0" lvl="0" indent="0" algn="l" rtl="0">
-              <a:spcBef>
-                <a:spcPts val="0"/>
-              </a:spcBef>
-              <a:spcAft>
-                <a:spcPts val="0"/>
-              </a:spcAft>
-              <a:buNone/>
-            </a:pPr>
-            <a:fld id="{00000000-1234-1234-1234-123412341234}" type="slidenum">
-              <a:rPr lang="es-ES"/>
-              <a:t>‹#›</a:t>
-            </a:fld>
-            <a:endParaRPr/>
-          </a:p>
-        </p:txBody>
-      </p:sp>
-      <p:sp>
-        <p:nvSpPr>
-          <p:cNvPr id="71" name="Google Shape;71;p48"/>
-          <p:cNvSpPr txBox="1">
-            <a:spLocks noGrp="1"/>
-          </p:cNvSpPr>
-          <p:nvPr>
-            <p:ph type="body" idx="1"/>
-          </p:nvPr>
-        </p:nvSpPr>
-        <p:spPr>
-          <a:xfrm>
-            <a:off x="3224465" y="1973179"/>
-            <a:ext cx="7908759" cy="2172936"/>
-          </a:xfrm>
-          <a:prstGeom prst="rect">
-            <a:avLst/>
-          </a:prstGeom>
-          <a:noFill/>
-          <a:ln>
-            <a:noFill/>
-          </a:ln>
-        </p:spPr>
-        <p:txBody>
-          <a:bodyPr spcFirstLastPara="1" wrap="square" lIns="91425" tIns="45700" rIns="91425" bIns="45700" anchor="t" anchorCtr="0">
-            <a:normAutofit/>
-          </a:bodyPr>
-          <a:lstStyle>
-            <a:lvl1pPr marL="457200" lvl="0" indent="-228600" algn="l">
-              <a:lnSpc>
-                <a:spcPct val="90000"/>
-              </a:lnSpc>
-              <a:spcBef>
-                <a:spcPts val="1000"/>
-              </a:spcBef>
-              <a:spcAft>
-                <a:spcPts val="0"/>
-              </a:spcAft>
-              <a:buClr>
-                <a:schemeClr val="dk1"/>
-              </a:buClr>
-              <a:buSzPts val="2800"/>
-              <a:buNone/>
-              <a:defRPr/>
-            </a:lvl1pPr>
-            <a:lvl2pPr marL="914400" lvl="1" indent="-342900" algn="l">
-              <a:lnSpc>
-                <a:spcPct val="90000"/>
-              </a:lnSpc>
-              <a:spcBef>
-                <a:spcPts val="500"/>
-              </a:spcBef>
-              <a:spcAft>
-                <a:spcPts val="0"/>
-              </a:spcAft>
-              <a:buClr>
-                <a:schemeClr val="dk1"/>
-              </a:buClr>
-              <a:buSzPts val="1800"/>
-              <a:buChar char="•"/>
-              <a:defRPr/>
-            </a:lvl2pPr>
-            <a:lvl3pPr marL="1371600" lvl="2" indent="-342900" algn="l">
-              <a:lnSpc>
-                <a:spcPct val="90000"/>
-              </a:lnSpc>
-              <a:spcBef>
-                <a:spcPts val="500"/>
-              </a:spcBef>
-              <a:spcAft>
-                <a:spcPts val="0"/>
-              </a:spcAft>
-              <a:buClr>
-                <a:schemeClr val="dk1"/>
-              </a:buClr>
-              <a:buSzPts val="1800"/>
-              <a:buChar char="•"/>
-              <a:defRPr/>
-            </a:lvl3pPr>
-            <a:lvl4pPr marL="1828800" lvl="3" indent="-342900" algn="l">
-              <a:lnSpc>
-                <a:spcPct val="90000"/>
-              </a:lnSpc>
-              <a:spcBef>
-                <a:spcPts val="500"/>
-              </a:spcBef>
-              <a:spcAft>
-                <a:spcPts val="0"/>
-              </a:spcAft>
-              <a:buClr>
-                <a:schemeClr val="dk1"/>
-              </a:buClr>
-              <a:buSzPts val="1800"/>
-              <a:buChar char="•"/>
-              <a:defRPr/>
-            </a:lvl4pPr>
-            <a:lvl5pPr marL="2286000" lvl="4" indent="-342900" algn="l">
-              <a:lnSpc>
-                <a:spcPct val="90000"/>
-              </a:lnSpc>
-              <a:spcBef>
-                <a:spcPts val="500"/>
-              </a:spcBef>
-              <a:spcAft>
-                <a:spcPts val="0"/>
-              </a:spcAft>
-              <a:buClr>
-                <a:schemeClr val="dk1"/>
-              </a:buClr>
-              <a:buSzPts val="1800"/>
-              <a:buChar char="•"/>
-              <a:defRPr/>
-            </a:lvl5pPr>
-            <a:lvl6pPr marL="2743200" lvl="5" indent="-342900" algn="l">
-              <a:lnSpc>
-                <a:spcPct val="90000"/>
-              </a:lnSpc>
-              <a:spcBef>
-                <a:spcPts val="500"/>
-              </a:spcBef>
-              <a:spcAft>
-                <a:spcPts val="0"/>
-              </a:spcAft>
-              <a:buClr>
-                <a:schemeClr val="dk1"/>
-              </a:buClr>
-              <a:buSzPts val="1800"/>
-              <a:buChar char="•"/>
-              <a:defRPr/>
-            </a:lvl6pPr>
-            <a:lvl7pPr marL="3200400" lvl="6" indent="-342900" algn="l">
-              <a:lnSpc>
-                <a:spcPct val="90000"/>
-              </a:lnSpc>
-              <a:spcBef>
-                <a:spcPts val="500"/>
-              </a:spcBef>
-              <a:spcAft>
-                <a:spcPts val="0"/>
-              </a:spcAft>
-              <a:buClr>
-                <a:schemeClr val="dk1"/>
-              </a:buClr>
-              <a:buSzPts val="1800"/>
-              <a:buChar char="•"/>
-              <a:defRPr/>
-            </a:lvl7pPr>
-            <a:lvl8pPr marL="3657600" lvl="7" indent="-342900" algn="l">
-              <a:lnSpc>
-                <a:spcPct val="90000"/>
-              </a:lnSpc>
-              <a:spcBef>
-                <a:spcPts val="500"/>
-              </a:spcBef>
-              <a:spcAft>
-                <a:spcPts val="0"/>
-              </a:spcAft>
-              <a:buClr>
-                <a:schemeClr val="dk1"/>
-              </a:buClr>
-              <a:buSzPts val="1800"/>
-              <a:buChar char="•"/>
-              <a:defRPr/>
-            </a:lvl8pPr>
-            <a:lvl9pPr marL="4114800" lvl="8" indent="-342900" algn="l">
-              <a:lnSpc>
-                <a:spcPct val="90000"/>
-              </a:lnSpc>
-              <a:spcBef>
-                <a:spcPts val="500"/>
-              </a:spcBef>
-              <a:spcAft>
-                <a:spcPts val="0"/>
-              </a:spcAft>
-              <a:buClr>
-                <a:schemeClr val="dk1"/>
-              </a:buClr>
-              <a:buSzPts val="1800"/>
-              <a:buChar char="•"/>
-              <a:defRPr/>
-            </a:lvl9pPr>
-          </a:lstStyle>
-          <a:p>
-            <a:pPr lvl="0"/>
-            <a:r>
-              <a:rPr lang="es-MX"/>
-              <a:t>Haga clic para modificar los estilos de texto del patrón</a:t>
-            </a:r>
-          </a:p>
-        </p:txBody>
-      </p:sp>
-      <p:cxnSp>
-        <p:nvCxnSpPr>
-          <p:cNvPr id="72" name="Google Shape;72;p48"/>
-          <p:cNvCxnSpPr/>
-          <p:nvPr/>
-        </p:nvCxnSpPr>
-        <p:spPr>
-          <a:xfrm>
-            <a:off x="1" y="1973179"/>
-            <a:ext cx="546871" cy="0"/>
-          </a:xfrm>
-          <a:prstGeom prst="straightConnector1">
-            <a:avLst/>
-          </a:prstGeom>
-          <a:noFill/>
-          <a:ln w="38100" cap="flat" cmpd="sng">
-            <a:solidFill>
-              <a:srgbClr val="DA4C4C"/>
-            </a:solidFill>
-            <a:prstDash val="dot"/>
-            <a:miter lim="800000"/>
-            <a:headEnd type="none" w="sm" len="sm"/>
-            <a:tailEnd type="none" w="sm" len="sm"/>
-          </a:ln>
-        </p:spPr>
-      </p:cxnSp>
-      <p:cxnSp>
-        <p:nvCxnSpPr>
-          <p:cNvPr id="73" name="Google Shape;73;p48"/>
-          <p:cNvCxnSpPr/>
-          <p:nvPr/>
-        </p:nvCxnSpPr>
-        <p:spPr>
-          <a:xfrm>
-            <a:off x="1078187" y="2470066"/>
-            <a:ext cx="0" cy="1421565"/>
-          </a:xfrm>
-          <a:prstGeom prst="straightConnector1">
-            <a:avLst/>
-          </a:prstGeom>
-          <a:noFill/>
-          <a:ln w="38100" cap="flat" cmpd="sng">
-            <a:solidFill>
-              <a:srgbClr val="DA4C4C"/>
-            </a:solidFill>
-            <a:prstDash val="dot"/>
-            <a:miter lim="800000"/>
-            <a:headEnd type="none" w="sm" len="sm"/>
-            <a:tailEnd type="none" w="sm" len="sm"/>
-          </a:ln>
-        </p:spPr>
-      </p:cxnSp>
-      <p:sp>
-        <p:nvSpPr>
-          <p:cNvPr id="74" name="Google Shape;74;p48"/>
-          <p:cNvSpPr/>
-          <p:nvPr/>
-        </p:nvSpPr>
-        <p:spPr>
-          <a:xfrm>
-            <a:off x="123133" y="1978203"/>
-            <a:ext cx="955055" cy="927957"/>
-          </a:xfrm>
-          <a:prstGeom prst="arc">
-            <a:avLst>
-              <a:gd name="adj1" fmla="val 16200000"/>
-              <a:gd name="adj2" fmla="val 0"/>
-            </a:avLst>
-          </a:prstGeom>
-          <a:noFill/>
-          <a:ln w="38100" cap="flat" cmpd="sng">
-            <a:solidFill>
-              <a:srgbClr val="DA4C4C"/>
-            </a:solidFill>
-            <a:prstDash val="dot"/>
-            <a:miter lim="800000"/>
-            <a:headEnd type="none" w="sm" len="sm"/>
-            <a:tailEnd type="none" w="sm" len="sm"/>
-          </a:ln>
-        </p:spPr>
-        <p:txBody>
-          <a:bodyPr spcFirstLastPara="1" wrap="square" lIns="91425" tIns="45700" rIns="91425" bIns="45700" anchor="ctr" anchorCtr="0">
-            <a:noAutofit/>
-          </a:bodyPr>
-          <a:lstStyle/>
-          <a:p>
-            <a:pPr marL="0" marR="0" lvl="0" indent="0" algn="ctr" rtl="0">
-              <a:lnSpc>
-                <a:spcPct val="100000"/>
-              </a:lnSpc>
-              <a:spcBef>
-                <a:spcPts val="0"/>
-              </a:spcBef>
-              <a:spcAft>
-                <a:spcPts val="0"/>
-              </a:spcAft>
-              <a:buClr>
-                <a:schemeClr val="dk1"/>
-              </a:buClr>
-              <a:buSzPts val="1800"/>
-              <a:buFont typeface="Arial"/>
-              <a:buNone/>
-            </a:pPr>
-            <a:endParaRPr sz="1800" b="0" i="0" u="none" strike="noStrike" cap="none">
-              <a:solidFill>
-                <a:schemeClr val="dk1"/>
-              </a:solidFill>
-              <a:latin typeface="Calibri"/>
-              <a:ea typeface="Calibri"/>
-              <a:cs typeface="Calibri"/>
-              <a:sym typeface="Calibri"/>
-            </a:endParaRPr>
-          </a:p>
-        </p:txBody>
-      </p:sp>
-      <p:sp>
-        <p:nvSpPr>
-          <p:cNvPr id="75" name="Google Shape;75;p48"/>
-          <p:cNvSpPr/>
-          <p:nvPr/>
-        </p:nvSpPr>
-        <p:spPr>
-          <a:xfrm rot="10800000">
-            <a:off x="1083730" y="3452335"/>
-            <a:ext cx="955055" cy="927957"/>
-          </a:xfrm>
-          <a:prstGeom prst="arc">
-            <a:avLst>
-              <a:gd name="adj1" fmla="val 16200000"/>
-              <a:gd name="adj2" fmla="val 0"/>
-            </a:avLst>
-          </a:prstGeom>
-          <a:noFill/>
-          <a:ln w="38100" cap="flat" cmpd="sng">
-            <a:solidFill>
-              <a:srgbClr val="DA4C4C"/>
-            </a:solidFill>
-            <a:prstDash val="dot"/>
-            <a:miter lim="800000"/>
-            <a:headEnd type="none" w="sm" len="sm"/>
-            <a:tailEnd type="none" w="sm" len="sm"/>
-          </a:ln>
-        </p:spPr>
-        <p:txBody>
-          <a:bodyPr spcFirstLastPara="1" wrap="square" lIns="91425" tIns="45700" rIns="91425" bIns="45700" anchor="ctr" anchorCtr="0">
-            <a:noAutofit/>
-          </a:bodyPr>
-          <a:lstStyle/>
-          <a:p>
-            <a:pPr marL="0" marR="0" lvl="0" indent="0" algn="ctr" rtl="0">
-              <a:lnSpc>
-                <a:spcPct val="100000"/>
-              </a:lnSpc>
-              <a:spcBef>
-                <a:spcPts val="0"/>
-              </a:spcBef>
-              <a:spcAft>
-                <a:spcPts val="0"/>
-              </a:spcAft>
-              <a:buClr>
-                <a:schemeClr val="dk1"/>
-              </a:buClr>
-              <a:buSzPts val="1800"/>
-              <a:buFont typeface="Arial"/>
-              <a:buNone/>
-            </a:pPr>
-            <a:endParaRPr sz="1800" b="0" i="0" u="none" strike="noStrike" cap="none">
-              <a:solidFill>
-                <a:schemeClr val="dk1"/>
-              </a:solidFill>
-              <a:latin typeface="Calibri"/>
-              <a:ea typeface="Calibri"/>
-              <a:cs typeface="Calibri"/>
-              <a:sym typeface="Calibri"/>
-            </a:endParaRPr>
-          </a:p>
-        </p:txBody>
-      </p:sp>
-      <p:cxnSp>
-        <p:nvCxnSpPr>
-          <p:cNvPr id="76" name="Google Shape;76;p48"/>
-          <p:cNvCxnSpPr/>
-          <p:nvPr/>
-        </p:nvCxnSpPr>
-        <p:spPr>
-          <a:xfrm>
-            <a:off x="1602826" y="4380291"/>
-            <a:ext cx="10589175" cy="0"/>
-          </a:xfrm>
-          <a:prstGeom prst="straightConnector1">
-            <a:avLst/>
-          </a:prstGeom>
-          <a:noFill/>
-          <a:ln w="38100" cap="flat" cmpd="sng">
-            <a:solidFill>
-              <a:srgbClr val="DA4C4C"/>
-            </a:solidFill>
-            <a:prstDash val="dot"/>
-            <a:miter lim="800000"/>
-            <a:headEnd type="none" w="sm" len="sm"/>
-            <a:tailEnd type="none" w="sm" len="sm"/>
-          </a:ln>
-        </p:spPr>
-      </p:cxnSp>
-      <p:cxnSp>
-        <p:nvCxnSpPr>
-          <p:cNvPr id="77" name="Google Shape;77;p48"/>
-          <p:cNvCxnSpPr/>
-          <p:nvPr/>
-        </p:nvCxnSpPr>
-        <p:spPr>
-          <a:xfrm>
-            <a:off x="0" y="6324266"/>
-            <a:ext cx="749901" cy="19295"/>
-          </a:xfrm>
-          <a:prstGeom prst="straightConnector1">
-            <a:avLst/>
-          </a:prstGeom>
-          <a:noFill/>
-          <a:ln w="25400" cap="flat" cmpd="sng">
-            <a:solidFill>
-              <a:srgbClr val="8DA9DB"/>
-            </a:solidFill>
-            <a:prstDash val="dot"/>
-            <a:miter lim="800000"/>
-            <a:headEnd type="none" w="sm" len="sm"/>
-            <a:tailEnd type="none" w="sm" len="sm"/>
-          </a:ln>
-        </p:spPr>
-      </p:cxnSp>
-      <p:sp>
-        <p:nvSpPr>
-          <p:cNvPr id="78" name="Google Shape;78;p48"/>
-          <p:cNvSpPr txBox="1">
-            <a:spLocks noGrp="1"/>
-          </p:cNvSpPr>
-          <p:nvPr>
-            <p:ph type="title"/>
-          </p:nvPr>
-        </p:nvSpPr>
-        <p:spPr>
-          <a:xfrm rot="-5400000">
-            <a:off x="-2054354" y="4995992"/>
-            <a:ext cx="5230631" cy="457064"/>
-          </a:xfrm>
-          <a:prstGeom prst="rect">
-            <a:avLst/>
-          </a:prstGeom>
-          <a:noFill/>
-          <a:ln>
-            <a:noFill/>
-          </a:ln>
-        </p:spPr>
-        <p:txBody>
-          <a:bodyPr spcFirstLastPara="1" wrap="square" lIns="91425" tIns="45700" rIns="91425" bIns="45700" anchor="ctr" anchorCtr="0">
-            <a:normAutofit/>
-          </a:bodyPr>
-          <a:lstStyle>
-            <a:lvl1pPr lvl="0" algn="r">
-              <a:lnSpc>
-                <a:spcPct val="90000"/>
-              </a:lnSpc>
-              <a:spcBef>
-                <a:spcPts val="0"/>
-              </a:spcBef>
-              <a:spcAft>
-                <a:spcPts val="0"/>
-              </a:spcAft>
-              <a:buClr>
-                <a:schemeClr val="dk1"/>
-              </a:buClr>
-              <a:buSzPts val="2500"/>
-              <a:buFont typeface="Calibri"/>
-              <a:buNone/>
-              <a:defRPr sz="2500" u="none"/>
-            </a:lvl1pPr>
-            <a:lvl2pPr lvl="1" algn="l">
-              <a:lnSpc>
-                <a:spcPct val="100000"/>
-              </a:lnSpc>
-              <a:spcBef>
-                <a:spcPts val="0"/>
-              </a:spcBef>
-              <a:spcAft>
-                <a:spcPts val="0"/>
-              </a:spcAft>
-              <a:buSzPts val="1400"/>
-              <a:buNone/>
-              <a:defRPr/>
-            </a:lvl2pPr>
-            <a:lvl3pPr lvl="2" algn="l">
-              <a:lnSpc>
-                <a:spcPct val="100000"/>
-              </a:lnSpc>
-              <a:spcBef>
-                <a:spcPts val="0"/>
-              </a:spcBef>
-              <a:spcAft>
-                <a:spcPts val="0"/>
-              </a:spcAft>
-              <a:buSzPts val="1400"/>
-              <a:buNone/>
-              <a:defRPr/>
-            </a:lvl3pPr>
-            <a:lvl4pPr lvl="3" algn="l">
-              <a:lnSpc>
-                <a:spcPct val="100000"/>
-              </a:lnSpc>
-              <a:spcBef>
-                <a:spcPts val="0"/>
-              </a:spcBef>
-              <a:spcAft>
-                <a:spcPts val="0"/>
-              </a:spcAft>
-              <a:buSzPts val="1400"/>
-              <a:buNone/>
-              <a:defRPr/>
-            </a:lvl4pPr>
-            <a:lvl5pPr lvl="4" algn="l">
-              <a:lnSpc>
-                <a:spcPct val="100000"/>
-              </a:lnSpc>
-              <a:spcBef>
-                <a:spcPts val="0"/>
-              </a:spcBef>
-              <a:spcAft>
-                <a:spcPts val="0"/>
-              </a:spcAft>
-              <a:buSzPts val="1400"/>
-              <a:buNone/>
-              <a:defRPr/>
-            </a:lvl5pPr>
-            <a:lvl6pPr lvl="5" algn="l">
-              <a:lnSpc>
-                <a:spcPct val="100000"/>
-              </a:lnSpc>
-              <a:spcBef>
-                <a:spcPts val="0"/>
-              </a:spcBef>
-              <a:spcAft>
-                <a:spcPts val="0"/>
-              </a:spcAft>
-              <a:buSzPts val="1400"/>
-              <a:buNone/>
-              <a:defRPr/>
-            </a:lvl6pPr>
-            <a:lvl7pPr lvl="6" algn="l">
-              <a:lnSpc>
-                <a:spcPct val="100000"/>
-              </a:lnSpc>
-              <a:spcBef>
-                <a:spcPts val="0"/>
-              </a:spcBef>
-              <a:spcAft>
-                <a:spcPts val="0"/>
-              </a:spcAft>
-              <a:buSzPts val="1400"/>
-              <a:buNone/>
-              <a:defRPr/>
-            </a:lvl7pPr>
-            <a:lvl8pPr lvl="7" algn="l">
-              <a:lnSpc>
-                <a:spcPct val="100000"/>
-              </a:lnSpc>
-              <a:spcBef>
-                <a:spcPts val="0"/>
-              </a:spcBef>
-              <a:spcAft>
-                <a:spcPts val="0"/>
-              </a:spcAft>
-              <a:buSzPts val="1400"/>
-              <a:buNone/>
-              <a:defRPr/>
-            </a:lvl8pPr>
-            <a:lvl9pPr lvl="8" algn="l">
-              <a:lnSpc>
-                <a:spcPct val="100000"/>
-              </a:lnSpc>
-              <a:spcBef>
-                <a:spcPts val="0"/>
-              </a:spcBef>
-              <a:spcAft>
-                <a:spcPts val="0"/>
-              </a:spcAft>
-              <a:buSzPts val="1400"/>
-              <a:buNone/>
-              <a:defRPr/>
-            </a:lvl9pPr>
-          </a:lstStyle>
-          <a:p>
-            <a:r>
-              <a:rPr lang="es-MX"/>
-              <a:t>Haz clic para modificar el estilo de título del patrón</a:t>
-            </a:r>
-            <a:endParaRPr/>
-          </a:p>
-        </p:txBody>
-      </p:sp>
-      <p:sp>
-        <p:nvSpPr>
-          <p:cNvPr id="79" name="Google Shape;79;p48"/>
-          <p:cNvSpPr txBox="1">
-            <a:spLocks noGrp="1"/>
-          </p:cNvSpPr>
-          <p:nvPr>
-            <p:ph type="body" idx="2"/>
-          </p:nvPr>
-        </p:nvSpPr>
-        <p:spPr>
-          <a:xfrm>
-            <a:off x="939250" y="462990"/>
-            <a:ext cx="8733879" cy="882316"/>
-          </a:xfrm>
-          <a:prstGeom prst="rect">
-            <a:avLst/>
-          </a:prstGeom>
-          <a:noFill/>
-          <a:ln>
-            <a:noFill/>
-          </a:ln>
-        </p:spPr>
-        <p:txBody>
-          <a:bodyPr spcFirstLastPara="1" wrap="square" lIns="91425" tIns="45700" rIns="91425" bIns="45700" anchor="t" anchorCtr="0">
-            <a:normAutofit/>
-          </a:bodyPr>
-          <a:lstStyle>
-            <a:lvl1pPr marL="457200" lvl="0" indent="-228600" algn="l">
-              <a:lnSpc>
-                <a:spcPct val="90000"/>
-              </a:lnSpc>
-              <a:spcBef>
-                <a:spcPts val="1000"/>
-              </a:spcBef>
-              <a:spcAft>
-                <a:spcPts val="0"/>
-              </a:spcAft>
-              <a:buClr>
-                <a:srgbClr val="666666"/>
-              </a:buClr>
-              <a:buSzPts val="3000"/>
-              <a:buNone/>
-              <a:defRPr sz="3000">
-                <a:solidFill>
-                  <a:srgbClr val="666666"/>
-                </a:solidFill>
-              </a:defRPr>
-            </a:lvl1pPr>
-            <a:lvl2pPr marL="914400" lvl="1" indent="-342900" algn="l">
-              <a:lnSpc>
-                <a:spcPct val="90000"/>
-              </a:lnSpc>
-              <a:spcBef>
-                <a:spcPts val="500"/>
-              </a:spcBef>
-              <a:spcAft>
-                <a:spcPts val="0"/>
-              </a:spcAft>
-              <a:buClr>
-                <a:schemeClr val="dk1"/>
-              </a:buClr>
-              <a:buSzPts val="1800"/>
-              <a:buChar char="•"/>
-              <a:defRPr/>
-            </a:lvl2pPr>
-            <a:lvl3pPr marL="1371600" lvl="2" indent="-342900" algn="l">
-              <a:lnSpc>
-                <a:spcPct val="90000"/>
-              </a:lnSpc>
-              <a:spcBef>
-                <a:spcPts val="500"/>
-              </a:spcBef>
-              <a:spcAft>
-                <a:spcPts val="0"/>
-              </a:spcAft>
-              <a:buClr>
-                <a:schemeClr val="dk1"/>
-              </a:buClr>
-              <a:buSzPts val="1800"/>
-              <a:buChar char="•"/>
-              <a:defRPr/>
-            </a:lvl3pPr>
-            <a:lvl4pPr marL="1828800" lvl="3" indent="-342900" algn="l">
-              <a:lnSpc>
-                <a:spcPct val="90000"/>
-              </a:lnSpc>
-              <a:spcBef>
-                <a:spcPts val="500"/>
-              </a:spcBef>
-              <a:spcAft>
-                <a:spcPts val="0"/>
-              </a:spcAft>
-              <a:buClr>
-                <a:schemeClr val="dk1"/>
-              </a:buClr>
-              <a:buSzPts val="1800"/>
-              <a:buChar char="•"/>
-              <a:defRPr/>
-            </a:lvl4pPr>
-            <a:lvl5pPr marL="2286000" lvl="4" indent="-342900" algn="l">
-              <a:lnSpc>
-                <a:spcPct val="90000"/>
-              </a:lnSpc>
-              <a:spcBef>
-                <a:spcPts val="500"/>
-              </a:spcBef>
-              <a:spcAft>
-                <a:spcPts val="0"/>
-              </a:spcAft>
-              <a:buClr>
-                <a:schemeClr val="dk1"/>
-              </a:buClr>
-              <a:buSzPts val="1800"/>
-              <a:buChar char="•"/>
-              <a:defRPr/>
-            </a:lvl5pPr>
-            <a:lvl6pPr marL="2743200" lvl="5" indent="-342900" algn="l">
-              <a:lnSpc>
-                <a:spcPct val="90000"/>
-              </a:lnSpc>
-              <a:spcBef>
-                <a:spcPts val="500"/>
-              </a:spcBef>
-              <a:spcAft>
-                <a:spcPts val="0"/>
-              </a:spcAft>
-              <a:buClr>
-                <a:schemeClr val="dk1"/>
-              </a:buClr>
-              <a:buSzPts val="1800"/>
-              <a:buChar char="•"/>
-              <a:defRPr/>
-            </a:lvl6pPr>
-            <a:lvl7pPr marL="3200400" lvl="6" indent="-342900" algn="l">
-              <a:lnSpc>
-                <a:spcPct val="90000"/>
-              </a:lnSpc>
-              <a:spcBef>
-                <a:spcPts val="500"/>
-              </a:spcBef>
-              <a:spcAft>
-                <a:spcPts val="0"/>
-              </a:spcAft>
-              <a:buClr>
-                <a:schemeClr val="dk1"/>
-              </a:buClr>
-              <a:buSzPts val="1800"/>
-              <a:buChar char="•"/>
-              <a:defRPr/>
-            </a:lvl7pPr>
-            <a:lvl8pPr marL="3657600" lvl="7" indent="-342900" algn="l">
-              <a:lnSpc>
-                <a:spcPct val="90000"/>
-              </a:lnSpc>
-              <a:spcBef>
-                <a:spcPts val="500"/>
-              </a:spcBef>
-              <a:spcAft>
-                <a:spcPts val="0"/>
-              </a:spcAft>
-              <a:buClr>
-                <a:schemeClr val="dk1"/>
-              </a:buClr>
-              <a:buSzPts val="1800"/>
-              <a:buChar char="•"/>
-              <a:defRPr/>
-            </a:lvl8pPr>
-            <a:lvl9pPr marL="4114800" lvl="8" indent="-342900" algn="l">
-              <a:lnSpc>
-                <a:spcPct val="90000"/>
-              </a:lnSpc>
-              <a:spcBef>
-                <a:spcPts val="500"/>
-              </a:spcBef>
-              <a:spcAft>
-                <a:spcPts val="0"/>
-              </a:spcAft>
-              <a:buClr>
-                <a:schemeClr val="dk1"/>
-              </a:buClr>
-              <a:buSzPts val="1800"/>
-              <a:buChar char="•"/>
-              <a:defRPr/>
-            </a:lvl9pPr>
-          </a:lstStyle>
-          <a:p>
-            <a:pPr lvl="0"/>
-            <a:r>
-              <a:rPr lang="es-MX"/>
-              <a:t>Haga clic para modificar los estilos de texto del patrón</a:t>
-            </a:r>
-          </a:p>
-        </p:txBody>
-      </p:sp>
-    </p:spTree>
-    <p:extLst>
-      <p:ext uri="{BB962C8B-B14F-4D97-AF65-F5344CB8AC3E}">
-        <p14:creationId xmlns:p14="http://schemas.microsoft.com/office/powerpoint/2010/main" val="2275540259"/>
-      </p:ext>
-    </p:extLst>
-  </p:cSld>
-  <p:clrMapOvr>
-    <a:masterClrMapping/>
-  </p:clrMapOvr>
-</p:sldLayout>
-</file>
-
 <file path=ppt/slideMasters/slideMaster1.xml><?xml version="1.0" encoding="utf-8"?>
 <p:sldMaster xmlns:a="http://schemas.openxmlformats.org/drawingml/2006/main" xmlns:r="http://schemas.openxmlformats.org/officeDocument/2006/relationships" xmlns:p="http://schemas.openxmlformats.org/presentationml/2006/main">
   <p:cSld>
@@ -14624,7 +14913,7 @@
           <a:p>
             <a:fld id="{75C70C58-02E6-BE4A-9320-917330A400ED}" type="datetimeFigureOut">
               <a:rPr lang="es-PE" smtClean="0"/>
-              <a:t>6/12/25</a:t>
+              <a:t>9/12/25</a:t>
             </a:fld>
             <a:endParaRPr lang="es-PE"/>
           </a:p>
@@ -15183,15 +15472,16 @@
     <p:sldLayoutId id="2147483713" r:id="rId2"/>
     <p:sldLayoutId id="2147483714" r:id="rId3"/>
     <p:sldLayoutId id="2147483715" r:id="rId4"/>
-    <p:sldLayoutId id="2147483716" r:id="rId5"/>
-    <p:sldLayoutId id="2147483694" r:id="rId6"/>
-    <p:sldLayoutId id="2147483692" r:id="rId7"/>
-    <p:sldLayoutId id="2147483712" r:id="rId8"/>
-    <p:sldLayoutId id="2147483693" r:id="rId9"/>
-    <p:sldLayoutId id="2147483702" r:id="rId10"/>
-    <p:sldLayoutId id="2147483682" r:id="rId11"/>
-    <p:sldLayoutId id="2147483688" r:id="rId12"/>
-    <p:sldLayoutId id="2147483703" r:id="rId13"/>
+    <p:sldLayoutId id="2147483717" r:id="rId5"/>
+    <p:sldLayoutId id="2147483716" r:id="rId6"/>
+    <p:sldLayoutId id="2147483694" r:id="rId7"/>
+    <p:sldLayoutId id="2147483692" r:id="rId8"/>
+    <p:sldLayoutId id="2147483712" r:id="rId9"/>
+    <p:sldLayoutId id="2147483693" r:id="rId10"/>
+    <p:sldLayoutId id="2147483702" r:id="rId11"/>
+    <p:sldLayoutId id="2147483682" r:id="rId12"/>
+    <p:sldLayoutId id="2147483688" r:id="rId13"/>
+    <p:sldLayoutId id="2147483703" r:id="rId14"/>
   </p:sldLayoutIdLst>
   <p:txStyles>
     <p:titleStyle>

</xml_diff>